<commit_message>
task(develop): add image sources
related to #CAM-4820
</commit_message>
<xml_diff>
--- a/develop/drawings/TaskLifeCycle.pptx
+++ b/develop/drawings/TaskLifeCycle.pptx
@@ -5,10 +5,9 @@
     <p:sldMasterId id="2147483648" r:id="rId1"/>
   </p:sldMasterIdLst>
   <p:sldIdLst>
-    <p:sldId id="258" r:id="rId2"/>
-    <p:sldId id="259" r:id="rId3"/>
+    <p:sldId id="256" r:id="rId2"/>
   </p:sldIdLst>
-  <p:sldSz cx="9144000" cy="6858000" type="screen4x3"/>
+  <p:sldSz cx="12192000" cy="6858000"/>
   <p:notesSz cx="6858000" cy="9144000"/>
   <p:defaultTextStyle>
     <a:defPPr>
@@ -137,13 +136,17 @@
         </p:nvSpPr>
         <p:spPr>
           <a:xfrm>
-            <a:off x="685800" y="2130425"/>
-            <a:ext cx="7772400" cy="1470025"/>
-          </a:xfrm>
-        </p:spPr>
-        <p:txBody>
-          <a:bodyPr/>
-          <a:lstStyle/>
+            <a:off x="1524000" y="1122363"/>
+            <a:ext cx="9144000" cy="2387600"/>
+          </a:xfrm>
+        </p:spPr>
+        <p:txBody>
+          <a:bodyPr anchor="b"/>
+          <a:lstStyle>
+            <a:lvl1pPr algn="ctr">
+              <a:defRPr sz="6000"/>
+            </a:lvl1pPr>
+          </a:lstStyle>
           <a:p>
             <a:r>
               <a:rPr lang="de-DE" smtClean="0"/>
@@ -165,8 +168,8 @@
         </p:nvSpPr>
         <p:spPr>
           <a:xfrm>
-            <a:off x="1371600" y="3886200"/>
-            <a:ext cx="6400800" cy="1752600"/>
+            <a:off x="1524000" y="3602038"/>
+            <a:ext cx="9144000" cy="1655762"/>
           </a:xfrm>
         </p:spPr>
         <p:txBody>
@@ -174,93 +177,39 @@
           <a:lstStyle>
             <a:lvl1pPr marL="0" indent="0" algn="ctr">
               <a:buNone/>
-              <a:defRPr>
-                <a:solidFill>
-                  <a:schemeClr val="tx1">
-                    <a:tint val="75000"/>
-                  </a:schemeClr>
-                </a:solidFill>
-              </a:defRPr>
+              <a:defRPr sz="2400"/>
             </a:lvl1pPr>
             <a:lvl2pPr marL="457200" indent="0" algn="ctr">
               <a:buNone/>
-              <a:defRPr>
-                <a:solidFill>
-                  <a:schemeClr val="tx1">
-                    <a:tint val="75000"/>
-                  </a:schemeClr>
-                </a:solidFill>
-              </a:defRPr>
+              <a:defRPr sz="2000"/>
             </a:lvl2pPr>
             <a:lvl3pPr marL="914400" indent="0" algn="ctr">
               <a:buNone/>
-              <a:defRPr>
-                <a:solidFill>
-                  <a:schemeClr val="tx1">
-                    <a:tint val="75000"/>
-                  </a:schemeClr>
-                </a:solidFill>
-              </a:defRPr>
+              <a:defRPr sz="1800"/>
             </a:lvl3pPr>
             <a:lvl4pPr marL="1371600" indent="0" algn="ctr">
               <a:buNone/>
-              <a:defRPr>
-                <a:solidFill>
-                  <a:schemeClr val="tx1">
-                    <a:tint val="75000"/>
-                  </a:schemeClr>
-                </a:solidFill>
-              </a:defRPr>
+              <a:defRPr sz="1600"/>
             </a:lvl4pPr>
             <a:lvl5pPr marL="1828800" indent="0" algn="ctr">
               <a:buNone/>
-              <a:defRPr>
-                <a:solidFill>
-                  <a:schemeClr val="tx1">
-                    <a:tint val="75000"/>
-                  </a:schemeClr>
-                </a:solidFill>
-              </a:defRPr>
+              <a:defRPr sz="1600"/>
             </a:lvl5pPr>
             <a:lvl6pPr marL="2286000" indent="0" algn="ctr">
               <a:buNone/>
-              <a:defRPr>
-                <a:solidFill>
-                  <a:schemeClr val="tx1">
-                    <a:tint val="75000"/>
-                  </a:schemeClr>
-                </a:solidFill>
-              </a:defRPr>
+              <a:defRPr sz="1600"/>
             </a:lvl6pPr>
             <a:lvl7pPr marL="2743200" indent="0" algn="ctr">
               <a:buNone/>
-              <a:defRPr>
-                <a:solidFill>
-                  <a:schemeClr val="tx1">
-                    <a:tint val="75000"/>
-                  </a:schemeClr>
-                </a:solidFill>
-              </a:defRPr>
+              <a:defRPr sz="1600"/>
             </a:lvl7pPr>
             <a:lvl8pPr marL="3200400" indent="0" algn="ctr">
               <a:buNone/>
-              <a:defRPr>
-                <a:solidFill>
-                  <a:schemeClr val="tx1">
-                    <a:tint val="75000"/>
-                  </a:schemeClr>
-                </a:solidFill>
-              </a:defRPr>
+              <a:defRPr sz="1600"/>
             </a:lvl8pPr>
             <a:lvl9pPr marL="3657600" indent="0" algn="ctr">
               <a:buNone/>
-              <a:defRPr>
-                <a:solidFill>
-                  <a:schemeClr val="tx1">
-                    <a:tint val="75000"/>
-                  </a:schemeClr>
-                </a:solidFill>
-              </a:defRPr>
+              <a:defRPr sz="1600"/>
             </a:lvl9pPr>
           </a:lstStyle>
           <a:p>
@@ -287,9 +236,9 @@
           <a:bodyPr/>
           <a:lstStyle/>
           <a:p>
-            <a:fld id="{53456102-AF98-4902-8B3F-7190DD0573D9}" type="datetimeFigureOut">
-              <a:rPr lang="de-DE" smtClean="0"/>
-              <a:t>28.11.2013</a:t>
+            <a:fld id="{D8DCA20A-278F-45B7-BBF6-0081BC7E6569}" type="datetimeFigureOut">
+              <a:rPr lang="de-DE" smtClean="0"/>
+              <a:t>23.10.2015</a:t>
             </a:fld>
             <a:endParaRPr lang="de-DE"/>
           </a:p>
@@ -329,9 +278,9 @@
           <a:bodyPr/>
           <a:lstStyle/>
           <a:p>
-            <a:fld id="{67FDEFD1-54BE-431D-8603-D353FAA53F7D}" type="slidenum">
-              <a:rPr lang="de-DE" smtClean="0"/>
-              <a:t>‹#›</a:t>
+            <a:fld id="{F527A3C2-041D-475D-913C-4FE37E2C5F43}" type="slidenum">
+              <a:rPr lang="de-DE" smtClean="0"/>
+              <a:t>‹Nr.›</a:t>
             </a:fld>
             <a:endParaRPr lang="de-DE"/>
           </a:p>
@@ -340,7 +289,7 @@
     </p:spTree>
     <p:extLst>
       <p:ext uri="{BB962C8B-B14F-4D97-AF65-F5344CB8AC3E}">
-        <p14:creationId xmlns:p14="http://schemas.microsoft.com/office/powerpoint/2010/main" val="531113623"/>
+        <p14:creationId xmlns:p14="http://schemas.microsoft.com/office/powerpoint/2010/main" val="3862695117"/>
       </p:ext>
     </p:extLst>
   </p:cSld>
@@ -457,9 +406,9 @@
           <a:bodyPr/>
           <a:lstStyle/>
           <a:p>
-            <a:fld id="{53456102-AF98-4902-8B3F-7190DD0573D9}" type="datetimeFigureOut">
-              <a:rPr lang="de-DE" smtClean="0"/>
-              <a:t>28.11.2013</a:t>
+            <a:fld id="{D8DCA20A-278F-45B7-BBF6-0081BC7E6569}" type="datetimeFigureOut">
+              <a:rPr lang="de-DE" smtClean="0"/>
+              <a:t>23.10.2015</a:t>
             </a:fld>
             <a:endParaRPr lang="de-DE"/>
           </a:p>
@@ -499,9 +448,9 @@
           <a:bodyPr/>
           <a:lstStyle/>
           <a:p>
-            <a:fld id="{67FDEFD1-54BE-431D-8603-D353FAA53F7D}" type="slidenum">
-              <a:rPr lang="de-DE" smtClean="0"/>
-              <a:t>‹#›</a:t>
+            <a:fld id="{F527A3C2-041D-475D-913C-4FE37E2C5F43}" type="slidenum">
+              <a:rPr lang="de-DE" smtClean="0"/>
+              <a:t>‹Nr.›</a:t>
             </a:fld>
             <a:endParaRPr lang="de-DE"/>
           </a:p>
@@ -510,7 +459,7 @@
     </p:spTree>
     <p:extLst>
       <p:ext uri="{BB962C8B-B14F-4D97-AF65-F5344CB8AC3E}">
-        <p14:creationId xmlns:p14="http://schemas.microsoft.com/office/powerpoint/2010/main" val="1826262488"/>
+        <p14:creationId xmlns:p14="http://schemas.microsoft.com/office/powerpoint/2010/main" val="2620423013"/>
       </p:ext>
     </p:extLst>
   </p:cSld>
@@ -549,8 +498,8 @@
         </p:nvSpPr>
         <p:spPr>
           <a:xfrm>
-            <a:off x="6629400" y="274638"/>
-            <a:ext cx="2057400" cy="5851525"/>
+            <a:off x="8724900" y="365125"/>
+            <a:ext cx="2628900" cy="5811838"/>
           </a:xfrm>
         </p:spPr>
         <p:txBody>
@@ -577,8 +526,8 @@
         </p:nvSpPr>
         <p:spPr>
           <a:xfrm>
-            <a:off x="457200" y="274638"/>
-            <a:ext cx="6019800" cy="5851525"/>
+            <a:off x="838200" y="365125"/>
+            <a:ext cx="7734300" cy="5811838"/>
           </a:xfrm>
         </p:spPr>
         <p:txBody>
@@ -637,9 +586,9 @@
           <a:bodyPr/>
           <a:lstStyle/>
           <a:p>
-            <a:fld id="{53456102-AF98-4902-8B3F-7190DD0573D9}" type="datetimeFigureOut">
-              <a:rPr lang="de-DE" smtClean="0"/>
-              <a:t>28.11.2013</a:t>
+            <a:fld id="{D8DCA20A-278F-45B7-BBF6-0081BC7E6569}" type="datetimeFigureOut">
+              <a:rPr lang="de-DE" smtClean="0"/>
+              <a:t>23.10.2015</a:t>
             </a:fld>
             <a:endParaRPr lang="de-DE"/>
           </a:p>
@@ -679,9 +628,9 @@
           <a:bodyPr/>
           <a:lstStyle/>
           <a:p>
-            <a:fld id="{67FDEFD1-54BE-431D-8603-D353FAA53F7D}" type="slidenum">
-              <a:rPr lang="de-DE" smtClean="0"/>
-              <a:t>‹#›</a:t>
+            <a:fld id="{F527A3C2-041D-475D-913C-4FE37E2C5F43}" type="slidenum">
+              <a:rPr lang="de-DE" smtClean="0"/>
+              <a:t>‹Nr.›</a:t>
             </a:fld>
             <a:endParaRPr lang="de-DE"/>
           </a:p>
@@ -690,7 +639,7 @@
     </p:spTree>
     <p:extLst>
       <p:ext uri="{BB962C8B-B14F-4D97-AF65-F5344CB8AC3E}">
-        <p14:creationId xmlns:p14="http://schemas.microsoft.com/office/powerpoint/2010/main" val="3473563608"/>
+        <p14:creationId xmlns:p14="http://schemas.microsoft.com/office/powerpoint/2010/main" val="313815985"/>
       </p:ext>
     </p:extLst>
   </p:cSld>
@@ -807,9 +756,9 @@
           <a:bodyPr/>
           <a:lstStyle/>
           <a:p>
-            <a:fld id="{53456102-AF98-4902-8B3F-7190DD0573D9}" type="datetimeFigureOut">
-              <a:rPr lang="de-DE" smtClean="0"/>
-              <a:t>28.11.2013</a:t>
+            <a:fld id="{D8DCA20A-278F-45B7-BBF6-0081BC7E6569}" type="datetimeFigureOut">
+              <a:rPr lang="de-DE" smtClean="0"/>
+              <a:t>23.10.2015</a:t>
             </a:fld>
             <a:endParaRPr lang="de-DE"/>
           </a:p>
@@ -849,9 +798,9 @@
           <a:bodyPr/>
           <a:lstStyle/>
           <a:p>
-            <a:fld id="{67FDEFD1-54BE-431D-8603-D353FAA53F7D}" type="slidenum">
-              <a:rPr lang="de-DE" smtClean="0"/>
-              <a:t>‹#›</a:t>
+            <a:fld id="{F527A3C2-041D-475D-913C-4FE37E2C5F43}" type="slidenum">
+              <a:rPr lang="de-DE" smtClean="0"/>
+              <a:t>‹Nr.›</a:t>
             </a:fld>
             <a:endParaRPr lang="de-DE"/>
           </a:p>
@@ -860,7 +809,7 @@
     </p:spTree>
     <p:extLst>
       <p:ext uri="{BB962C8B-B14F-4D97-AF65-F5344CB8AC3E}">
-        <p14:creationId xmlns:p14="http://schemas.microsoft.com/office/powerpoint/2010/main" val="2407638600"/>
+        <p14:creationId xmlns:p14="http://schemas.microsoft.com/office/powerpoint/2010/main" val="776863482"/>
       </p:ext>
     </p:extLst>
   </p:cSld>
@@ -899,15 +848,15 @@
         </p:nvSpPr>
         <p:spPr>
           <a:xfrm>
-            <a:off x="722313" y="4406900"/>
-            <a:ext cx="7772400" cy="1362075"/>
-          </a:xfrm>
-        </p:spPr>
-        <p:txBody>
-          <a:bodyPr anchor="t"/>
+            <a:off x="831850" y="1709738"/>
+            <a:ext cx="10515600" cy="2852737"/>
+          </a:xfrm>
+        </p:spPr>
+        <p:txBody>
+          <a:bodyPr anchor="b"/>
           <a:lstStyle>
-            <a:lvl1pPr algn="l">
-              <a:defRPr sz="4000" b="1" cap="all"/>
+            <a:lvl1pPr>
+              <a:defRPr sz="6000"/>
             </a:lvl1pPr>
           </a:lstStyle>
           <a:p>
@@ -931,16 +880,16 @@
         </p:nvSpPr>
         <p:spPr>
           <a:xfrm>
-            <a:off x="722313" y="2906713"/>
-            <a:ext cx="7772400" cy="1500187"/>
-          </a:xfrm>
-        </p:spPr>
-        <p:txBody>
-          <a:bodyPr anchor="b"/>
+            <a:off x="831850" y="4589463"/>
+            <a:ext cx="10515600" cy="1500187"/>
+          </a:xfrm>
+        </p:spPr>
+        <p:txBody>
+          <a:bodyPr/>
           <a:lstStyle>
             <a:lvl1pPr marL="0" indent="0">
               <a:buNone/>
-              <a:defRPr sz="2000">
+              <a:defRPr sz="2400">
                 <a:solidFill>
                   <a:schemeClr val="tx1">
                     <a:tint val="75000"/>
@@ -950,7 +899,7 @@
             </a:lvl1pPr>
             <a:lvl2pPr marL="457200" indent="0">
               <a:buNone/>
-              <a:defRPr sz="1800">
+              <a:defRPr sz="2000">
                 <a:solidFill>
                   <a:schemeClr val="tx1">
                     <a:tint val="75000"/>
@@ -960,7 +909,7 @@
             </a:lvl2pPr>
             <a:lvl3pPr marL="914400" indent="0">
               <a:buNone/>
-              <a:defRPr sz="1600">
+              <a:defRPr sz="1800">
                 <a:solidFill>
                   <a:schemeClr val="tx1">
                     <a:tint val="75000"/>
@@ -970,7 +919,7 @@
             </a:lvl3pPr>
             <a:lvl4pPr marL="1371600" indent="0">
               <a:buNone/>
-              <a:defRPr sz="1400">
+              <a:defRPr sz="1600">
                 <a:solidFill>
                   <a:schemeClr val="tx1">
                     <a:tint val="75000"/>
@@ -980,7 +929,7 @@
             </a:lvl4pPr>
             <a:lvl5pPr marL="1828800" indent="0">
               <a:buNone/>
-              <a:defRPr sz="1400">
+              <a:defRPr sz="1600">
                 <a:solidFill>
                   <a:schemeClr val="tx1">
                     <a:tint val="75000"/>
@@ -990,7 +939,7 @@
             </a:lvl5pPr>
             <a:lvl6pPr marL="2286000" indent="0">
               <a:buNone/>
-              <a:defRPr sz="1400">
+              <a:defRPr sz="1600">
                 <a:solidFill>
                   <a:schemeClr val="tx1">
                     <a:tint val="75000"/>
@@ -1000,7 +949,7 @@
             </a:lvl6pPr>
             <a:lvl7pPr marL="2743200" indent="0">
               <a:buNone/>
-              <a:defRPr sz="1400">
+              <a:defRPr sz="1600">
                 <a:solidFill>
                   <a:schemeClr val="tx1">
                     <a:tint val="75000"/>
@@ -1010,7 +959,7 @@
             </a:lvl7pPr>
             <a:lvl8pPr marL="3200400" indent="0">
               <a:buNone/>
-              <a:defRPr sz="1400">
+              <a:defRPr sz="1600">
                 <a:solidFill>
                   <a:schemeClr val="tx1">
                     <a:tint val="75000"/>
@@ -1020,7 +969,7 @@
             </a:lvl8pPr>
             <a:lvl9pPr marL="3657600" indent="0">
               <a:buNone/>
-              <a:defRPr sz="1400">
+              <a:defRPr sz="1600">
                 <a:solidFill>
                   <a:schemeClr val="tx1">
                     <a:tint val="75000"/>
@@ -1053,9 +1002,9 @@
           <a:bodyPr/>
           <a:lstStyle/>
           <a:p>
-            <a:fld id="{53456102-AF98-4902-8B3F-7190DD0573D9}" type="datetimeFigureOut">
-              <a:rPr lang="de-DE" smtClean="0"/>
-              <a:t>28.11.2013</a:t>
+            <a:fld id="{D8DCA20A-278F-45B7-BBF6-0081BC7E6569}" type="datetimeFigureOut">
+              <a:rPr lang="de-DE" smtClean="0"/>
+              <a:t>23.10.2015</a:t>
             </a:fld>
             <a:endParaRPr lang="de-DE"/>
           </a:p>
@@ -1095,9 +1044,9 @@
           <a:bodyPr/>
           <a:lstStyle/>
           <a:p>
-            <a:fld id="{67FDEFD1-54BE-431D-8603-D353FAA53F7D}" type="slidenum">
-              <a:rPr lang="de-DE" smtClean="0"/>
-              <a:t>‹#›</a:t>
+            <a:fld id="{F527A3C2-041D-475D-913C-4FE37E2C5F43}" type="slidenum">
+              <a:rPr lang="de-DE" smtClean="0"/>
+              <a:t>‹Nr.›</a:t>
             </a:fld>
             <a:endParaRPr lang="de-DE"/>
           </a:p>
@@ -1106,7 +1055,7 @@
     </p:spTree>
     <p:extLst>
       <p:ext uri="{BB962C8B-B14F-4D97-AF65-F5344CB8AC3E}">
-        <p14:creationId xmlns:p14="http://schemas.microsoft.com/office/powerpoint/2010/main" val="1648221882"/>
+        <p14:creationId xmlns:p14="http://schemas.microsoft.com/office/powerpoint/2010/main" val="2878641486"/>
       </p:ext>
     </p:extLst>
   </p:cSld>
@@ -1168,41 +1117,13 @@
         </p:nvSpPr>
         <p:spPr>
           <a:xfrm>
-            <a:off x="457200" y="1600200"/>
-            <a:ext cx="4038600" cy="4525963"/>
-          </a:xfrm>
-        </p:spPr>
-        <p:txBody>
-          <a:bodyPr/>
-          <a:lstStyle>
-            <a:lvl1pPr>
-              <a:defRPr sz="2800"/>
-            </a:lvl1pPr>
-            <a:lvl2pPr>
-              <a:defRPr sz="2400"/>
-            </a:lvl2pPr>
-            <a:lvl3pPr>
-              <a:defRPr sz="2000"/>
-            </a:lvl3pPr>
-            <a:lvl4pPr>
-              <a:defRPr sz="1800"/>
-            </a:lvl4pPr>
-            <a:lvl5pPr>
-              <a:defRPr sz="1800"/>
-            </a:lvl5pPr>
-            <a:lvl6pPr>
-              <a:defRPr sz="1800"/>
-            </a:lvl6pPr>
-            <a:lvl7pPr>
-              <a:defRPr sz="1800"/>
-            </a:lvl7pPr>
-            <a:lvl8pPr>
-              <a:defRPr sz="1800"/>
-            </a:lvl8pPr>
-            <a:lvl9pPr>
-              <a:defRPr sz="1800"/>
-            </a:lvl9pPr>
-          </a:lstStyle>
+            <a:off x="838200" y="1825625"/>
+            <a:ext cx="5181600" cy="4351338"/>
+          </a:xfrm>
+        </p:spPr>
+        <p:txBody>
+          <a:bodyPr/>
+          <a:lstStyle/>
           <a:p>
             <a:pPr lvl="0"/>
             <a:r>
@@ -1253,41 +1174,13 @@
         </p:nvSpPr>
         <p:spPr>
           <a:xfrm>
-            <a:off x="4648200" y="1600200"/>
-            <a:ext cx="4038600" cy="4525963"/>
-          </a:xfrm>
-        </p:spPr>
-        <p:txBody>
-          <a:bodyPr/>
-          <a:lstStyle>
-            <a:lvl1pPr>
-              <a:defRPr sz="2800"/>
-            </a:lvl1pPr>
-            <a:lvl2pPr>
-              <a:defRPr sz="2400"/>
-            </a:lvl2pPr>
-            <a:lvl3pPr>
-              <a:defRPr sz="2000"/>
-            </a:lvl3pPr>
-            <a:lvl4pPr>
-              <a:defRPr sz="1800"/>
-            </a:lvl4pPr>
-            <a:lvl5pPr>
-              <a:defRPr sz="1800"/>
-            </a:lvl5pPr>
-            <a:lvl6pPr>
-              <a:defRPr sz="1800"/>
-            </a:lvl6pPr>
-            <a:lvl7pPr>
-              <a:defRPr sz="1800"/>
-            </a:lvl7pPr>
-            <a:lvl8pPr>
-              <a:defRPr sz="1800"/>
-            </a:lvl8pPr>
-            <a:lvl9pPr>
-              <a:defRPr sz="1800"/>
-            </a:lvl9pPr>
-          </a:lstStyle>
+            <a:off x="6172200" y="1825625"/>
+            <a:ext cx="5181600" cy="4351338"/>
+          </a:xfrm>
+        </p:spPr>
+        <p:txBody>
+          <a:bodyPr/>
+          <a:lstStyle/>
           <a:p>
             <a:pPr lvl="0"/>
             <a:r>
@@ -1341,9 +1234,9 @@
           <a:bodyPr/>
           <a:lstStyle/>
           <a:p>
-            <a:fld id="{53456102-AF98-4902-8B3F-7190DD0573D9}" type="datetimeFigureOut">
-              <a:rPr lang="de-DE" smtClean="0"/>
-              <a:t>28.11.2013</a:t>
+            <a:fld id="{D8DCA20A-278F-45B7-BBF6-0081BC7E6569}" type="datetimeFigureOut">
+              <a:rPr lang="de-DE" smtClean="0"/>
+              <a:t>23.10.2015</a:t>
             </a:fld>
             <a:endParaRPr lang="de-DE"/>
           </a:p>
@@ -1383,9 +1276,9 @@
           <a:bodyPr/>
           <a:lstStyle/>
           <a:p>
-            <a:fld id="{67FDEFD1-54BE-431D-8603-D353FAA53F7D}" type="slidenum">
-              <a:rPr lang="de-DE" smtClean="0"/>
-              <a:t>‹#›</a:t>
+            <a:fld id="{F527A3C2-041D-475D-913C-4FE37E2C5F43}" type="slidenum">
+              <a:rPr lang="de-DE" smtClean="0"/>
+              <a:t>‹Nr.›</a:t>
             </a:fld>
             <a:endParaRPr lang="de-DE"/>
           </a:p>
@@ -1394,7 +1287,7 @@
     </p:spTree>
     <p:extLst>
       <p:ext uri="{BB962C8B-B14F-4D97-AF65-F5344CB8AC3E}">
-        <p14:creationId xmlns:p14="http://schemas.microsoft.com/office/powerpoint/2010/main" val="3343130092"/>
+        <p14:creationId xmlns:p14="http://schemas.microsoft.com/office/powerpoint/2010/main" val="3136625607"/>
       </p:ext>
     </p:extLst>
   </p:cSld>
@@ -1431,14 +1324,15 @@
             <p:ph type="title"/>
           </p:nvPr>
         </p:nvSpPr>
-        <p:spPr/>
-        <p:txBody>
-          <a:bodyPr/>
-          <a:lstStyle>
-            <a:lvl1pPr>
-              <a:defRPr/>
-            </a:lvl1pPr>
-          </a:lstStyle>
+        <p:spPr>
+          <a:xfrm>
+            <a:off x="839788" y="365125"/>
+            <a:ext cx="10515600" cy="1325563"/>
+          </a:xfrm>
+        </p:spPr>
+        <p:txBody>
+          <a:bodyPr/>
+          <a:lstStyle/>
           <a:p>
             <a:r>
               <a:rPr lang="de-DE" smtClean="0"/>
@@ -1460,8 +1354,8 @@
         </p:nvSpPr>
         <p:spPr>
           <a:xfrm>
-            <a:off x="457200" y="1535113"/>
-            <a:ext cx="4040188" cy="639762"/>
+            <a:off x="839788" y="1681163"/>
+            <a:ext cx="5157787" cy="823912"/>
           </a:xfrm>
         </p:spPr>
         <p:txBody>
@@ -1525,41 +1419,13 @@
         </p:nvSpPr>
         <p:spPr>
           <a:xfrm>
-            <a:off x="457200" y="2174875"/>
-            <a:ext cx="4040188" cy="3951288"/>
-          </a:xfrm>
-        </p:spPr>
-        <p:txBody>
-          <a:bodyPr/>
-          <a:lstStyle>
-            <a:lvl1pPr>
-              <a:defRPr sz="2400"/>
-            </a:lvl1pPr>
-            <a:lvl2pPr>
-              <a:defRPr sz="2000"/>
-            </a:lvl2pPr>
-            <a:lvl3pPr>
-              <a:defRPr sz="1800"/>
-            </a:lvl3pPr>
-            <a:lvl4pPr>
-              <a:defRPr sz="1600"/>
-            </a:lvl4pPr>
-            <a:lvl5pPr>
-              <a:defRPr sz="1600"/>
-            </a:lvl5pPr>
-            <a:lvl6pPr>
-              <a:defRPr sz="1600"/>
-            </a:lvl6pPr>
-            <a:lvl7pPr>
-              <a:defRPr sz="1600"/>
-            </a:lvl7pPr>
-            <a:lvl8pPr>
-              <a:defRPr sz="1600"/>
-            </a:lvl8pPr>
-            <a:lvl9pPr>
-              <a:defRPr sz="1600"/>
-            </a:lvl9pPr>
-          </a:lstStyle>
+            <a:off x="839788" y="2505075"/>
+            <a:ext cx="5157787" cy="3684588"/>
+          </a:xfrm>
+        </p:spPr>
+        <p:txBody>
+          <a:bodyPr/>
+          <a:lstStyle/>
           <a:p>
             <a:pPr lvl="0"/>
             <a:r>
@@ -1610,8 +1476,8 @@
         </p:nvSpPr>
         <p:spPr>
           <a:xfrm>
-            <a:off x="4645025" y="1535113"/>
-            <a:ext cx="4041775" cy="639762"/>
+            <a:off x="6172200" y="1681163"/>
+            <a:ext cx="5183188" cy="823912"/>
           </a:xfrm>
         </p:spPr>
         <p:txBody>
@@ -1675,41 +1541,13 @@
         </p:nvSpPr>
         <p:spPr>
           <a:xfrm>
-            <a:off x="4645025" y="2174875"/>
-            <a:ext cx="4041775" cy="3951288"/>
-          </a:xfrm>
-        </p:spPr>
-        <p:txBody>
-          <a:bodyPr/>
-          <a:lstStyle>
-            <a:lvl1pPr>
-              <a:defRPr sz="2400"/>
-            </a:lvl1pPr>
-            <a:lvl2pPr>
-              <a:defRPr sz="2000"/>
-            </a:lvl2pPr>
-            <a:lvl3pPr>
-              <a:defRPr sz="1800"/>
-            </a:lvl3pPr>
-            <a:lvl4pPr>
-              <a:defRPr sz="1600"/>
-            </a:lvl4pPr>
-            <a:lvl5pPr>
-              <a:defRPr sz="1600"/>
-            </a:lvl5pPr>
-            <a:lvl6pPr>
-              <a:defRPr sz="1600"/>
-            </a:lvl6pPr>
-            <a:lvl7pPr>
-              <a:defRPr sz="1600"/>
-            </a:lvl7pPr>
-            <a:lvl8pPr>
-              <a:defRPr sz="1600"/>
-            </a:lvl8pPr>
-            <a:lvl9pPr>
-              <a:defRPr sz="1600"/>
-            </a:lvl9pPr>
-          </a:lstStyle>
+            <a:off x="6172200" y="2505075"/>
+            <a:ext cx="5183188" cy="3684588"/>
+          </a:xfrm>
+        </p:spPr>
+        <p:txBody>
+          <a:bodyPr/>
+          <a:lstStyle/>
           <a:p>
             <a:pPr lvl="0"/>
             <a:r>
@@ -1763,9 +1601,9 @@
           <a:bodyPr/>
           <a:lstStyle/>
           <a:p>
-            <a:fld id="{53456102-AF98-4902-8B3F-7190DD0573D9}" type="datetimeFigureOut">
-              <a:rPr lang="de-DE" smtClean="0"/>
-              <a:t>28.11.2013</a:t>
+            <a:fld id="{D8DCA20A-278F-45B7-BBF6-0081BC7E6569}" type="datetimeFigureOut">
+              <a:rPr lang="de-DE" smtClean="0"/>
+              <a:t>23.10.2015</a:t>
             </a:fld>
             <a:endParaRPr lang="de-DE"/>
           </a:p>
@@ -1805,9 +1643,9 @@
           <a:bodyPr/>
           <a:lstStyle/>
           <a:p>
-            <a:fld id="{67FDEFD1-54BE-431D-8603-D353FAA53F7D}" type="slidenum">
-              <a:rPr lang="de-DE" smtClean="0"/>
-              <a:t>‹#›</a:t>
+            <a:fld id="{F527A3C2-041D-475D-913C-4FE37E2C5F43}" type="slidenum">
+              <a:rPr lang="de-DE" smtClean="0"/>
+              <a:t>‹Nr.›</a:t>
             </a:fld>
             <a:endParaRPr lang="de-DE"/>
           </a:p>
@@ -1816,7 +1654,7 @@
     </p:spTree>
     <p:extLst>
       <p:ext uri="{BB962C8B-B14F-4D97-AF65-F5344CB8AC3E}">
-        <p14:creationId xmlns:p14="http://schemas.microsoft.com/office/powerpoint/2010/main" val="2670162064"/>
+        <p14:creationId xmlns:p14="http://schemas.microsoft.com/office/powerpoint/2010/main" val="2314900970"/>
       </p:ext>
     </p:extLst>
   </p:cSld>
@@ -1881,9 +1719,9 @@
           <a:bodyPr/>
           <a:lstStyle/>
           <a:p>
-            <a:fld id="{53456102-AF98-4902-8B3F-7190DD0573D9}" type="datetimeFigureOut">
-              <a:rPr lang="de-DE" smtClean="0"/>
-              <a:t>28.11.2013</a:t>
+            <a:fld id="{D8DCA20A-278F-45B7-BBF6-0081BC7E6569}" type="datetimeFigureOut">
+              <a:rPr lang="de-DE" smtClean="0"/>
+              <a:t>23.10.2015</a:t>
             </a:fld>
             <a:endParaRPr lang="de-DE"/>
           </a:p>
@@ -1923,9 +1761,9 @@
           <a:bodyPr/>
           <a:lstStyle/>
           <a:p>
-            <a:fld id="{67FDEFD1-54BE-431D-8603-D353FAA53F7D}" type="slidenum">
-              <a:rPr lang="de-DE" smtClean="0"/>
-              <a:t>‹#›</a:t>
+            <a:fld id="{F527A3C2-041D-475D-913C-4FE37E2C5F43}" type="slidenum">
+              <a:rPr lang="de-DE" smtClean="0"/>
+              <a:t>‹Nr.›</a:t>
             </a:fld>
             <a:endParaRPr lang="de-DE"/>
           </a:p>
@@ -1934,7 +1772,7 @@
     </p:spTree>
     <p:extLst>
       <p:ext uri="{BB962C8B-B14F-4D97-AF65-F5344CB8AC3E}">
-        <p14:creationId xmlns:p14="http://schemas.microsoft.com/office/powerpoint/2010/main" val="4195306032"/>
+        <p14:creationId xmlns:p14="http://schemas.microsoft.com/office/powerpoint/2010/main" val="3782067036"/>
       </p:ext>
     </p:extLst>
   </p:cSld>
@@ -1976,9 +1814,9 @@
           <a:bodyPr/>
           <a:lstStyle/>
           <a:p>
-            <a:fld id="{53456102-AF98-4902-8B3F-7190DD0573D9}" type="datetimeFigureOut">
-              <a:rPr lang="de-DE" smtClean="0"/>
-              <a:t>28.11.2013</a:t>
+            <a:fld id="{D8DCA20A-278F-45B7-BBF6-0081BC7E6569}" type="datetimeFigureOut">
+              <a:rPr lang="de-DE" smtClean="0"/>
+              <a:t>23.10.2015</a:t>
             </a:fld>
             <a:endParaRPr lang="de-DE"/>
           </a:p>
@@ -2018,9 +1856,9 @@
           <a:bodyPr/>
           <a:lstStyle/>
           <a:p>
-            <a:fld id="{67FDEFD1-54BE-431D-8603-D353FAA53F7D}" type="slidenum">
-              <a:rPr lang="de-DE" smtClean="0"/>
-              <a:t>‹#›</a:t>
+            <a:fld id="{F527A3C2-041D-475D-913C-4FE37E2C5F43}" type="slidenum">
+              <a:rPr lang="de-DE" smtClean="0"/>
+              <a:t>‹Nr.›</a:t>
             </a:fld>
             <a:endParaRPr lang="de-DE"/>
           </a:p>
@@ -2029,7 +1867,7 @@
     </p:spTree>
     <p:extLst>
       <p:ext uri="{BB962C8B-B14F-4D97-AF65-F5344CB8AC3E}">
-        <p14:creationId xmlns:p14="http://schemas.microsoft.com/office/powerpoint/2010/main" val="3145296832"/>
+        <p14:creationId xmlns:p14="http://schemas.microsoft.com/office/powerpoint/2010/main" val="3889785022"/>
       </p:ext>
     </p:extLst>
   </p:cSld>
@@ -2068,15 +1906,15 @@
         </p:nvSpPr>
         <p:spPr>
           <a:xfrm>
-            <a:off x="457200" y="273050"/>
-            <a:ext cx="3008313" cy="1162050"/>
+            <a:off x="839788" y="457200"/>
+            <a:ext cx="3932237" cy="1600200"/>
           </a:xfrm>
         </p:spPr>
         <p:txBody>
           <a:bodyPr anchor="b"/>
           <a:lstStyle>
-            <a:lvl1pPr algn="l">
-              <a:defRPr sz="2000" b="1"/>
+            <a:lvl1pPr>
+              <a:defRPr sz="3200"/>
             </a:lvl1pPr>
           </a:lstStyle>
           <a:p>
@@ -2100,8 +1938,8 @@
         </p:nvSpPr>
         <p:spPr>
           <a:xfrm>
-            <a:off x="3575050" y="273050"/>
-            <a:ext cx="5111750" cy="5853113"/>
+            <a:off x="5183188" y="987425"/>
+            <a:ext cx="6172200" cy="4873625"/>
           </a:xfrm>
         </p:spPr>
         <p:txBody>
@@ -2185,8 +2023,8 @@
         </p:nvSpPr>
         <p:spPr>
           <a:xfrm>
-            <a:off x="457200" y="1435100"/>
-            <a:ext cx="3008313" cy="4691063"/>
+            <a:off x="839788" y="2057400"/>
+            <a:ext cx="3932237" cy="3811588"/>
           </a:xfrm>
         </p:spPr>
         <p:txBody>
@@ -2194,39 +2032,39 @@
           <a:lstStyle>
             <a:lvl1pPr marL="0" indent="0">
               <a:buNone/>
-              <a:defRPr sz="1400"/>
+              <a:defRPr sz="1600"/>
             </a:lvl1pPr>
             <a:lvl2pPr marL="457200" indent="0">
               <a:buNone/>
-              <a:defRPr sz="1200"/>
+              <a:defRPr sz="1400"/>
             </a:lvl2pPr>
             <a:lvl3pPr marL="914400" indent="0">
               <a:buNone/>
-              <a:defRPr sz="1000"/>
+              <a:defRPr sz="1200"/>
             </a:lvl3pPr>
             <a:lvl4pPr marL="1371600" indent="0">
               <a:buNone/>
-              <a:defRPr sz="900"/>
+              <a:defRPr sz="1000"/>
             </a:lvl4pPr>
             <a:lvl5pPr marL="1828800" indent="0">
               <a:buNone/>
-              <a:defRPr sz="900"/>
+              <a:defRPr sz="1000"/>
             </a:lvl5pPr>
             <a:lvl6pPr marL="2286000" indent="0">
               <a:buNone/>
-              <a:defRPr sz="900"/>
+              <a:defRPr sz="1000"/>
             </a:lvl6pPr>
             <a:lvl7pPr marL="2743200" indent="0">
               <a:buNone/>
-              <a:defRPr sz="900"/>
+              <a:defRPr sz="1000"/>
             </a:lvl7pPr>
             <a:lvl8pPr marL="3200400" indent="0">
               <a:buNone/>
-              <a:defRPr sz="900"/>
+              <a:defRPr sz="1000"/>
             </a:lvl8pPr>
             <a:lvl9pPr marL="3657600" indent="0">
               <a:buNone/>
-              <a:defRPr sz="900"/>
+              <a:defRPr sz="1000"/>
             </a:lvl9pPr>
           </a:lstStyle>
           <a:p>
@@ -2253,9 +2091,9 @@
           <a:bodyPr/>
           <a:lstStyle/>
           <a:p>
-            <a:fld id="{53456102-AF98-4902-8B3F-7190DD0573D9}" type="datetimeFigureOut">
-              <a:rPr lang="de-DE" smtClean="0"/>
-              <a:t>28.11.2013</a:t>
+            <a:fld id="{D8DCA20A-278F-45B7-BBF6-0081BC7E6569}" type="datetimeFigureOut">
+              <a:rPr lang="de-DE" smtClean="0"/>
+              <a:t>23.10.2015</a:t>
             </a:fld>
             <a:endParaRPr lang="de-DE"/>
           </a:p>
@@ -2295,9 +2133,9 @@
           <a:bodyPr/>
           <a:lstStyle/>
           <a:p>
-            <a:fld id="{67FDEFD1-54BE-431D-8603-D353FAA53F7D}" type="slidenum">
-              <a:rPr lang="de-DE" smtClean="0"/>
-              <a:t>‹#›</a:t>
+            <a:fld id="{F527A3C2-041D-475D-913C-4FE37E2C5F43}" type="slidenum">
+              <a:rPr lang="de-DE" smtClean="0"/>
+              <a:t>‹Nr.›</a:t>
             </a:fld>
             <a:endParaRPr lang="de-DE"/>
           </a:p>
@@ -2306,7 +2144,7 @@
     </p:spTree>
     <p:extLst>
       <p:ext uri="{BB962C8B-B14F-4D97-AF65-F5344CB8AC3E}">
-        <p14:creationId xmlns:p14="http://schemas.microsoft.com/office/powerpoint/2010/main" val="800779942"/>
+        <p14:creationId xmlns:p14="http://schemas.microsoft.com/office/powerpoint/2010/main" val="3600050160"/>
       </p:ext>
     </p:extLst>
   </p:cSld>
@@ -2345,15 +2183,15 @@
         </p:nvSpPr>
         <p:spPr>
           <a:xfrm>
-            <a:off x="1792288" y="4800600"/>
-            <a:ext cx="5486400" cy="566738"/>
+            <a:off x="839788" y="457200"/>
+            <a:ext cx="3932237" cy="1600200"/>
           </a:xfrm>
         </p:spPr>
         <p:txBody>
           <a:bodyPr anchor="b"/>
           <a:lstStyle>
-            <a:lvl1pPr algn="l">
-              <a:defRPr sz="2000" b="1"/>
+            <a:lvl1pPr>
+              <a:defRPr sz="3200"/>
             </a:lvl1pPr>
           </a:lstStyle>
           <a:p>
@@ -2377,8 +2215,8 @@
         </p:nvSpPr>
         <p:spPr>
           <a:xfrm>
-            <a:off x="1792288" y="612775"/>
-            <a:ext cx="5486400" cy="4114800"/>
+            <a:off x="5183188" y="987425"/>
+            <a:ext cx="6172200" cy="4873625"/>
           </a:xfrm>
         </p:spPr>
         <p:txBody>
@@ -2438,8 +2276,8 @@
         </p:nvSpPr>
         <p:spPr>
           <a:xfrm>
-            <a:off x="1792288" y="5367338"/>
-            <a:ext cx="5486400" cy="804862"/>
+            <a:off x="839788" y="2057400"/>
+            <a:ext cx="3932237" cy="3811588"/>
           </a:xfrm>
         </p:spPr>
         <p:txBody>
@@ -2447,39 +2285,39 @@
           <a:lstStyle>
             <a:lvl1pPr marL="0" indent="0">
               <a:buNone/>
-              <a:defRPr sz="1400"/>
+              <a:defRPr sz="1600"/>
             </a:lvl1pPr>
             <a:lvl2pPr marL="457200" indent="0">
               <a:buNone/>
-              <a:defRPr sz="1200"/>
+              <a:defRPr sz="1400"/>
             </a:lvl2pPr>
             <a:lvl3pPr marL="914400" indent="0">
               <a:buNone/>
-              <a:defRPr sz="1000"/>
+              <a:defRPr sz="1200"/>
             </a:lvl3pPr>
             <a:lvl4pPr marL="1371600" indent="0">
               <a:buNone/>
-              <a:defRPr sz="900"/>
+              <a:defRPr sz="1000"/>
             </a:lvl4pPr>
             <a:lvl5pPr marL="1828800" indent="0">
               <a:buNone/>
-              <a:defRPr sz="900"/>
+              <a:defRPr sz="1000"/>
             </a:lvl5pPr>
             <a:lvl6pPr marL="2286000" indent="0">
               <a:buNone/>
-              <a:defRPr sz="900"/>
+              <a:defRPr sz="1000"/>
             </a:lvl6pPr>
             <a:lvl7pPr marL="2743200" indent="0">
               <a:buNone/>
-              <a:defRPr sz="900"/>
+              <a:defRPr sz="1000"/>
             </a:lvl7pPr>
             <a:lvl8pPr marL="3200400" indent="0">
               <a:buNone/>
-              <a:defRPr sz="900"/>
+              <a:defRPr sz="1000"/>
             </a:lvl8pPr>
             <a:lvl9pPr marL="3657600" indent="0">
               <a:buNone/>
-              <a:defRPr sz="900"/>
+              <a:defRPr sz="1000"/>
             </a:lvl9pPr>
           </a:lstStyle>
           <a:p>
@@ -2506,9 +2344,9 @@
           <a:bodyPr/>
           <a:lstStyle/>
           <a:p>
-            <a:fld id="{53456102-AF98-4902-8B3F-7190DD0573D9}" type="datetimeFigureOut">
-              <a:rPr lang="de-DE" smtClean="0"/>
-              <a:t>28.11.2013</a:t>
+            <a:fld id="{D8DCA20A-278F-45B7-BBF6-0081BC7E6569}" type="datetimeFigureOut">
+              <a:rPr lang="de-DE" smtClean="0"/>
+              <a:t>23.10.2015</a:t>
             </a:fld>
             <a:endParaRPr lang="de-DE"/>
           </a:p>
@@ -2548,9 +2386,9 @@
           <a:bodyPr/>
           <a:lstStyle/>
           <a:p>
-            <a:fld id="{67FDEFD1-54BE-431D-8603-D353FAA53F7D}" type="slidenum">
-              <a:rPr lang="de-DE" smtClean="0"/>
-              <a:t>‹#›</a:t>
+            <a:fld id="{F527A3C2-041D-475D-913C-4FE37E2C5F43}" type="slidenum">
+              <a:rPr lang="de-DE" smtClean="0"/>
+              <a:t>‹Nr.›</a:t>
             </a:fld>
             <a:endParaRPr lang="de-DE"/>
           </a:p>
@@ -2559,7 +2397,7 @@
     </p:spTree>
     <p:extLst>
       <p:ext uri="{BB962C8B-B14F-4D97-AF65-F5344CB8AC3E}">
-        <p14:creationId xmlns:p14="http://schemas.microsoft.com/office/powerpoint/2010/main" val="852247039"/>
+        <p14:creationId xmlns:p14="http://schemas.microsoft.com/office/powerpoint/2010/main" val="4103353762"/>
       </p:ext>
     </p:extLst>
   </p:cSld>
@@ -2603,8 +2441,8 @@
         </p:nvSpPr>
         <p:spPr>
           <a:xfrm>
-            <a:off x="457200" y="274638"/>
-            <a:ext cx="8229600" cy="1143000"/>
+            <a:off x="838200" y="365125"/>
+            <a:ext cx="10515600" cy="1325563"/>
           </a:xfrm>
           <a:prstGeom prst="rect">
             <a:avLst/>
@@ -2636,8 +2474,8 @@
         </p:nvSpPr>
         <p:spPr>
           <a:xfrm>
-            <a:off x="457200" y="1600200"/>
-            <a:ext cx="8229600" cy="4525963"/>
+            <a:off x="838200" y="1825625"/>
+            <a:ext cx="10515600" cy="4351338"/>
           </a:xfrm>
           <a:prstGeom prst="rect">
             <a:avLst/>
@@ -2698,8 +2536,8 @@
         </p:nvSpPr>
         <p:spPr>
           <a:xfrm>
-            <a:off x="457200" y="6356350"/>
-            <a:ext cx="2133600" cy="365125"/>
+            <a:off x="838200" y="6356350"/>
+            <a:ext cx="2743200" cy="365125"/>
           </a:xfrm>
           <a:prstGeom prst="rect">
             <a:avLst/>
@@ -2719,9 +2557,9 @@
             </a:lvl1pPr>
           </a:lstStyle>
           <a:p>
-            <a:fld id="{53456102-AF98-4902-8B3F-7190DD0573D9}" type="datetimeFigureOut">
-              <a:rPr lang="de-DE" smtClean="0"/>
-              <a:t>28.11.2013</a:t>
+            <a:fld id="{D8DCA20A-278F-45B7-BBF6-0081BC7E6569}" type="datetimeFigureOut">
+              <a:rPr lang="de-DE" smtClean="0"/>
+              <a:t>23.10.2015</a:t>
             </a:fld>
             <a:endParaRPr lang="de-DE"/>
           </a:p>
@@ -2739,8 +2577,8 @@
         </p:nvSpPr>
         <p:spPr>
           <a:xfrm>
-            <a:off x="3124200" y="6356350"/>
-            <a:ext cx="2895600" cy="365125"/>
+            <a:off x="4038600" y="6356350"/>
+            <a:ext cx="4114800" cy="365125"/>
           </a:xfrm>
           <a:prstGeom prst="rect">
             <a:avLst/>
@@ -2776,8 +2614,8 @@
         </p:nvSpPr>
         <p:spPr>
           <a:xfrm>
-            <a:off x="6553200" y="6356350"/>
-            <a:ext cx="2133600" cy="365125"/>
+            <a:off x="8610600" y="6356350"/>
+            <a:ext cx="2743200" cy="365125"/>
           </a:xfrm>
           <a:prstGeom prst="rect">
             <a:avLst/>
@@ -2797,9 +2635,9 @@
             </a:lvl1pPr>
           </a:lstStyle>
           <a:p>
-            <a:fld id="{67FDEFD1-54BE-431D-8603-D353FAA53F7D}" type="slidenum">
-              <a:rPr lang="de-DE" smtClean="0"/>
-              <a:t>‹#›</a:t>
+            <a:fld id="{F527A3C2-041D-475D-913C-4FE37E2C5F43}" type="slidenum">
+              <a:rPr lang="de-DE" smtClean="0"/>
+              <a:t>‹Nr.›</a:t>
             </a:fld>
             <a:endParaRPr lang="de-DE"/>
           </a:p>
@@ -2808,7 +2646,7 @@
     </p:spTree>
     <p:extLst>
       <p:ext uri="{BB962C8B-B14F-4D97-AF65-F5344CB8AC3E}">
-        <p14:creationId xmlns:p14="http://schemas.microsoft.com/office/powerpoint/2010/main" val="3639399178"/>
+        <p14:creationId xmlns:p14="http://schemas.microsoft.com/office/powerpoint/2010/main" val="3416393335"/>
       </p:ext>
     </p:extLst>
   </p:cSld>
@@ -2828,7 +2666,10 @@
   </p:sldLayoutIdLst>
   <p:txStyles>
     <p:titleStyle>
-      <a:lvl1pPr algn="ctr" defTabSz="914400" rtl="0" eaLnBrk="1" latinLnBrk="0" hangingPunct="1">
+      <a:lvl1pPr algn="l" defTabSz="914400" rtl="0" eaLnBrk="1" latinLnBrk="0" hangingPunct="1">
+        <a:lnSpc>
+          <a:spcPct val="90000"/>
+        </a:lnSpc>
         <a:spcBef>
           <a:spcPct val="0"/>
         </a:spcBef>
@@ -2844,13 +2685,16 @@
       </a:lvl1pPr>
     </p:titleStyle>
     <p:bodyStyle>
-      <a:lvl1pPr marL="342900" indent="-342900" algn="l" defTabSz="914400" rtl="0" eaLnBrk="1" latinLnBrk="0" hangingPunct="1">
+      <a:lvl1pPr marL="228600" indent="-228600" algn="l" defTabSz="914400" rtl="0" eaLnBrk="1" latinLnBrk="0" hangingPunct="1">
+        <a:lnSpc>
+          <a:spcPct val="90000"/>
+        </a:lnSpc>
         <a:spcBef>
-          <a:spcPct val="20000"/>
+          <a:spcPts val="1000"/>
         </a:spcBef>
-        <a:buFont typeface="Arial" pitchFamily="34" charset="0"/>
+        <a:buFont typeface="Arial" panose="020B0604020202020204" pitchFamily="34" charset="0"/>
         <a:buChar char="•"/>
-        <a:defRPr sz="3200" kern="1200">
+        <a:defRPr sz="2800" kern="1200">
           <a:solidFill>
             <a:schemeClr val="tx1"/>
           </a:solidFill>
@@ -2859,13 +2703,16 @@
           <a:cs typeface="+mn-cs"/>
         </a:defRPr>
       </a:lvl1pPr>
-      <a:lvl2pPr marL="742950" indent="-285750" algn="l" defTabSz="914400" rtl="0" eaLnBrk="1" latinLnBrk="0" hangingPunct="1">
+      <a:lvl2pPr marL="685800" indent="-228600" algn="l" defTabSz="914400" rtl="0" eaLnBrk="1" latinLnBrk="0" hangingPunct="1">
+        <a:lnSpc>
+          <a:spcPct val="90000"/>
+        </a:lnSpc>
         <a:spcBef>
-          <a:spcPct val="20000"/>
+          <a:spcPts val="500"/>
         </a:spcBef>
-        <a:buFont typeface="Arial" pitchFamily="34" charset="0"/>
-        <a:buChar char="–"/>
-        <a:defRPr sz="2800" kern="1200">
+        <a:buFont typeface="Arial" panose="020B0604020202020204" pitchFamily="34" charset="0"/>
+        <a:buChar char="•"/>
+        <a:defRPr sz="2400" kern="1200">
           <a:solidFill>
             <a:schemeClr val="tx1"/>
           </a:solidFill>
@@ -2875,12 +2722,15 @@
         </a:defRPr>
       </a:lvl2pPr>
       <a:lvl3pPr marL="1143000" indent="-228600" algn="l" defTabSz="914400" rtl="0" eaLnBrk="1" latinLnBrk="0" hangingPunct="1">
+        <a:lnSpc>
+          <a:spcPct val="90000"/>
+        </a:lnSpc>
         <a:spcBef>
-          <a:spcPct val="20000"/>
+          <a:spcPts val="500"/>
         </a:spcBef>
-        <a:buFont typeface="Arial" pitchFamily="34" charset="0"/>
+        <a:buFont typeface="Arial" panose="020B0604020202020204" pitchFamily="34" charset="0"/>
         <a:buChar char="•"/>
-        <a:defRPr sz="2400" kern="1200">
+        <a:defRPr sz="2000" kern="1200">
           <a:solidFill>
             <a:schemeClr val="tx1"/>
           </a:solidFill>
@@ -2890,12 +2740,15 @@
         </a:defRPr>
       </a:lvl3pPr>
       <a:lvl4pPr marL="1600200" indent="-228600" algn="l" defTabSz="914400" rtl="0" eaLnBrk="1" latinLnBrk="0" hangingPunct="1">
+        <a:lnSpc>
+          <a:spcPct val="90000"/>
+        </a:lnSpc>
         <a:spcBef>
-          <a:spcPct val="20000"/>
+          <a:spcPts val="500"/>
         </a:spcBef>
-        <a:buFont typeface="Arial" pitchFamily="34" charset="0"/>
-        <a:buChar char="–"/>
-        <a:defRPr sz="2000" kern="1200">
+        <a:buFont typeface="Arial" panose="020B0604020202020204" pitchFamily="34" charset="0"/>
+        <a:buChar char="•"/>
+        <a:defRPr sz="1800" kern="1200">
           <a:solidFill>
             <a:schemeClr val="tx1"/>
           </a:solidFill>
@@ -2905,12 +2758,15 @@
         </a:defRPr>
       </a:lvl4pPr>
       <a:lvl5pPr marL="2057400" indent="-228600" algn="l" defTabSz="914400" rtl="0" eaLnBrk="1" latinLnBrk="0" hangingPunct="1">
+        <a:lnSpc>
+          <a:spcPct val="90000"/>
+        </a:lnSpc>
         <a:spcBef>
-          <a:spcPct val="20000"/>
+          <a:spcPts val="500"/>
         </a:spcBef>
-        <a:buFont typeface="Arial" pitchFamily="34" charset="0"/>
-        <a:buChar char="»"/>
-        <a:defRPr sz="2000" kern="1200">
+        <a:buFont typeface="Arial" panose="020B0604020202020204" pitchFamily="34" charset="0"/>
+        <a:buChar char="•"/>
+        <a:defRPr sz="1800" kern="1200">
           <a:solidFill>
             <a:schemeClr val="tx1"/>
           </a:solidFill>
@@ -2920,12 +2776,15 @@
         </a:defRPr>
       </a:lvl5pPr>
       <a:lvl6pPr marL="2514600" indent="-228600" algn="l" defTabSz="914400" rtl="0" eaLnBrk="1" latinLnBrk="0" hangingPunct="1">
+        <a:lnSpc>
+          <a:spcPct val="90000"/>
+        </a:lnSpc>
         <a:spcBef>
-          <a:spcPct val="20000"/>
+          <a:spcPts val="500"/>
         </a:spcBef>
-        <a:buFont typeface="Arial" pitchFamily="34" charset="0"/>
+        <a:buFont typeface="Arial" panose="020B0604020202020204" pitchFamily="34" charset="0"/>
         <a:buChar char="•"/>
-        <a:defRPr sz="2000" kern="1200">
+        <a:defRPr sz="1800" kern="1200">
           <a:solidFill>
             <a:schemeClr val="tx1"/>
           </a:solidFill>
@@ -2935,12 +2794,15 @@
         </a:defRPr>
       </a:lvl6pPr>
       <a:lvl7pPr marL="2971800" indent="-228600" algn="l" defTabSz="914400" rtl="0" eaLnBrk="1" latinLnBrk="0" hangingPunct="1">
+        <a:lnSpc>
+          <a:spcPct val="90000"/>
+        </a:lnSpc>
         <a:spcBef>
-          <a:spcPct val="20000"/>
+          <a:spcPts val="500"/>
         </a:spcBef>
-        <a:buFont typeface="Arial" pitchFamily="34" charset="0"/>
+        <a:buFont typeface="Arial" panose="020B0604020202020204" pitchFamily="34" charset="0"/>
         <a:buChar char="•"/>
-        <a:defRPr sz="2000" kern="1200">
+        <a:defRPr sz="1800" kern="1200">
           <a:solidFill>
             <a:schemeClr val="tx1"/>
           </a:solidFill>
@@ -2950,12 +2812,15 @@
         </a:defRPr>
       </a:lvl7pPr>
       <a:lvl8pPr marL="3429000" indent="-228600" algn="l" defTabSz="914400" rtl="0" eaLnBrk="1" latinLnBrk="0" hangingPunct="1">
+        <a:lnSpc>
+          <a:spcPct val="90000"/>
+        </a:lnSpc>
         <a:spcBef>
-          <a:spcPct val="20000"/>
+          <a:spcPts val="500"/>
         </a:spcBef>
-        <a:buFont typeface="Arial" pitchFamily="34" charset="0"/>
+        <a:buFont typeface="Arial" panose="020B0604020202020204" pitchFamily="34" charset="0"/>
         <a:buChar char="•"/>
-        <a:defRPr sz="2000" kern="1200">
+        <a:defRPr sz="1800" kern="1200">
           <a:solidFill>
             <a:schemeClr val="tx1"/>
           </a:solidFill>
@@ -2965,12 +2830,15 @@
         </a:defRPr>
       </a:lvl8pPr>
       <a:lvl9pPr marL="3886200" indent="-228600" algn="l" defTabSz="914400" rtl="0" eaLnBrk="1" latinLnBrk="0" hangingPunct="1">
+        <a:lnSpc>
+          <a:spcPct val="90000"/>
+        </a:lnSpc>
         <a:spcBef>
-          <a:spcPct val="20000"/>
+          <a:spcPts val="500"/>
         </a:spcBef>
-        <a:buFont typeface="Arial" pitchFamily="34" charset="0"/>
+        <a:buFont typeface="Arial" panose="020B0604020202020204" pitchFamily="34" charset="0"/>
         <a:buChar char="•"/>
-        <a:defRPr sz="2000" kern="1200">
+        <a:defRPr sz="1800" kern="1200">
           <a:solidFill>
             <a:schemeClr val="tx1"/>
           </a:solidFill>
@@ -3104,7 +2972,7 @@
         </p:nvSpPr>
         <p:spPr>
           <a:xfrm>
-            <a:off x="3635896" y="419944"/>
+            <a:off x="5159896" y="419944"/>
             <a:ext cx="1008112" cy="720080"/>
           </a:xfrm>
           <a:prstGeom prst="ellipse">
@@ -3141,7 +3009,7 @@
           <a:p>
             <a:pPr algn="ctr"/>
             <a:r>
-              <a:rPr lang="de-DE" sz="1000" b="1" dirty="0">
+              <a:rPr lang="de-DE" sz="1000" b="1">
                 <a:solidFill>
                   <a:schemeClr val="tx1"/>
                 </a:solidFill>
@@ -3159,7 +3027,7 @@
         </p:nvSpPr>
         <p:spPr>
           <a:xfrm>
-            <a:off x="3635896" y="1772816"/>
+            <a:off x="5159896" y="1772816"/>
             <a:ext cx="1008112" cy="720080"/>
           </a:xfrm>
           <a:prstGeom prst="ellipse">
@@ -3196,22 +3064,6 @@
                   <a:schemeClr val="tx1"/>
                 </a:solidFill>
               </a:rPr>
-              <a:t>CLAIMED</a:t>
-            </a:r>
-            <a:r>
-              <a:rPr lang="de-DE" sz="1000" dirty="0" smtClean="0">
-                <a:solidFill>
-                  <a:schemeClr val="tx1"/>
-                </a:solidFill>
-              </a:rPr>
-              <a:t>/ </a:t>
-            </a:r>
-            <a:r>
-              <a:rPr lang="de-DE" sz="1000" b="1" dirty="0" smtClean="0">
-                <a:solidFill>
-                  <a:schemeClr val="tx1"/>
-                </a:solidFill>
-              </a:rPr>
               <a:t>ASSIGNED</a:t>
             </a:r>
             <a:endParaRPr lang="de-DE" sz="1000" b="1" dirty="0">
@@ -3230,7 +3082,7 @@
         </p:nvSpPr>
         <p:spPr>
           <a:xfrm>
-            <a:off x="3635896" y="3240792"/>
+            <a:off x="5159896" y="3240792"/>
             <a:ext cx="1008112" cy="720080"/>
           </a:xfrm>
           <a:prstGeom prst="ellipse">
@@ -3262,14 +3114,14 @@
           <a:p>
             <a:pPr algn="ctr"/>
             <a:r>
-              <a:rPr lang="de-DE" sz="1000" b="1" dirty="0" smtClean="0">
+              <a:rPr lang="de-DE" sz="1000" b="1">
                 <a:solidFill>
                   <a:schemeClr val="tx1"/>
                 </a:solidFill>
               </a:rPr>
               <a:t>COMPLETED</a:t>
             </a:r>
-            <a:endParaRPr lang="de-DE" sz="1000" b="1" dirty="0">
+            <a:endParaRPr lang="de-DE" sz="1000" b="1">
               <a:solidFill>
                 <a:schemeClr val="tx1"/>
               </a:solidFill>
@@ -3285,7 +3137,7 @@
         </p:nvSpPr>
         <p:spPr>
           <a:xfrm>
-            <a:off x="5436096" y="1772816"/>
+            <a:off x="6960096" y="1772816"/>
             <a:ext cx="1152128" cy="720080"/>
           </a:xfrm>
           <a:prstGeom prst="ellipse">
@@ -3317,14 +3169,14 @@
           <a:p>
             <a:pPr algn="ctr"/>
             <a:r>
-              <a:rPr lang="de-DE" sz="1000" b="1" dirty="0" smtClean="0">
+              <a:rPr lang="de-DE" sz="1000" b="1">
                 <a:solidFill>
                   <a:schemeClr val="tx1"/>
                 </a:solidFill>
               </a:rPr>
               <a:t>DELEGATED</a:t>
             </a:r>
-            <a:endParaRPr lang="de-DE" sz="1000" b="1" dirty="0">
+            <a:endParaRPr lang="de-DE" sz="1000" b="1">
               <a:solidFill>
                 <a:schemeClr val="tx1"/>
               </a:solidFill>
@@ -3340,7 +3192,7 @@
         </p:nvSpPr>
         <p:spPr>
           <a:xfrm>
-            <a:off x="1475656" y="1772816"/>
+            <a:off x="2999656" y="1772816"/>
             <a:ext cx="1224136" cy="720080"/>
           </a:xfrm>
           <a:prstGeom prst="ellipse">
@@ -3377,13 +3229,18 @@
           <a:p>
             <a:pPr algn="ctr"/>
             <a:r>
-              <a:rPr lang="de-DE" sz="1000" b="1" dirty="0">
+              <a:rPr lang="de-DE" sz="1000" b="1" dirty="0" smtClean="0">
                 <a:solidFill>
                   <a:schemeClr val="tx1"/>
                 </a:solidFill>
               </a:rPr>
-              <a:t>UNCLAIMED</a:t>
-            </a:r>
+              <a:t>UNASSIGNED</a:t>
+            </a:r>
+            <a:endParaRPr lang="de-DE" sz="1000" b="1" dirty="0">
+              <a:solidFill>
+                <a:schemeClr val="tx1"/>
+              </a:solidFill>
+            </a:endParaRPr>
           </a:p>
         </p:txBody>
       </p:sp>
@@ -3395,7 +3252,7 @@
         </p:nvSpPr>
         <p:spPr>
           <a:xfrm flipH="1" flipV="1">
-            <a:off x="2627784" y="1988840"/>
+            <a:off x="4151784" y="1988840"/>
             <a:ext cx="1080120" cy="432048"/>
           </a:xfrm>
           <a:prstGeom prst="arc">
@@ -3431,7 +3288,7 @@
           <a:lstStyle/>
           <a:p>
             <a:pPr algn="r"/>
-            <a:endParaRPr lang="de-DE" dirty="0"/>
+            <a:endParaRPr lang="de-DE"/>
           </a:p>
         </p:txBody>
       </p:sp>
@@ -3443,7 +3300,7 @@
         </p:nvSpPr>
         <p:spPr>
           <a:xfrm flipH="1" flipV="1">
-            <a:off x="4499992" y="2060848"/>
+            <a:off x="6023992" y="2060848"/>
             <a:ext cx="1080120" cy="432048"/>
           </a:xfrm>
           <a:prstGeom prst="arc">
@@ -3479,7 +3336,7 @@
           <a:lstStyle/>
           <a:p>
             <a:pPr algn="r"/>
-            <a:endParaRPr lang="de-DE" dirty="0"/>
+            <a:endParaRPr lang="de-DE"/>
           </a:p>
         </p:txBody>
       </p:sp>
@@ -3491,7 +3348,7 @@
         </p:nvSpPr>
         <p:spPr>
           <a:xfrm rot="10800000" flipH="1" flipV="1">
-            <a:off x="4499992" y="1781200"/>
+            <a:off x="6023992" y="1781200"/>
             <a:ext cx="1080120" cy="432048"/>
           </a:xfrm>
           <a:prstGeom prst="arc">
@@ -3527,7 +3384,7 @@
           <a:lstStyle/>
           <a:p>
             <a:pPr algn="r"/>
-            <a:endParaRPr lang="de-DE" dirty="0"/>
+            <a:endParaRPr lang="de-DE"/>
           </a:p>
         </p:txBody>
       </p:sp>
@@ -3539,7 +3396,7 @@
         </p:nvSpPr>
         <p:spPr>
           <a:xfrm rot="10800000" flipH="1" flipV="1">
-            <a:off x="2627784" y="1844824"/>
+            <a:off x="4151784" y="1844824"/>
             <a:ext cx="1080120" cy="432048"/>
           </a:xfrm>
           <a:prstGeom prst="arc">
@@ -3575,7 +3432,7 @@
           <a:lstStyle/>
           <a:p>
             <a:pPr algn="r"/>
-            <a:endParaRPr lang="de-DE" dirty="0"/>
+            <a:endParaRPr lang="de-DE"/>
           </a:p>
         </p:txBody>
       </p:sp>
@@ -3587,7 +3444,7 @@
         </p:nvSpPr>
         <p:spPr>
           <a:xfrm rot="8541705" flipH="1" flipV="1">
-            <a:off x="2078482" y="1172933"/>
+            <a:off x="3602482" y="1172933"/>
             <a:ext cx="1819042" cy="432048"/>
           </a:xfrm>
           <a:prstGeom prst="arc">
@@ -3623,7 +3480,7 @@
           <a:lstStyle/>
           <a:p>
             <a:pPr algn="r"/>
-            <a:endParaRPr lang="de-DE" dirty="0"/>
+            <a:endParaRPr lang="de-DE"/>
           </a:p>
         </p:txBody>
       </p:sp>
@@ -3635,7 +3492,7 @@
         </p:nvSpPr>
         <p:spPr>
           <a:xfrm rot="5400000" flipH="1" flipV="1">
-            <a:off x="3733252" y="2762714"/>
+            <a:off x="5257252" y="2762714"/>
             <a:ext cx="813400" cy="142756"/>
           </a:xfrm>
           <a:prstGeom prst="arc">
@@ -3671,7 +3528,7 @@
           <a:lstStyle/>
           <a:p>
             <a:pPr algn="r"/>
-            <a:endParaRPr lang="de-DE" dirty="0"/>
+            <a:endParaRPr lang="de-DE"/>
           </a:p>
         </p:txBody>
       </p:sp>
@@ -3683,7 +3540,7 @@
         </p:nvSpPr>
         <p:spPr>
           <a:xfrm rot="5400000" flipH="1" flipV="1">
-            <a:off x="3506889" y="1366746"/>
+            <a:off x="5030889" y="1366746"/>
             <a:ext cx="813400" cy="142756"/>
           </a:xfrm>
           <a:prstGeom prst="arc">
@@ -3719,7 +3576,7 @@
           <a:lstStyle/>
           <a:p>
             <a:pPr algn="r"/>
-            <a:endParaRPr lang="de-DE" dirty="0"/>
+            <a:endParaRPr lang="de-DE"/>
           </a:p>
         </p:txBody>
       </p:sp>
@@ -3731,7 +3588,7 @@
         </p:nvSpPr>
         <p:spPr>
           <a:xfrm rot="1749294">
-            <a:off x="4162644" y="1225999"/>
+            <a:off x="5686644" y="1225999"/>
             <a:ext cx="426828" cy="595514"/>
           </a:xfrm>
           <a:prstGeom prst="arc">
@@ -3767,7 +3624,7 @@
           <a:lstStyle/>
           <a:p>
             <a:pPr algn="r"/>
-            <a:endParaRPr lang="de-DE" dirty="0"/>
+            <a:endParaRPr lang="de-DE"/>
           </a:p>
         </p:txBody>
       </p:sp>
@@ -3779,7 +3636,7 @@
         </p:nvSpPr>
         <p:spPr>
           <a:xfrm rot="16200000">
-            <a:off x="3635825" y="2762819"/>
+            <a:off x="5159826" y="2762820"/>
             <a:ext cx="684803" cy="246221"/>
           </a:xfrm>
           <a:prstGeom prst="rect">
@@ -3794,10 +3651,10 @@
           <a:lstStyle/>
           <a:p>
             <a:r>
-              <a:rPr lang="de-DE" sz="1000" b="1" dirty="0" smtClean="0"/>
+              <a:rPr lang="de-DE" sz="1000" b="1"/>
               <a:t>complete</a:t>
             </a:r>
-            <a:endParaRPr lang="de-DE" sz="1000" b="1" dirty="0"/>
+            <a:endParaRPr lang="de-DE" sz="1000" b="1"/>
           </a:p>
         </p:txBody>
       </p:sp>
@@ -3809,7 +3666,7 @@
         </p:nvSpPr>
         <p:spPr>
           <a:xfrm>
-            <a:off x="4644008" y="2412131"/>
+            <a:off x="6168009" y="2412132"/>
             <a:ext cx="646331" cy="246221"/>
           </a:xfrm>
           <a:prstGeom prst="rect">
@@ -3824,10 +3681,10 @@
           <a:lstStyle/>
           <a:p>
             <a:r>
-              <a:rPr lang="de-DE" sz="1000" b="1" dirty="0" smtClean="0"/>
+              <a:rPr lang="de-DE" sz="1000" b="1"/>
               <a:t>delegate</a:t>
             </a:r>
-            <a:endParaRPr lang="de-DE" sz="1000" b="1" dirty="0"/>
+            <a:endParaRPr lang="de-DE" sz="1000" b="1"/>
           </a:p>
         </p:txBody>
       </p:sp>
@@ -3839,7 +3696,7 @@
         </p:nvSpPr>
         <p:spPr>
           <a:xfrm>
-            <a:off x="2882676" y="2369785"/>
+            <a:off x="4406676" y="2369786"/>
             <a:ext cx="468398" cy="246221"/>
           </a:xfrm>
           <a:prstGeom prst="rect">
@@ -3854,10 +3711,10 @@
           <a:lstStyle/>
           <a:p>
             <a:r>
-              <a:rPr lang="de-DE" sz="1000" b="1" dirty="0" smtClean="0"/>
+              <a:rPr lang="de-DE" sz="1000" b="1"/>
               <a:t>claim</a:t>
             </a:r>
-            <a:endParaRPr lang="de-DE" sz="1000" b="1" dirty="0"/>
+            <a:endParaRPr lang="de-DE" sz="1000" b="1"/>
           </a:p>
         </p:txBody>
       </p:sp>
@@ -3869,7 +3726,7 @@
         </p:nvSpPr>
         <p:spPr>
           <a:xfrm>
-            <a:off x="4772663" y="1597078"/>
+            <a:off x="6296663" y="1597079"/>
             <a:ext cx="570990" cy="246221"/>
           </a:xfrm>
           <a:prstGeom prst="rect">
@@ -3884,10 +3741,10 @@
           <a:lstStyle/>
           <a:p>
             <a:r>
-              <a:rPr lang="de-DE" sz="1000" b="1" dirty="0" smtClean="0"/>
+              <a:rPr lang="de-DE" sz="1000" b="1"/>
               <a:t>resolve</a:t>
             </a:r>
-            <a:endParaRPr lang="de-DE" sz="1000" b="1" dirty="0"/>
+            <a:endParaRPr lang="de-DE" sz="1000" b="1"/>
           </a:p>
         </p:txBody>
       </p:sp>
@@ -3899,7 +3756,7 @@
         </p:nvSpPr>
         <p:spPr>
           <a:xfrm>
-            <a:off x="2829450" y="1641538"/>
+            <a:off x="4353450" y="1641539"/>
             <a:ext cx="606256" cy="246221"/>
           </a:xfrm>
           <a:prstGeom prst="rect">
@@ -3914,10 +3771,10 @@
           <a:lstStyle/>
           <a:p>
             <a:r>
-              <a:rPr lang="de-DE" sz="1000" b="1" dirty="0" smtClean="0"/>
+              <a:rPr lang="de-DE" sz="1000" b="1"/>
               <a:t>unclaim</a:t>
             </a:r>
-            <a:endParaRPr lang="de-DE" sz="1000" b="1" dirty="0"/>
+            <a:endParaRPr lang="de-DE" sz="1000" b="1"/>
           </a:p>
         </p:txBody>
       </p:sp>
@@ -3929,7 +3786,7 @@
         </p:nvSpPr>
         <p:spPr>
           <a:xfrm rot="16200000">
-            <a:off x="3484518" y="1276044"/>
+            <a:off x="5008519" y="1276045"/>
             <a:ext cx="511679" cy="246221"/>
           </a:xfrm>
           <a:prstGeom prst="rect">
@@ -3944,10 +3801,10 @@
           <a:lstStyle/>
           <a:p>
             <a:r>
-              <a:rPr lang="de-DE" sz="1000" b="1" dirty="0" smtClean="0"/>
+              <a:rPr lang="de-DE" sz="1000" b="1"/>
               <a:t>assign</a:t>
             </a:r>
-            <a:endParaRPr lang="de-DE" sz="1000" b="1" dirty="0"/>
+            <a:endParaRPr lang="de-DE" sz="1000" b="1"/>
           </a:p>
         </p:txBody>
       </p:sp>
@@ -3959,7 +3816,7 @@
         </p:nvSpPr>
         <p:spPr>
           <a:xfrm>
-            <a:off x="4499992" y="1137666"/>
+            <a:off x="6023993" y="1137667"/>
             <a:ext cx="620683" cy="246221"/>
           </a:xfrm>
           <a:prstGeom prst="rect">
@@ -3974,10 +3831,10 @@
           <a:lstStyle/>
           <a:p>
             <a:r>
-              <a:rPr lang="de-DE" sz="1000" b="1" dirty="0" smtClean="0"/>
+              <a:rPr lang="de-DE" sz="1000" b="1"/>
               <a:t>reassign</a:t>
             </a:r>
-            <a:endParaRPr lang="de-DE" sz="1000" b="1" dirty="0"/>
+            <a:endParaRPr lang="de-DE" sz="1000" b="1"/>
           </a:p>
         </p:txBody>
       </p:sp>
@@ -3989,7 +3846,7 @@
         </p:nvSpPr>
         <p:spPr>
           <a:xfrm rot="19513687">
-            <a:off x="2448541" y="950990"/>
+            <a:off x="3972542" y="950991"/>
             <a:ext cx="910827" cy="246221"/>
           </a:xfrm>
           <a:prstGeom prst="rect">
@@ -4004,18 +3861,18 @@
           <a:lstStyle/>
           <a:p>
             <a:r>
-              <a:rPr lang="de-DE" sz="1000" b="1" dirty="0" smtClean="0"/>
+              <a:rPr lang="de-DE" sz="1000" b="1"/>
               <a:t>set</a:t>
             </a:r>
             <a:r>
-              <a:rPr lang="de-DE" sz="1000" dirty="0" smtClean="0"/>
+              <a:rPr lang="de-DE" sz="1000"/>
               <a:t> </a:t>
             </a:r>
             <a:r>
-              <a:rPr lang="de-DE" sz="1000" b="1" dirty="0" smtClean="0"/>
+              <a:rPr lang="de-DE" sz="1000" b="1"/>
               <a:t>Candidate</a:t>
             </a:r>
-            <a:endParaRPr lang="de-DE" sz="1000" b="1" dirty="0"/>
+            <a:endParaRPr lang="de-DE" sz="1000" b="1"/>
           </a:p>
         </p:txBody>
       </p:sp>
@@ -4027,7 +3884,7 @@
         </p:nvSpPr>
         <p:spPr>
           <a:xfrm rot="19412342">
-            <a:off x="1203611" y="1543077"/>
+            <a:off x="2727611" y="1543077"/>
             <a:ext cx="426828" cy="511958"/>
           </a:xfrm>
           <a:prstGeom prst="arc">
@@ -4063,7 +3920,7 @@
           <a:lstStyle/>
           <a:p>
             <a:pPr algn="r"/>
-            <a:endParaRPr lang="de-DE" dirty="0"/>
+            <a:endParaRPr lang="de-DE"/>
           </a:p>
         </p:txBody>
       </p:sp>
@@ -4075,7 +3932,7 @@
         </p:nvSpPr>
         <p:spPr>
           <a:xfrm>
-            <a:off x="1119009" y="1350857"/>
+            <a:off x="2643010" y="1350858"/>
             <a:ext cx="910827" cy="246221"/>
           </a:xfrm>
           <a:prstGeom prst="rect">
@@ -4090,18 +3947,18 @@
           <a:lstStyle/>
           <a:p>
             <a:r>
-              <a:rPr lang="de-DE" sz="1000" b="1" dirty="0" smtClean="0"/>
+              <a:rPr lang="de-DE" sz="1000" b="1"/>
               <a:t>set</a:t>
             </a:r>
             <a:r>
-              <a:rPr lang="de-DE" sz="1000" dirty="0" smtClean="0"/>
+              <a:rPr lang="de-DE" sz="1000"/>
               <a:t> </a:t>
             </a:r>
             <a:r>
-              <a:rPr lang="de-DE" sz="1000" b="1" dirty="0" smtClean="0"/>
+              <a:rPr lang="de-DE" sz="1000" b="1"/>
               <a:t>Candidate</a:t>
             </a:r>
-            <a:endParaRPr lang="de-DE" sz="1000" b="1" dirty="0"/>
+            <a:endParaRPr lang="de-DE" sz="1000" b="1"/>
           </a:p>
         </p:txBody>
       </p:sp>
@@ -4113,7 +3970,7 @@
         </p:nvSpPr>
         <p:spPr>
           <a:xfrm>
-            <a:off x="-15290" y="0"/>
+            <a:off x="1508711" y="0"/>
             <a:ext cx="1432315" cy="369332"/>
           </a:xfrm>
           <a:prstGeom prst="rect">
@@ -4128,65 +3985,10 @@
           <a:lstStyle/>
           <a:p>
             <a:r>
-              <a:rPr lang="de-DE" dirty="0" smtClean="0"/>
+              <a:rPr lang="de-DE"/>
               <a:t>Task Lifecycle</a:t>
             </a:r>
-            <a:endParaRPr lang="de-DE" dirty="0"/>
-          </a:p>
-        </p:txBody>
-      </p:sp>
-      <p:sp>
-        <p:nvSpPr>
-          <p:cNvPr id="72" name="Ellipse 71"/>
-          <p:cNvSpPr/>
-          <p:nvPr/>
-        </p:nvSpPr>
-        <p:spPr>
-          <a:xfrm>
-            <a:off x="1690822" y="3206333"/>
-            <a:ext cx="1008112" cy="720080"/>
-          </a:xfrm>
-          <a:prstGeom prst="ellipse">
-            <a:avLst/>
-          </a:prstGeom>
-          <a:solidFill>
-            <a:schemeClr val="bg1"/>
-          </a:solidFill>
-        </p:spPr>
-        <p:style>
-          <a:lnRef idx="2">
-            <a:schemeClr val="accent1">
-              <a:shade val="50000"/>
-            </a:schemeClr>
-          </a:lnRef>
-          <a:fillRef idx="1">
-            <a:schemeClr val="accent1"/>
-          </a:fillRef>
-          <a:effectRef idx="0">
-            <a:schemeClr val="accent1"/>
-          </a:effectRef>
-          <a:fontRef idx="minor">
-            <a:schemeClr val="lt1"/>
-          </a:fontRef>
-        </p:style>
-        <p:txBody>
-          <a:bodyPr lIns="0" rIns="0" rtlCol="0" anchor="ctr"/>
-          <a:lstStyle/>
-          <a:p>
-            <a:pPr algn="ctr"/>
-            <a:r>
-              <a:rPr lang="de-DE" sz="1000" b="1" dirty="0" smtClean="0">
-                <a:solidFill>
-                  <a:schemeClr val="tx1"/>
-                </a:solidFill>
-              </a:rPr>
-              <a:t>DELETED</a:t>
-            </a:r>
-            <a:endParaRPr lang="de-DE" sz="1000" b="1" dirty="0">
-              <a:solidFill>
-                <a:schemeClr val="tx1"/>
-              </a:solidFill>
-            </a:endParaRPr>
+            <a:endParaRPr lang="de-DE"/>
           </a:p>
         </p:txBody>
       </p:sp>
@@ -4198,7 +4000,7 @@
         </p:nvSpPr>
         <p:spPr>
           <a:xfrm rot="9194895" flipH="1" flipV="1">
-            <a:off x="4568990" y="416541"/>
+            <a:off x="6092990" y="416541"/>
             <a:ext cx="813400" cy="142756"/>
           </a:xfrm>
           <a:prstGeom prst="arc">
@@ -4234,7 +4036,7 @@
           <a:lstStyle/>
           <a:p>
             <a:pPr algn="r"/>
-            <a:endParaRPr lang="de-DE" dirty="0"/>
+            <a:endParaRPr lang="de-DE"/>
           </a:p>
         </p:txBody>
       </p:sp>
@@ -4246,7 +4048,7 @@
         </p:nvSpPr>
         <p:spPr>
           <a:xfrm rot="19994895">
-            <a:off x="4654926" y="220058"/>
+            <a:off x="6178927" y="220059"/>
             <a:ext cx="518091" cy="246221"/>
           </a:xfrm>
           <a:prstGeom prst="rect">
@@ -4261,10 +4063,10 @@
           <a:lstStyle/>
           <a:p>
             <a:r>
-              <a:rPr lang="de-DE" sz="1000" b="1" dirty="0" smtClean="0"/>
+              <a:rPr lang="de-DE" sz="1000" b="1"/>
               <a:t>create</a:t>
             </a:r>
-            <a:endParaRPr lang="de-DE" sz="1000" b="1" dirty="0"/>
+            <a:endParaRPr lang="de-DE" sz="1000" b="1"/>
           </a:p>
         </p:txBody>
       </p:sp>
@@ -4276,7 +4078,7 @@
         </p:nvSpPr>
         <p:spPr>
           <a:xfrm>
-            <a:off x="7092280" y="1383887"/>
+            <a:off x="8616280" y="1383887"/>
             <a:ext cx="1836712" cy="2000548"/>
           </a:xfrm>
           <a:prstGeom prst="rect">
@@ -4291,7 +4093,7 @@
           <a:lstStyle/>
           <a:p>
             <a:r>
-              <a:rPr lang="de-DE" sz="1200" dirty="0" smtClean="0"/>
+              <a:rPr lang="de-DE" sz="1200"/>
               <a:t>Task Lifecycle Operations </a:t>
             </a:r>
           </a:p>
@@ -4301,7 +4103,7 @@
               <a:buChar char="-"/>
             </a:pPr>
             <a:r>
-              <a:rPr lang="de-DE" sz="1000" dirty="0" smtClean="0"/>
+              <a:rPr lang="de-DE" sz="1000"/>
               <a:t>Create</a:t>
             </a:r>
           </a:p>
@@ -4311,7 +4113,7 @@
               <a:buChar char="-"/>
             </a:pPr>
             <a:r>
-              <a:rPr lang="de-DE" sz="1000" dirty="0" smtClean="0"/>
+              <a:rPr lang="de-DE" sz="1000"/>
               <a:t>Set Candidate</a:t>
             </a:r>
           </a:p>
@@ -4321,7 +4123,7 @@
               <a:buChar char="-"/>
             </a:pPr>
             <a:r>
-              <a:rPr lang="de-DE" sz="1000" dirty="0" smtClean="0"/>
+              <a:rPr lang="de-DE" sz="1000"/>
               <a:t>Claim</a:t>
             </a:r>
           </a:p>
@@ -4331,7 +4133,7 @@
               <a:buChar char="-"/>
             </a:pPr>
             <a:r>
-              <a:rPr lang="de-DE" sz="1000" dirty="0" smtClean="0"/>
+              <a:rPr lang="de-DE" sz="1000"/>
               <a:t>Unclaim</a:t>
             </a:r>
           </a:p>
@@ -4341,7 +4143,7 @@
               <a:buChar char="-"/>
             </a:pPr>
             <a:r>
-              <a:rPr lang="de-DE" sz="1000" dirty="0" smtClean="0"/>
+              <a:rPr lang="de-DE" sz="1000"/>
               <a:t>Assign</a:t>
             </a:r>
           </a:p>
@@ -4351,7 +4153,7 @@
               <a:buChar char="-"/>
             </a:pPr>
             <a:r>
-              <a:rPr lang="de-DE" sz="1000" dirty="0" smtClean="0"/>
+              <a:rPr lang="de-DE" sz="1000"/>
               <a:t>Reassign</a:t>
             </a:r>
           </a:p>
@@ -4361,7 +4163,7 @@
               <a:buChar char="-"/>
             </a:pPr>
             <a:r>
-              <a:rPr lang="de-DE" sz="1000" dirty="0" smtClean="0"/>
+              <a:rPr lang="de-DE" sz="1000"/>
               <a:t>Delegate</a:t>
             </a:r>
           </a:p>
@@ -4371,7 +4173,7 @@
               <a:buChar char="-"/>
             </a:pPr>
             <a:r>
-              <a:rPr lang="de-DE" sz="1000" dirty="0" smtClean="0"/>
+              <a:rPr lang="de-DE" sz="1000"/>
               <a:t>Resolve</a:t>
             </a:r>
           </a:p>
@@ -4381,7 +4183,7 @@
               <a:buChar char="-"/>
             </a:pPr>
             <a:r>
-              <a:rPr lang="de-DE" sz="1000" dirty="0" smtClean="0"/>
+              <a:rPr lang="de-DE" sz="1000"/>
               <a:t>Complete</a:t>
             </a:r>
           </a:p>
@@ -4391,7 +4193,7 @@
               <a:buChar char="-"/>
             </a:pPr>
             <a:r>
-              <a:rPr lang="de-DE" sz="1000" dirty="0" smtClean="0"/>
+              <a:rPr lang="de-DE" sz="1000"/>
               <a:t>Delete</a:t>
             </a:r>
           </a:p>
@@ -4400,7 +4202,7 @@
               <a:buFontTx/>
               <a:buChar char="-"/>
             </a:pPr>
-            <a:endParaRPr lang="de-DE" sz="1200" dirty="0"/>
+            <a:endParaRPr lang="de-DE" sz="1200"/>
           </a:p>
         </p:txBody>
       </p:sp>
@@ -4412,7 +4214,7 @@
         </p:nvSpPr>
         <p:spPr>
           <a:xfrm>
-            <a:off x="7092280" y="62305"/>
+            <a:off x="8616281" y="62306"/>
             <a:ext cx="1433085" cy="1200329"/>
           </a:xfrm>
           <a:prstGeom prst="rect">
@@ -4427,7 +4229,7 @@
           <a:lstStyle/>
           <a:p>
             <a:r>
-              <a:rPr lang="de-DE" sz="1200" dirty="0" smtClean="0"/>
+              <a:rPr lang="de-DE" sz="1200"/>
               <a:t>Task Lifecycle States</a:t>
             </a:r>
           </a:p>
@@ -4437,7 +4239,7 @@
               <a:buChar char="-"/>
             </a:pPr>
             <a:r>
-              <a:rPr lang="de-DE" sz="1000" dirty="0" smtClean="0"/>
+              <a:rPr lang="de-DE" sz="1000"/>
               <a:t>New</a:t>
             </a:r>
           </a:p>
@@ -4447,7 +4249,7 @@
               <a:buChar char="-"/>
             </a:pPr>
             <a:r>
-              <a:rPr lang="de-DE" sz="1000" dirty="0" smtClean="0"/>
+              <a:rPr lang="de-DE" sz="1000"/>
               <a:t>Unclaimed</a:t>
             </a:r>
           </a:p>
@@ -4457,7 +4259,7 @@
               <a:buChar char="-"/>
             </a:pPr>
             <a:r>
-              <a:rPr lang="de-DE" sz="1000" dirty="0" smtClean="0"/>
+              <a:rPr lang="de-DE" sz="1000"/>
               <a:t>Claimed/Assigned</a:t>
             </a:r>
           </a:p>
@@ -4467,7 +4269,7 @@
               <a:buChar char="-"/>
             </a:pPr>
             <a:r>
-              <a:rPr lang="de-DE" sz="1000" dirty="0" smtClean="0"/>
+              <a:rPr lang="de-DE" sz="1000"/>
               <a:t>Delegated</a:t>
             </a:r>
           </a:p>
@@ -4477,7 +4279,7 @@
               <a:buChar char="-"/>
             </a:pPr>
             <a:r>
-              <a:rPr lang="de-DE" sz="1000" dirty="0" smtClean="0"/>
+              <a:rPr lang="de-DE" sz="1000"/>
               <a:t>Completed</a:t>
             </a:r>
           </a:p>
@@ -4487,322 +4289,10 @@
               <a:buChar char="-"/>
             </a:pPr>
             <a:r>
-              <a:rPr lang="de-DE" sz="1000" dirty="0" smtClean="0"/>
+              <a:rPr lang="de-DE" sz="1000"/>
               <a:t>Deleted</a:t>
             </a:r>
-            <a:endParaRPr lang="de-DE" sz="1000" dirty="0"/>
-          </a:p>
-        </p:txBody>
-      </p:sp>
-      <p:sp>
-        <p:nvSpPr>
-          <p:cNvPr id="80" name="Textfeld 79"/>
-          <p:cNvSpPr txBox="1"/>
-          <p:nvPr/>
-        </p:nvSpPr>
-        <p:spPr>
-          <a:xfrm rot="16200000">
-            <a:off x="1635263" y="2698639"/>
-            <a:ext cx="522900" cy="246221"/>
-          </a:xfrm>
-          <a:prstGeom prst="rect">
-            <a:avLst/>
-          </a:prstGeom>
-          <a:noFill/>
-        </p:spPr>
-        <p:txBody>
-          <a:bodyPr wrap="none" rtlCol="0">
-            <a:spAutoFit/>
-          </a:bodyPr>
-          <a:lstStyle/>
-          <a:p>
-            <a:r>
-              <a:rPr lang="de-DE" sz="1000" b="1" dirty="0" smtClean="0"/>
-              <a:t>delete</a:t>
-            </a:r>
-            <a:endParaRPr lang="de-DE" sz="1000" b="1" dirty="0"/>
-          </a:p>
-        </p:txBody>
-      </p:sp>
-      <p:sp>
-        <p:nvSpPr>
-          <p:cNvPr id="81" name="Bogen 80"/>
-          <p:cNvSpPr/>
-          <p:nvPr/>
-        </p:nvSpPr>
-        <p:spPr>
-          <a:xfrm rot="5400000" flipH="1" flipV="1">
-            <a:off x="1679587" y="2750371"/>
-            <a:ext cx="813400" cy="142756"/>
-          </a:xfrm>
-          <a:prstGeom prst="arc">
-            <a:avLst>
-              <a:gd name="adj1" fmla="val 10944976"/>
-              <a:gd name="adj2" fmla="val 21191460"/>
-            </a:avLst>
-          </a:prstGeom>
-          <a:ln w="12700">
-            <a:solidFill>
-              <a:schemeClr val="tx1"/>
-            </a:solidFill>
-            <a:headEnd type="arrow" w="med" len="med"/>
-            <a:tailEnd type="none" w="med" len="med"/>
-          </a:ln>
-        </p:spPr>
-        <p:style>
-          <a:lnRef idx="1">
-            <a:schemeClr val="accent1"/>
-          </a:lnRef>
-          <a:fillRef idx="0">
-            <a:schemeClr val="accent1"/>
-          </a:fillRef>
-          <a:effectRef idx="0">
-            <a:schemeClr val="accent1"/>
-          </a:effectRef>
-          <a:fontRef idx="minor">
-            <a:schemeClr val="tx1"/>
-          </a:fontRef>
-        </p:style>
-        <p:txBody>
-          <a:bodyPr rtlCol="0" anchor="ctr"/>
-          <a:lstStyle/>
-          <a:p>
-            <a:pPr algn="r"/>
-            <a:endParaRPr lang="de-DE" dirty="0"/>
-          </a:p>
-        </p:txBody>
-      </p:sp>
-      <p:sp>
-        <p:nvSpPr>
-          <p:cNvPr id="82" name="Bogen 81"/>
-          <p:cNvSpPr/>
-          <p:nvPr/>
-        </p:nvSpPr>
-        <p:spPr>
-          <a:xfrm rot="8541705" flipH="1" flipV="1">
-            <a:off x="1250187" y="136841"/>
-            <a:ext cx="3286064" cy="4390595"/>
-          </a:xfrm>
-          <a:prstGeom prst="arc">
-            <a:avLst>
-              <a:gd name="adj1" fmla="val 10428325"/>
-              <a:gd name="adj2" fmla="val 19986430"/>
-            </a:avLst>
-          </a:prstGeom>
-          <a:ln w="12700">
-            <a:solidFill>
-              <a:schemeClr val="tx1"/>
-            </a:solidFill>
-            <a:headEnd type="arrow" w="med" len="med"/>
-            <a:tailEnd type="none" w="med" len="med"/>
-          </a:ln>
-        </p:spPr>
-        <p:style>
-          <a:lnRef idx="1">
-            <a:schemeClr val="accent1"/>
-          </a:lnRef>
-          <a:fillRef idx="0">
-            <a:schemeClr val="accent1"/>
-          </a:fillRef>
-          <a:effectRef idx="0">
-            <a:schemeClr val="accent1"/>
-          </a:effectRef>
-          <a:fontRef idx="minor">
-            <a:schemeClr val="tx1"/>
-          </a:fontRef>
-        </p:style>
-        <p:txBody>
-          <a:bodyPr rtlCol="0" anchor="ctr"/>
-          <a:lstStyle/>
-          <a:p>
-            <a:pPr algn="r"/>
-            <a:endParaRPr lang="de-DE" dirty="0"/>
-          </a:p>
-        </p:txBody>
-      </p:sp>
-      <p:sp>
-        <p:nvSpPr>
-          <p:cNvPr id="83" name="Bogen 82"/>
-          <p:cNvSpPr/>
-          <p:nvPr/>
-        </p:nvSpPr>
-        <p:spPr>
-          <a:xfrm rot="19161302" flipH="1" flipV="1">
-            <a:off x="2358448" y="2577229"/>
-            <a:ext cx="1819042" cy="439874"/>
-          </a:xfrm>
-          <a:prstGeom prst="arc">
-            <a:avLst>
-              <a:gd name="adj1" fmla="val 11487853"/>
-              <a:gd name="adj2" fmla="val 21356665"/>
-            </a:avLst>
-          </a:prstGeom>
-          <a:ln w="12700">
-            <a:solidFill>
-              <a:schemeClr val="tx1"/>
-            </a:solidFill>
-            <a:headEnd type="none" w="med" len="med"/>
-            <a:tailEnd type="arrow" w="med" len="med"/>
-          </a:ln>
-        </p:spPr>
-        <p:style>
-          <a:lnRef idx="1">
-            <a:schemeClr val="accent1"/>
-          </a:lnRef>
-          <a:fillRef idx="0">
-            <a:schemeClr val="accent1"/>
-          </a:fillRef>
-          <a:effectRef idx="0">
-            <a:schemeClr val="accent1"/>
-          </a:effectRef>
-          <a:fontRef idx="minor">
-            <a:schemeClr val="tx1"/>
-          </a:fontRef>
-        </p:style>
-        <p:txBody>
-          <a:bodyPr rtlCol="0" anchor="ctr"/>
-          <a:lstStyle/>
-          <a:p>
-            <a:pPr algn="r"/>
-            <a:endParaRPr lang="de-DE" dirty="0"/>
-          </a:p>
-        </p:txBody>
-      </p:sp>
-      <p:sp>
-        <p:nvSpPr>
-          <p:cNvPr id="84" name="Textfeld 83"/>
-          <p:cNvSpPr txBox="1"/>
-          <p:nvPr/>
-        </p:nvSpPr>
-        <p:spPr>
-          <a:xfrm rot="19382456">
-            <a:off x="5467775" y="3461257"/>
-            <a:ext cx="522900" cy="246221"/>
-          </a:xfrm>
-          <a:prstGeom prst="rect">
-            <a:avLst/>
-          </a:prstGeom>
-          <a:noFill/>
-        </p:spPr>
-        <p:txBody>
-          <a:bodyPr wrap="none" rtlCol="0">
-            <a:spAutoFit/>
-          </a:bodyPr>
-          <a:lstStyle/>
-          <a:p>
-            <a:r>
-              <a:rPr lang="de-DE" sz="1000" b="1" dirty="0" smtClean="0"/>
-              <a:t>delete</a:t>
-            </a:r>
-            <a:endParaRPr lang="de-DE" sz="1000" b="1" dirty="0"/>
-          </a:p>
-        </p:txBody>
-      </p:sp>
-      <p:sp>
-        <p:nvSpPr>
-          <p:cNvPr id="85" name="Textfeld 84"/>
-          <p:cNvSpPr txBox="1"/>
-          <p:nvPr/>
-        </p:nvSpPr>
-        <p:spPr>
-          <a:xfrm rot="18608908">
-            <a:off x="980670" y="625315"/>
-            <a:ext cx="522900" cy="246221"/>
-          </a:xfrm>
-          <a:prstGeom prst="rect">
-            <a:avLst/>
-          </a:prstGeom>
-          <a:noFill/>
-        </p:spPr>
-        <p:txBody>
-          <a:bodyPr wrap="none" rtlCol="0">
-            <a:spAutoFit/>
-          </a:bodyPr>
-          <a:lstStyle/>
-          <a:p>
-            <a:r>
-              <a:rPr lang="de-DE" sz="1000" b="1" dirty="0" smtClean="0"/>
-              <a:t>delete</a:t>
-            </a:r>
-            <a:endParaRPr lang="de-DE" sz="1000" b="1" dirty="0"/>
-          </a:p>
-        </p:txBody>
-      </p:sp>
-      <p:sp>
-        <p:nvSpPr>
-          <p:cNvPr id="86" name="Bogen 85"/>
-          <p:cNvSpPr/>
-          <p:nvPr/>
-        </p:nvSpPr>
-        <p:spPr>
-          <a:xfrm rot="20295200" flipH="1" flipV="1">
-            <a:off x="2405360" y="1916382"/>
-            <a:ext cx="3967189" cy="2229107"/>
-          </a:xfrm>
-          <a:prstGeom prst="arc">
-            <a:avLst>
-              <a:gd name="adj1" fmla="val 11101189"/>
-              <a:gd name="adj2" fmla="val 21505397"/>
-            </a:avLst>
-          </a:prstGeom>
-          <a:ln w="12700">
-            <a:solidFill>
-              <a:schemeClr val="tx1"/>
-            </a:solidFill>
-            <a:headEnd type="none" w="med" len="med"/>
-            <a:tailEnd type="arrow" w="med" len="med"/>
-          </a:ln>
-        </p:spPr>
-        <p:style>
-          <a:lnRef idx="1">
-            <a:schemeClr val="accent1"/>
-          </a:lnRef>
-          <a:fillRef idx="0">
-            <a:schemeClr val="accent1"/>
-          </a:fillRef>
-          <a:effectRef idx="0">
-            <a:schemeClr val="accent1"/>
-          </a:effectRef>
-          <a:fontRef idx="minor">
-            <a:schemeClr val="tx1"/>
-          </a:fontRef>
-        </p:style>
-        <p:txBody>
-          <a:bodyPr rtlCol="0" anchor="ctr"/>
-          <a:lstStyle/>
-          <a:p>
-            <a:pPr algn="r"/>
-            <a:endParaRPr lang="de-DE" dirty="0"/>
-          </a:p>
-        </p:txBody>
-      </p:sp>
-      <p:sp>
-        <p:nvSpPr>
-          <p:cNvPr id="87" name="Textfeld 86"/>
-          <p:cNvSpPr txBox="1"/>
-          <p:nvPr/>
-        </p:nvSpPr>
-        <p:spPr>
-          <a:xfrm rot="19382456">
-            <a:off x="3055448" y="3027612"/>
-            <a:ext cx="522900" cy="246221"/>
-          </a:xfrm>
-          <a:prstGeom prst="rect">
-            <a:avLst/>
-          </a:prstGeom>
-          <a:noFill/>
-        </p:spPr>
-        <p:txBody>
-          <a:bodyPr wrap="none" rtlCol="0">
-            <a:spAutoFit/>
-          </a:bodyPr>
-          <a:lstStyle/>
-          <a:p>
-            <a:r>
-              <a:rPr lang="de-DE" sz="1000" b="1" dirty="0" smtClean="0"/>
-              <a:t>delete</a:t>
-            </a:r>
-            <a:endParaRPr lang="de-DE" sz="1000" b="1" dirty="0"/>
+            <a:endParaRPr lang="de-DE" sz="1000"/>
           </a:p>
         </p:txBody>
       </p:sp>
@@ -4814,7 +4304,7 @@
         </p:nvSpPr>
         <p:spPr>
           <a:xfrm>
-            <a:off x="5240153" y="214195"/>
+            <a:off x="6764154" y="214195"/>
             <a:ext cx="133823" cy="128736"/>
           </a:xfrm>
           <a:prstGeom prst="ellipse">
@@ -4842,7 +4332,7 @@
           <a:lstStyle/>
           <a:p>
             <a:pPr algn="ctr"/>
-            <a:endParaRPr lang="de-DE" dirty="0"/>
+            <a:endParaRPr lang="de-DE"/>
           </a:p>
         </p:txBody>
       </p:sp>
@@ -4854,7 +4344,7 @@
         </p:nvGrpSpPr>
         <p:grpSpPr>
           <a:xfrm>
-            <a:off x="3080475" y="3731500"/>
+            <a:off x="4604475" y="3731501"/>
             <a:ext cx="189910" cy="194913"/>
             <a:chOff x="3033962" y="3676302"/>
             <a:chExt cx="189910" cy="194913"/>
@@ -4896,7 +4386,7 @@
             <a:lstStyle/>
             <a:p>
               <a:pPr algn="ctr"/>
-              <a:endParaRPr lang="de-DE" dirty="0"/>
+              <a:endParaRPr lang="de-DE"/>
             </a:p>
           </p:txBody>
         </p:sp>
@@ -4935,7 +4425,7 @@
             <a:lstStyle/>
             <a:p>
               <a:pPr algn="ctr"/>
-              <a:endParaRPr lang="de-DE" dirty="0"/>
+              <a:endParaRPr lang="de-DE"/>
             </a:p>
           </p:txBody>
         </p:sp>
@@ -4948,7 +4438,7 @@
         </p:nvSpPr>
         <p:spPr>
           <a:xfrm rot="9191905" flipH="1" flipV="1">
-            <a:off x="3204089" y="3635627"/>
+            <a:off x="4728090" y="3635627"/>
             <a:ext cx="594703" cy="142756"/>
           </a:xfrm>
           <a:prstGeom prst="arc">
@@ -4984,1619 +4474,34 @@
           <a:lstStyle/>
           <a:p>
             <a:pPr algn="r"/>
-            <a:endParaRPr lang="de-DE" dirty="0"/>
-          </a:p>
-        </p:txBody>
-      </p:sp>
-      <p:sp>
-        <p:nvSpPr>
-          <p:cNvPr id="93" name="Bogen 92"/>
-          <p:cNvSpPr/>
-          <p:nvPr/>
-        </p:nvSpPr>
-        <p:spPr>
-          <a:xfrm rot="11768486" flipH="1" flipV="1">
-            <a:off x="2606602" y="3704275"/>
-            <a:ext cx="594703" cy="142756"/>
-          </a:xfrm>
-          <a:prstGeom prst="arc">
-            <a:avLst>
-              <a:gd name="adj1" fmla="val 11357577"/>
-              <a:gd name="adj2" fmla="val 20574712"/>
-            </a:avLst>
-          </a:prstGeom>
-          <a:ln w="12700">
-            <a:solidFill>
-              <a:schemeClr val="tx1"/>
-            </a:solidFill>
-            <a:headEnd type="none" w="med" len="med"/>
-            <a:tailEnd type="arrow" w="med" len="med"/>
-          </a:ln>
-        </p:spPr>
-        <p:style>
-          <a:lnRef idx="1">
-            <a:schemeClr val="accent1"/>
-          </a:lnRef>
-          <a:fillRef idx="0">
-            <a:schemeClr val="accent1"/>
-          </a:fillRef>
-          <a:effectRef idx="0">
-            <a:schemeClr val="accent1"/>
-          </a:effectRef>
-          <a:fontRef idx="minor">
-            <a:schemeClr val="tx1"/>
-          </a:fontRef>
-        </p:style>
-        <p:txBody>
-          <a:bodyPr rtlCol="0" anchor="ctr"/>
-          <a:lstStyle/>
-          <a:p>
-            <a:pPr algn="r"/>
-            <a:endParaRPr lang="de-DE" dirty="0"/>
+            <a:endParaRPr lang="de-DE"/>
           </a:p>
         </p:txBody>
       </p:sp>
     </p:spTree>
     <p:extLst>
       <p:ext uri="{BB962C8B-B14F-4D97-AF65-F5344CB8AC3E}">
-        <p14:creationId xmlns:p14="http://schemas.microsoft.com/office/powerpoint/2010/main" val="1657377913"/>
+        <p14:creationId xmlns:p14="http://schemas.microsoft.com/office/powerpoint/2010/main" val="2229076256"/>
       </p:ext>
     </p:extLst>
   </p:cSld>
   <p:clrMapOvr>
     <a:masterClrMapping/>
   </p:clrMapOvr>
-</p:sld>
-</file>
-
-<file path=ppt/slides/slide2.xml><?xml version="1.0" encoding="utf-8"?>
-<p:sld xmlns:a="http://schemas.openxmlformats.org/drawingml/2006/main" xmlns:r="http://schemas.openxmlformats.org/officeDocument/2006/relationships" xmlns:p="http://schemas.openxmlformats.org/presentationml/2006/main">
-  <p:cSld>
-    <p:spTree>
-      <p:nvGrpSpPr>
-        <p:cNvPr id="1" name=""/>
-        <p:cNvGrpSpPr/>
-        <p:nvPr/>
-      </p:nvGrpSpPr>
-      <p:grpSpPr>
-        <a:xfrm>
-          <a:off x="0" y="0"/>
-          <a:ext cx="0" cy="0"/>
-          <a:chOff x="0" y="0"/>
-          <a:chExt cx="0" cy="0"/>
-        </a:xfrm>
-      </p:grpSpPr>
-      <p:sp>
-        <p:nvSpPr>
-          <p:cNvPr id="4" name="Ellipse 3"/>
-          <p:cNvSpPr/>
-          <p:nvPr/>
-        </p:nvSpPr>
-        <p:spPr>
-          <a:xfrm>
-            <a:off x="3635896" y="419944"/>
-            <a:ext cx="1008112" cy="720080"/>
-          </a:xfrm>
-          <a:prstGeom prst="ellipse">
-            <a:avLst/>
-          </a:prstGeom>
-          <a:solidFill>
-            <a:schemeClr val="bg1"/>
-          </a:solidFill>
-        </p:spPr>
-        <p:style>
-          <a:lnRef idx="2">
-            <a:schemeClr val="accent1">
-              <a:shade val="50000"/>
-            </a:schemeClr>
-          </a:lnRef>
-          <a:fillRef idx="1">
-            <a:schemeClr val="accent1"/>
-          </a:fillRef>
-          <a:effectRef idx="0">
-            <a:schemeClr val="accent1"/>
-          </a:effectRef>
-          <a:fontRef idx="minor">
-            <a:schemeClr val="lt1"/>
-          </a:fontRef>
-        </p:style>
-        <p:txBody>
-          <a:bodyPr rot="0" spcFirstLastPara="0" vertOverflow="overflow" horzOverflow="overflow" vert="horz" wrap="square" lIns="0" tIns="45720" rIns="0" bIns="45720" numCol="1" spcCol="0" rtlCol="0" fromWordArt="0" anchor="ctr" anchorCtr="0" forceAA="0" compatLnSpc="1">
-            <a:prstTxWarp prst="textNoShape">
-              <a:avLst/>
-            </a:prstTxWarp>
-            <a:noAutofit/>
-          </a:bodyPr>
-          <a:lstStyle/>
-          <a:p>
-            <a:pPr algn="ctr"/>
-            <a:r>
-              <a:rPr lang="de-DE" sz="1000" b="1" dirty="0">
-                <a:solidFill>
-                  <a:schemeClr val="tx1"/>
-                </a:solidFill>
-              </a:rPr>
-              <a:t>NEW</a:t>
-            </a:r>
-          </a:p>
-        </p:txBody>
-      </p:sp>
-      <p:sp>
-        <p:nvSpPr>
-          <p:cNvPr id="5" name="Ellipse 4"/>
-          <p:cNvSpPr/>
-          <p:nvPr/>
-        </p:nvSpPr>
-        <p:spPr>
-          <a:xfrm>
-            <a:off x="3635896" y="1772816"/>
-            <a:ext cx="1008112" cy="720080"/>
-          </a:xfrm>
-          <a:prstGeom prst="ellipse">
-            <a:avLst/>
-          </a:prstGeom>
-          <a:solidFill>
-            <a:schemeClr val="bg1"/>
-          </a:solidFill>
-        </p:spPr>
-        <p:style>
-          <a:lnRef idx="2">
-            <a:schemeClr val="accent1">
-              <a:shade val="50000"/>
-            </a:schemeClr>
-          </a:lnRef>
-          <a:fillRef idx="1">
-            <a:schemeClr val="accent1"/>
-          </a:fillRef>
-          <a:effectRef idx="0">
-            <a:schemeClr val="accent1"/>
-          </a:effectRef>
-          <a:fontRef idx="minor">
-            <a:schemeClr val="lt1"/>
-          </a:fontRef>
-        </p:style>
-        <p:txBody>
-          <a:bodyPr lIns="0" rIns="0" rtlCol="0" anchor="ctr"/>
-          <a:lstStyle/>
-          <a:p>
-            <a:pPr algn="ctr"/>
-            <a:r>
-              <a:rPr lang="de-DE" sz="1000" b="1" dirty="0" smtClean="0">
-                <a:solidFill>
-                  <a:schemeClr val="tx1"/>
-                </a:solidFill>
-              </a:rPr>
-              <a:t>ASSIGNED</a:t>
-            </a:r>
-            <a:endParaRPr lang="de-DE" sz="1000" b="1" dirty="0">
-              <a:solidFill>
-                <a:schemeClr val="tx1"/>
-              </a:solidFill>
-            </a:endParaRPr>
-          </a:p>
-        </p:txBody>
-      </p:sp>
-      <p:sp>
-        <p:nvSpPr>
-          <p:cNvPr id="6" name="Ellipse 5"/>
-          <p:cNvSpPr/>
-          <p:nvPr/>
-        </p:nvSpPr>
-        <p:spPr>
-          <a:xfrm>
-            <a:off x="3635896" y="3240792"/>
-            <a:ext cx="1008112" cy="720080"/>
-          </a:xfrm>
-          <a:prstGeom prst="ellipse">
-            <a:avLst/>
-          </a:prstGeom>
-          <a:solidFill>
-            <a:schemeClr val="bg1"/>
-          </a:solidFill>
-        </p:spPr>
-        <p:style>
-          <a:lnRef idx="2">
-            <a:schemeClr val="accent1">
-              <a:shade val="50000"/>
-            </a:schemeClr>
-          </a:lnRef>
-          <a:fillRef idx="1">
-            <a:schemeClr val="accent1"/>
-          </a:fillRef>
-          <a:effectRef idx="0">
-            <a:schemeClr val="accent1"/>
-          </a:effectRef>
-          <a:fontRef idx="minor">
-            <a:schemeClr val="lt1"/>
-          </a:fontRef>
-        </p:style>
-        <p:txBody>
-          <a:bodyPr lIns="0" rIns="0" rtlCol="0" anchor="ctr"/>
-          <a:lstStyle/>
-          <a:p>
-            <a:pPr algn="ctr"/>
-            <a:r>
-              <a:rPr lang="de-DE" sz="1000" b="1" dirty="0" smtClean="0">
-                <a:solidFill>
-                  <a:schemeClr val="tx1"/>
-                </a:solidFill>
-              </a:rPr>
-              <a:t>COMPLETED</a:t>
-            </a:r>
-            <a:endParaRPr lang="de-DE" sz="1000" b="1" dirty="0">
-              <a:solidFill>
-                <a:schemeClr val="tx1"/>
-              </a:solidFill>
-            </a:endParaRPr>
-          </a:p>
-        </p:txBody>
-      </p:sp>
-      <p:sp>
-        <p:nvSpPr>
-          <p:cNvPr id="7" name="Ellipse 6"/>
-          <p:cNvSpPr/>
-          <p:nvPr/>
-        </p:nvSpPr>
-        <p:spPr>
-          <a:xfrm>
-            <a:off x="5436096" y="1772816"/>
-            <a:ext cx="1152128" cy="720080"/>
-          </a:xfrm>
-          <a:prstGeom prst="ellipse">
-            <a:avLst/>
-          </a:prstGeom>
-          <a:solidFill>
-            <a:schemeClr val="bg1"/>
-          </a:solidFill>
-        </p:spPr>
-        <p:style>
-          <a:lnRef idx="2">
-            <a:schemeClr val="accent1">
-              <a:shade val="50000"/>
-            </a:schemeClr>
-          </a:lnRef>
-          <a:fillRef idx="1">
-            <a:schemeClr val="accent1"/>
-          </a:fillRef>
-          <a:effectRef idx="0">
-            <a:schemeClr val="accent1"/>
-          </a:effectRef>
-          <a:fontRef idx="minor">
-            <a:schemeClr val="lt1"/>
-          </a:fontRef>
-        </p:style>
-        <p:txBody>
-          <a:bodyPr rtlCol="0" anchor="ctr"/>
-          <a:lstStyle/>
-          <a:p>
-            <a:pPr algn="ctr"/>
-            <a:r>
-              <a:rPr lang="de-DE" sz="1000" b="1" dirty="0" smtClean="0">
-                <a:solidFill>
-                  <a:schemeClr val="tx1"/>
-                </a:solidFill>
-              </a:rPr>
-              <a:t>DELEGATED</a:t>
-            </a:r>
-            <a:endParaRPr lang="de-DE" sz="1000" b="1" dirty="0">
-              <a:solidFill>
-                <a:schemeClr val="tx1"/>
-              </a:solidFill>
-            </a:endParaRPr>
-          </a:p>
-        </p:txBody>
-      </p:sp>
-      <p:sp>
-        <p:nvSpPr>
-          <p:cNvPr id="8" name="Ellipse 7"/>
-          <p:cNvSpPr/>
-          <p:nvPr/>
-        </p:nvSpPr>
-        <p:spPr>
-          <a:xfrm>
-            <a:off x="1475656" y="1772816"/>
-            <a:ext cx="1224136" cy="720080"/>
-          </a:xfrm>
-          <a:prstGeom prst="ellipse">
-            <a:avLst/>
-          </a:prstGeom>
-          <a:solidFill>
-            <a:schemeClr val="bg1"/>
-          </a:solidFill>
-        </p:spPr>
-        <p:style>
-          <a:lnRef idx="2">
-            <a:schemeClr val="accent1">
-              <a:shade val="50000"/>
-            </a:schemeClr>
-          </a:lnRef>
-          <a:fillRef idx="1">
-            <a:schemeClr val="accent1"/>
-          </a:fillRef>
-          <a:effectRef idx="0">
-            <a:schemeClr val="accent1"/>
-          </a:effectRef>
-          <a:fontRef idx="minor">
-            <a:schemeClr val="lt1"/>
-          </a:fontRef>
-        </p:style>
-        <p:txBody>
-          <a:bodyPr rot="0" spcFirstLastPara="0" vertOverflow="overflow" horzOverflow="overflow" vert="horz" wrap="square" lIns="0" tIns="45720" rIns="0" bIns="45720" numCol="1" spcCol="0" rtlCol="0" fromWordArt="0" anchor="ctr" anchorCtr="0" forceAA="0" compatLnSpc="1">
-            <a:prstTxWarp prst="textNoShape">
-              <a:avLst/>
-            </a:prstTxWarp>
-            <a:noAutofit/>
-          </a:bodyPr>
-          <a:lstStyle/>
-          <a:p>
-            <a:pPr algn="ctr"/>
-            <a:r>
-              <a:rPr lang="de-DE" sz="1000" b="1" dirty="0" smtClean="0">
-                <a:solidFill>
-                  <a:schemeClr val="tx1"/>
-                </a:solidFill>
-              </a:rPr>
-              <a:t>UNASSIGNED</a:t>
-            </a:r>
-            <a:endParaRPr lang="de-DE" sz="1000" b="1" dirty="0">
-              <a:solidFill>
-                <a:schemeClr val="tx1"/>
-              </a:solidFill>
-            </a:endParaRPr>
-          </a:p>
-        </p:txBody>
-      </p:sp>
-      <p:sp>
-        <p:nvSpPr>
-          <p:cNvPr id="48" name="Bogen 47"/>
-          <p:cNvSpPr/>
-          <p:nvPr/>
-        </p:nvSpPr>
-        <p:spPr>
-          <a:xfrm flipH="1" flipV="1">
-            <a:off x="2627784" y="1988840"/>
-            <a:ext cx="1080120" cy="432048"/>
-          </a:xfrm>
-          <a:prstGeom prst="arc">
-            <a:avLst>
-              <a:gd name="adj1" fmla="val 11274264"/>
-              <a:gd name="adj2" fmla="val 21159354"/>
-            </a:avLst>
-          </a:prstGeom>
-          <a:ln w="12700">
-            <a:solidFill>
-              <a:schemeClr val="tx1"/>
-            </a:solidFill>
-            <a:headEnd type="arrow" w="med" len="med"/>
-            <a:tailEnd type="none" w="med" len="med"/>
-          </a:ln>
-        </p:spPr>
-        <p:style>
-          <a:lnRef idx="1">
-            <a:schemeClr val="accent1"/>
-          </a:lnRef>
-          <a:fillRef idx="0">
-            <a:schemeClr val="accent1"/>
-          </a:fillRef>
-          <a:effectRef idx="0">
-            <a:schemeClr val="accent1"/>
-          </a:effectRef>
-          <a:fontRef idx="minor">
-            <a:schemeClr val="tx1"/>
-          </a:fontRef>
-        </p:style>
-        <p:txBody>
-          <a:bodyPr rtlCol="0" anchor="ctr"/>
-          <a:lstStyle/>
-          <a:p>
-            <a:pPr algn="r"/>
-            <a:endParaRPr lang="de-DE" dirty="0"/>
-          </a:p>
-        </p:txBody>
-      </p:sp>
-      <p:sp>
-        <p:nvSpPr>
-          <p:cNvPr id="49" name="Bogen 48"/>
-          <p:cNvSpPr/>
-          <p:nvPr/>
-        </p:nvSpPr>
-        <p:spPr>
-          <a:xfrm flipH="1" flipV="1">
-            <a:off x="4499992" y="2060848"/>
-            <a:ext cx="1080120" cy="432048"/>
-          </a:xfrm>
-          <a:prstGeom prst="arc">
-            <a:avLst>
-              <a:gd name="adj1" fmla="val 11274264"/>
-              <a:gd name="adj2" fmla="val 21029976"/>
-            </a:avLst>
-          </a:prstGeom>
-          <a:ln w="12700">
-            <a:solidFill>
-              <a:schemeClr val="tx1"/>
-            </a:solidFill>
-            <a:headEnd type="arrow" w="med" len="med"/>
-            <a:tailEnd type="none" w="med" len="med"/>
-          </a:ln>
-        </p:spPr>
-        <p:style>
-          <a:lnRef idx="1">
-            <a:schemeClr val="accent1"/>
-          </a:lnRef>
-          <a:fillRef idx="0">
-            <a:schemeClr val="accent1"/>
-          </a:fillRef>
-          <a:effectRef idx="0">
-            <a:schemeClr val="accent1"/>
-          </a:effectRef>
-          <a:fontRef idx="minor">
-            <a:schemeClr val="tx1"/>
-          </a:fontRef>
-        </p:style>
-        <p:txBody>
-          <a:bodyPr rtlCol="0" anchor="ctr"/>
-          <a:lstStyle/>
-          <a:p>
-            <a:pPr algn="r"/>
-            <a:endParaRPr lang="de-DE" dirty="0"/>
-          </a:p>
-        </p:txBody>
-      </p:sp>
-      <p:sp>
-        <p:nvSpPr>
-          <p:cNvPr id="50" name="Bogen 49"/>
-          <p:cNvSpPr/>
-          <p:nvPr/>
-        </p:nvSpPr>
-        <p:spPr>
-          <a:xfrm rot="10800000" flipH="1" flipV="1">
-            <a:off x="4499992" y="1781200"/>
-            <a:ext cx="1080120" cy="432048"/>
-          </a:xfrm>
-          <a:prstGeom prst="arc">
-            <a:avLst>
-              <a:gd name="adj1" fmla="val 11274264"/>
-              <a:gd name="adj2" fmla="val 21051239"/>
-            </a:avLst>
-          </a:prstGeom>
-          <a:ln w="12700">
-            <a:solidFill>
-              <a:schemeClr val="tx1"/>
-            </a:solidFill>
-            <a:headEnd type="arrow" w="med" len="med"/>
-            <a:tailEnd type="none" w="med" len="med"/>
-          </a:ln>
-        </p:spPr>
-        <p:style>
-          <a:lnRef idx="1">
-            <a:schemeClr val="accent1"/>
-          </a:lnRef>
-          <a:fillRef idx="0">
-            <a:schemeClr val="accent1"/>
-          </a:fillRef>
-          <a:effectRef idx="0">
-            <a:schemeClr val="accent1"/>
-          </a:effectRef>
-          <a:fontRef idx="minor">
-            <a:schemeClr val="tx1"/>
-          </a:fontRef>
-        </p:style>
-        <p:txBody>
-          <a:bodyPr rtlCol="0" anchor="ctr"/>
-          <a:lstStyle/>
-          <a:p>
-            <a:pPr algn="r"/>
-            <a:endParaRPr lang="de-DE" dirty="0"/>
-          </a:p>
-        </p:txBody>
-      </p:sp>
-      <p:sp>
-        <p:nvSpPr>
-          <p:cNvPr id="51" name="Bogen 50"/>
-          <p:cNvSpPr/>
-          <p:nvPr/>
-        </p:nvSpPr>
-        <p:spPr>
-          <a:xfrm rot="10800000" flipH="1" flipV="1">
-            <a:off x="2627784" y="1844824"/>
-            <a:ext cx="1080120" cy="432048"/>
-          </a:xfrm>
-          <a:prstGeom prst="arc">
-            <a:avLst>
-              <a:gd name="adj1" fmla="val 11274264"/>
-              <a:gd name="adj2" fmla="val 21072776"/>
-            </a:avLst>
-          </a:prstGeom>
-          <a:ln w="12700">
-            <a:solidFill>
-              <a:schemeClr val="tx1"/>
-            </a:solidFill>
-            <a:headEnd type="arrow" w="med" len="med"/>
-            <a:tailEnd type="none" w="med" len="med"/>
-          </a:ln>
-        </p:spPr>
-        <p:style>
-          <a:lnRef idx="1">
-            <a:schemeClr val="accent1"/>
-          </a:lnRef>
-          <a:fillRef idx="0">
-            <a:schemeClr val="accent1"/>
-          </a:fillRef>
-          <a:effectRef idx="0">
-            <a:schemeClr val="accent1"/>
-          </a:effectRef>
-          <a:fontRef idx="minor">
-            <a:schemeClr val="tx1"/>
-          </a:fontRef>
-        </p:style>
-        <p:txBody>
-          <a:bodyPr rtlCol="0" anchor="ctr"/>
-          <a:lstStyle/>
-          <a:p>
-            <a:pPr algn="r"/>
-            <a:endParaRPr lang="de-DE" dirty="0"/>
-          </a:p>
-        </p:txBody>
-      </p:sp>
-      <p:sp>
-        <p:nvSpPr>
-          <p:cNvPr id="53" name="Bogen 52"/>
-          <p:cNvSpPr/>
-          <p:nvPr/>
-        </p:nvSpPr>
-        <p:spPr>
-          <a:xfrm rot="8541705" flipH="1" flipV="1">
-            <a:off x="2078482" y="1172933"/>
-            <a:ext cx="1819042" cy="432048"/>
-          </a:xfrm>
-          <a:prstGeom prst="arc">
-            <a:avLst>
-              <a:gd name="adj1" fmla="val 11274264"/>
-              <a:gd name="adj2" fmla="val 21356665"/>
-            </a:avLst>
-          </a:prstGeom>
-          <a:ln w="12700">
-            <a:solidFill>
-              <a:schemeClr val="tx1"/>
-            </a:solidFill>
-            <a:headEnd type="arrow" w="med" len="med"/>
-            <a:tailEnd type="none" w="med" len="med"/>
-          </a:ln>
-        </p:spPr>
-        <p:style>
-          <a:lnRef idx="1">
-            <a:schemeClr val="accent1"/>
-          </a:lnRef>
-          <a:fillRef idx="0">
-            <a:schemeClr val="accent1"/>
-          </a:fillRef>
-          <a:effectRef idx="0">
-            <a:schemeClr val="accent1"/>
-          </a:effectRef>
-          <a:fontRef idx="minor">
-            <a:schemeClr val="tx1"/>
-          </a:fontRef>
-        </p:style>
-        <p:txBody>
-          <a:bodyPr rtlCol="0" anchor="ctr"/>
-          <a:lstStyle/>
-          <a:p>
-            <a:pPr algn="r"/>
-            <a:endParaRPr lang="de-DE" dirty="0"/>
-          </a:p>
-        </p:txBody>
-      </p:sp>
-      <p:sp>
-        <p:nvSpPr>
-          <p:cNvPr id="54" name="Bogen 53"/>
-          <p:cNvSpPr/>
-          <p:nvPr/>
-        </p:nvSpPr>
-        <p:spPr>
-          <a:xfrm rot="5400000" flipH="1" flipV="1">
-            <a:off x="3733252" y="2762714"/>
-            <a:ext cx="813400" cy="142756"/>
-          </a:xfrm>
-          <a:prstGeom prst="arc">
-            <a:avLst>
-              <a:gd name="adj1" fmla="val 10944976"/>
-              <a:gd name="adj2" fmla="val 21191460"/>
-            </a:avLst>
-          </a:prstGeom>
-          <a:ln w="12700">
-            <a:solidFill>
-              <a:schemeClr val="tx1"/>
-            </a:solidFill>
-            <a:headEnd type="arrow" w="med" len="med"/>
-            <a:tailEnd type="none" w="med" len="med"/>
-          </a:ln>
-        </p:spPr>
-        <p:style>
-          <a:lnRef idx="1">
-            <a:schemeClr val="accent1"/>
-          </a:lnRef>
-          <a:fillRef idx="0">
-            <a:schemeClr val="accent1"/>
-          </a:fillRef>
-          <a:effectRef idx="0">
-            <a:schemeClr val="accent1"/>
-          </a:effectRef>
-          <a:fontRef idx="minor">
-            <a:schemeClr val="tx1"/>
-          </a:fontRef>
-        </p:style>
-        <p:txBody>
-          <a:bodyPr rtlCol="0" anchor="ctr"/>
-          <a:lstStyle/>
-          <a:p>
-            <a:pPr algn="r"/>
-            <a:endParaRPr lang="de-DE" dirty="0"/>
-          </a:p>
-        </p:txBody>
-      </p:sp>
-      <p:sp>
-        <p:nvSpPr>
-          <p:cNvPr id="55" name="Bogen 54"/>
-          <p:cNvSpPr/>
-          <p:nvPr/>
-        </p:nvSpPr>
-        <p:spPr>
-          <a:xfrm rot="5400000" flipH="1" flipV="1">
-            <a:off x="3506889" y="1366746"/>
-            <a:ext cx="813400" cy="142756"/>
-          </a:xfrm>
-          <a:prstGeom prst="arc">
-            <a:avLst>
-              <a:gd name="adj1" fmla="val 11008170"/>
-              <a:gd name="adj2" fmla="val 21191460"/>
-            </a:avLst>
-          </a:prstGeom>
-          <a:ln w="12700">
-            <a:solidFill>
-              <a:schemeClr val="tx1"/>
-            </a:solidFill>
-            <a:headEnd type="arrow" w="med" len="med"/>
-            <a:tailEnd type="none" w="med" len="med"/>
-          </a:ln>
-        </p:spPr>
-        <p:style>
-          <a:lnRef idx="1">
-            <a:schemeClr val="accent1"/>
-          </a:lnRef>
-          <a:fillRef idx="0">
-            <a:schemeClr val="accent1"/>
-          </a:fillRef>
-          <a:effectRef idx="0">
-            <a:schemeClr val="accent1"/>
-          </a:effectRef>
-          <a:fontRef idx="minor">
-            <a:schemeClr val="tx1"/>
-          </a:fontRef>
-        </p:style>
-        <p:txBody>
-          <a:bodyPr rtlCol="0" anchor="ctr"/>
-          <a:lstStyle/>
-          <a:p>
-            <a:pPr algn="r"/>
-            <a:endParaRPr lang="de-DE" dirty="0"/>
-          </a:p>
-        </p:txBody>
-      </p:sp>
-      <p:sp>
-        <p:nvSpPr>
-          <p:cNvPr id="58" name="Bogen 57"/>
-          <p:cNvSpPr/>
-          <p:nvPr/>
-        </p:nvSpPr>
-        <p:spPr>
-          <a:xfrm rot="1749294">
-            <a:off x="4162644" y="1225999"/>
-            <a:ext cx="426828" cy="595514"/>
-          </a:xfrm>
-          <a:prstGeom prst="arc">
-            <a:avLst>
-              <a:gd name="adj1" fmla="val 6306066"/>
-              <a:gd name="adj2" fmla="val 3878595"/>
-            </a:avLst>
-          </a:prstGeom>
-          <a:ln w="12700">
-            <a:solidFill>
-              <a:schemeClr val="tx1"/>
-            </a:solidFill>
-            <a:headEnd type="arrow" w="med" len="med"/>
-            <a:tailEnd type="none" w="med" len="med"/>
-          </a:ln>
-        </p:spPr>
-        <p:style>
-          <a:lnRef idx="1">
-            <a:schemeClr val="accent1"/>
-          </a:lnRef>
-          <a:fillRef idx="0">
-            <a:schemeClr val="accent1"/>
-          </a:fillRef>
-          <a:effectRef idx="0">
-            <a:schemeClr val="accent1"/>
-          </a:effectRef>
-          <a:fontRef idx="minor">
-            <a:schemeClr val="tx1"/>
-          </a:fontRef>
-        </p:style>
-        <p:txBody>
-          <a:bodyPr rtlCol="0" anchor="ctr"/>
-          <a:lstStyle/>
-          <a:p>
-            <a:pPr algn="r"/>
-            <a:endParaRPr lang="de-DE" dirty="0"/>
-          </a:p>
-        </p:txBody>
-      </p:sp>
-      <p:sp>
-        <p:nvSpPr>
-          <p:cNvPr id="59" name="Textfeld 58"/>
-          <p:cNvSpPr txBox="1"/>
-          <p:nvPr/>
-        </p:nvSpPr>
-        <p:spPr>
-          <a:xfrm rot="16200000">
-            <a:off x="3635825" y="2762819"/>
-            <a:ext cx="684803" cy="246221"/>
-          </a:xfrm>
-          <a:prstGeom prst="rect">
-            <a:avLst/>
-          </a:prstGeom>
-          <a:noFill/>
-        </p:spPr>
-        <p:txBody>
-          <a:bodyPr wrap="none" rtlCol="0">
-            <a:spAutoFit/>
-          </a:bodyPr>
-          <a:lstStyle/>
-          <a:p>
-            <a:r>
-              <a:rPr lang="de-DE" sz="1000" b="1" dirty="0" smtClean="0"/>
-              <a:t>complete</a:t>
-            </a:r>
-            <a:endParaRPr lang="de-DE" sz="1000" b="1" dirty="0"/>
-          </a:p>
-        </p:txBody>
-      </p:sp>
-      <p:sp>
-        <p:nvSpPr>
-          <p:cNvPr id="62" name="Textfeld 61"/>
-          <p:cNvSpPr txBox="1"/>
-          <p:nvPr/>
-        </p:nvSpPr>
-        <p:spPr>
-          <a:xfrm>
-            <a:off x="4644008" y="2412131"/>
-            <a:ext cx="646331" cy="246221"/>
-          </a:xfrm>
-          <a:prstGeom prst="rect">
-            <a:avLst/>
-          </a:prstGeom>
-          <a:noFill/>
-        </p:spPr>
-        <p:txBody>
-          <a:bodyPr wrap="none" rtlCol="0">
-            <a:spAutoFit/>
-          </a:bodyPr>
-          <a:lstStyle/>
-          <a:p>
-            <a:r>
-              <a:rPr lang="de-DE" sz="1000" b="1" dirty="0" smtClean="0"/>
-              <a:t>delegate</a:t>
-            </a:r>
-            <a:endParaRPr lang="de-DE" sz="1000" b="1" dirty="0"/>
-          </a:p>
-        </p:txBody>
-      </p:sp>
-      <p:sp>
-        <p:nvSpPr>
-          <p:cNvPr id="63" name="Textfeld 62"/>
-          <p:cNvSpPr txBox="1"/>
-          <p:nvPr/>
-        </p:nvSpPr>
-        <p:spPr>
-          <a:xfrm>
-            <a:off x="2882676" y="2369785"/>
-            <a:ext cx="468398" cy="246221"/>
-          </a:xfrm>
-          <a:prstGeom prst="rect">
-            <a:avLst/>
-          </a:prstGeom>
-          <a:noFill/>
-        </p:spPr>
-        <p:txBody>
-          <a:bodyPr wrap="none" rtlCol="0">
-            <a:spAutoFit/>
-          </a:bodyPr>
-          <a:lstStyle/>
-          <a:p>
-            <a:r>
-              <a:rPr lang="de-DE" sz="1000" b="1" dirty="0" smtClean="0"/>
-              <a:t>claim</a:t>
-            </a:r>
-            <a:endParaRPr lang="de-DE" sz="1000" b="1" dirty="0"/>
-          </a:p>
-        </p:txBody>
-      </p:sp>
-      <p:sp>
-        <p:nvSpPr>
-          <p:cNvPr id="64" name="Textfeld 63"/>
-          <p:cNvSpPr txBox="1"/>
-          <p:nvPr/>
-        </p:nvSpPr>
-        <p:spPr>
-          <a:xfrm>
-            <a:off x="4772663" y="1597078"/>
-            <a:ext cx="570990" cy="246221"/>
-          </a:xfrm>
-          <a:prstGeom prst="rect">
-            <a:avLst/>
-          </a:prstGeom>
-          <a:noFill/>
-        </p:spPr>
-        <p:txBody>
-          <a:bodyPr wrap="none" rtlCol="0">
-            <a:spAutoFit/>
-          </a:bodyPr>
-          <a:lstStyle/>
-          <a:p>
-            <a:r>
-              <a:rPr lang="de-DE" sz="1000" b="1" dirty="0" smtClean="0"/>
-              <a:t>resolve</a:t>
-            </a:r>
-            <a:endParaRPr lang="de-DE" sz="1000" b="1" dirty="0"/>
-          </a:p>
-        </p:txBody>
-      </p:sp>
-      <p:sp>
-        <p:nvSpPr>
-          <p:cNvPr id="65" name="Textfeld 64"/>
-          <p:cNvSpPr txBox="1"/>
-          <p:nvPr/>
-        </p:nvSpPr>
-        <p:spPr>
-          <a:xfrm>
-            <a:off x="2829450" y="1641538"/>
-            <a:ext cx="606256" cy="246221"/>
-          </a:xfrm>
-          <a:prstGeom prst="rect">
-            <a:avLst/>
-          </a:prstGeom>
-          <a:noFill/>
-        </p:spPr>
-        <p:txBody>
-          <a:bodyPr wrap="none" rtlCol="0">
-            <a:spAutoFit/>
-          </a:bodyPr>
-          <a:lstStyle/>
-          <a:p>
-            <a:r>
-              <a:rPr lang="de-DE" sz="1000" b="1" dirty="0" smtClean="0"/>
-              <a:t>unclaim</a:t>
-            </a:r>
-            <a:endParaRPr lang="de-DE" sz="1000" b="1" dirty="0"/>
-          </a:p>
-        </p:txBody>
-      </p:sp>
-      <p:sp>
-        <p:nvSpPr>
-          <p:cNvPr id="66" name="Textfeld 65"/>
-          <p:cNvSpPr txBox="1"/>
-          <p:nvPr/>
-        </p:nvSpPr>
-        <p:spPr>
-          <a:xfrm rot="16200000">
-            <a:off x="3484518" y="1276044"/>
-            <a:ext cx="511679" cy="246221"/>
-          </a:xfrm>
-          <a:prstGeom prst="rect">
-            <a:avLst/>
-          </a:prstGeom>
-          <a:noFill/>
-        </p:spPr>
-        <p:txBody>
-          <a:bodyPr wrap="none" rtlCol="0">
-            <a:spAutoFit/>
-          </a:bodyPr>
-          <a:lstStyle/>
-          <a:p>
-            <a:r>
-              <a:rPr lang="de-DE" sz="1000" b="1" dirty="0" smtClean="0"/>
-              <a:t>assign</a:t>
-            </a:r>
-            <a:endParaRPr lang="de-DE" sz="1000" b="1" dirty="0"/>
-          </a:p>
-        </p:txBody>
-      </p:sp>
-      <p:sp>
-        <p:nvSpPr>
-          <p:cNvPr id="67" name="Textfeld 66"/>
-          <p:cNvSpPr txBox="1"/>
-          <p:nvPr/>
-        </p:nvSpPr>
-        <p:spPr>
-          <a:xfrm>
-            <a:off x="4499992" y="1137666"/>
-            <a:ext cx="620683" cy="246221"/>
-          </a:xfrm>
-          <a:prstGeom prst="rect">
-            <a:avLst/>
-          </a:prstGeom>
-          <a:noFill/>
-        </p:spPr>
-        <p:txBody>
-          <a:bodyPr wrap="none" rtlCol="0">
-            <a:spAutoFit/>
-          </a:bodyPr>
-          <a:lstStyle/>
-          <a:p>
-            <a:r>
-              <a:rPr lang="de-DE" sz="1000" b="1" dirty="0" smtClean="0"/>
-              <a:t>reassign</a:t>
-            </a:r>
-            <a:endParaRPr lang="de-DE" sz="1000" b="1" dirty="0"/>
-          </a:p>
-        </p:txBody>
-      </p:sp>
-      <p:sp>
-        <p:nvSpPr>
-          <p:cNvPr id="68" name="Textfeld 67"/>
-          <p:cNvSpPr txBox="1"/>
-          <p:nvPr/>
-        </p:nvSpPr>
-        <p:spPr>
-          <a:xfrm rot="19513687">
-            <a:off x="2448541" y="950990"/>
-            <a:ext cx="910827" cy="246221"/>
-          </a:xfrm>
-          <a:prstGeom prst="rect">
-            <a:avLst/>
-          </a:prstGeom>
-          <a:noFill/>
-        </p:spPr>
-        <p:txBody>
-          <a:bodyPr wrap="none" rtlCol="0">
-            <a:spAutoFit/>
-          </a:bodyPr>
-          <a:lstStyle/>
-          <a:p>
-            <a:r>
-              <a:rPr lang="de-DE" sz="1000" b="1" dirty="0" smtClean="0"/>
-              <a:t>set</a:t>
-            </a:r>
-            <a:r>
-              <a:rPr lang="de-DE" sz="1000" dirty="0" smtClean="0"/>
-              <a:t> </a:t>
-            </a:r>
-            <a:r>
-              <a:rPr lang="de-DE" sz="1000" b="1" dirty="0" smtClean="0"/>
-              <a:t>Candidate</a:t>
-            </a:r>
-            <a:endParaRPr lang="de-DE" sz="1000" b="1" dirty="0"/>
-          </a:p>
-        </p:txBody>
-      </p:sp>
-      <p:sp>
-        <p:nvSpPr>
-          <p:cNvPr id="69" name="Bogen 68"/>
-          <p:cNvSpPr/>
-          <p:nvPr/>
-        </p:nvSpPr>
-        <p:spPr>
-          <a:xfrm rot="19412342">
-            <a:off x="1203611" y="1543077"/>
-            <a:ext cx="426828" cy="511958"/>
-          </a:xfrm>
-          <a:prstGeom prst="arc">
-            <a:avLst>
-              <a:gd name="adj1" fmla="val 6785932"/>
-              <a:gd name="adj2" fmla="val 3361853"/>
-            </a:avLst>
-          </a:prstGeom>
-          <a:ln w="12700">
-            <a:solidFill>
-              <a:schemeClr val="tx1"/>
-            </a:solidFill>
-            <a:headEnd type="arrow" w="med" len="med"/>
-            <a:tailEnd type="none" w="med" len="med"/>
-          </a:ln>
-        </p:spPr>
-        <p:style>
-          <a:lnRef idx="1">
-            <a:schemeClr val="accent1"/>
-          </a:lnRef>
-          <a:fillRef idx="0">
-            <a:schemeClr val="accent1"/>
-          </a:fillRef>
-          <a:effectRef idx="0">
-            <a:schemeClr val="accent1"/>
-          </a:effectRef>
-          <a:fontRef idx="minor">
-            <a:schemeClr val="tx1"/>
-          </a:fontRef>
-        </p:style>
-        <p:txBody>
-          <a:bodyPr rtlCol="0" anchor="ctr"/>
-          <a:lstStyle/>
-          <a:p>
-            <a:pPr algn="r"/>
-            <a:endParaRPr lang="de-DE" dirty="0"/>
-          </a:p>
-        </p:txBody>
-      </p:sp>
-      <p:sp>
-        <p:nvSpPr>
-          <p:cNvPr id="70" name="Textfeld 69"/>
-          <p:cNvSpPr txBox="1"/>
-          <p:nvPr/>
-        </p:nvSpPr>
-        <p:spPr>
-          <a:xfrm>
-            <a:off x="1119009" y="1350857"/>
-            <a:ext cx="910827" cy="246221"/>
-          </a:xfrm>
-          <a:prstGeom prst="rect">
-            <a:avLst/>
-          </a:prstGeom>
-          <a:noFill/>
-        </p:spPr>
-        <p:txBody>
-          <a:bodyPr wrap="none" rtlCol="0">
-            <a:spAutoFit/>
-          </a:bodyPr>
-          <a:lstStyle/>
-          <a:p>
-            <a:r>
-              <a:rPr lang="de-DE" sz="1000" b="1" dirty="0" smtClean="0"/>
-              <a:t>set</a:t>
-            </a:r>
-            <a:r>
-              <a:rPr lang="de-DE" sz="1000" dirty="0" smtClean="0"/>
-              <a:t> </a:t>
-            </a:r>
-            <a:r>
-              <a:rPr lang="de-DE" sz="1000" b="1" dirty="0" smtClean="0"/>
-              <a:t>Candidate</a:t>
-            </a:r>
-            <a:endParaRPr lang="de-DE" sz="1000" b="1" dirty="0"/>
-          </a:p>
-        </p:txBody>
-      </p:sp>
-      <p:sp>
-        <p:nvSpPr>
-          <p:cNvPr id="75" name="Bogen 74"/>
-          <p:cNvSpPr/>
-          <p:nvPr/>
-        </p:nvSpPr>
-        <p:spPr>
-          <a:xfrm rot="9194895" flipH="1" flipV="1">
-            <a:off x="4568990" y="416541"/>
-            <a:ext cx="813400" cy="142756"/>
-          </a:xfrm>
-          <a:prstGeom prst="arc">
-            <a:avLst>
-              <a:gd name="adj1" fmla="val 10944976"/>
-              <a:gd name="adj2" fmla="val 21191460"/>
-            </a:avLst>
-          </a:prstGeom>
-          <a:ln w="12700">
-            <a:solidFill>
-              <a:schemeClr val="tx1"/>
-            </a:solidFill>
-            <a:headEnd type="arrow" w="med" len="med"/>
-            <a:tailEnd type="none" w="med" len="med"/>
-          </a:ln>
-        </p:spPr>
-        <p:style>
-          <a:lnRef idx="1">
-            <a:schemeClr val="accent1"/>
-          </a:lnRef>
-          <a:fillRef idx="0">
-            <a:schemeClr val="accent1"/>
-          </a:fillRef>
-          <a:effectRef idx="0">
-            <a:schemeClr val="accent1"/>
-          </a:effectRef>
-          <a:fontRef idx="minor">
-            <a:schemeClr val="tx1"/>
-          </a:fontRef>
-        </p:style>
-        <p:txBody>
-          <a:bodyPr rtlCol="0" anchor="ctr"/>
-          <a:lstStyle/>
-          <a:p>
-            <a:pPr algn="r"/>
-            <a:endParaRPr lang="de-DE" dirty="0"/>
-          </a:p>
-        </p:txBody>
-      </p:sp>
-      <p:sp>
-        <p:nvSpPr>
-          <p:cNvPr id="76" name="Textfeld 75"/>
-          <p:cNvSpPr txBox="1"/>
-          <p:nvPr/>
-        </p:nvSpPr>
-        <p:spPr>
-          <a:xfrm rot="19994895">
-            <a:off x="4654926" y="220058"/>
-            <a:ext cx="518091" cy="246221"/>
-          </a:xfrm>
-          <a:prstGeom prst="rect">
-            <a:avLst/>
-          </a:prstGeom>
-          <a:noFill/>
-        </p:spPr>
-        <p:txBody>
-          <a:bodyPr wrap="none" rtlCol="0">
-            <a:spAutoFit/>
-          </a:bodyPr>
-          <a:lstStyle/>
-          <a:p>
-            <a:r>
-              <a:rPr lang="de-DE" sz="1000" b="1" dirty="0" smtClean="0"/>
-              <a:t>create</a:t>
-            </a:r>
-            <a:endParaRPr lang="de-DE" sz="1000" b="1" dirty="0"/>
-          </a:p>
-        </p:txBody>
-      </p:sp>
-      <p:sp>
-        <p:nvSpPr>
-          <p:cNvPr id="78" name="Textfeld 77"/>
-          <p:cNvSpPr txBox="1"/>
-          <p:nvPr/>
-        </p:nvSpPr>
-        <p:spPr>
-          <a:xfrm>
-            <a:off x="7092280" y="1383887"/>
-            <a:ext cx="1836712" cy="2000548"/>
-          </a:xfrm>
-          <a:prstGeom prst="rect">
-            <a:avLst/>
-          </a:prstGeom>
-          <a:noFill/>
-        </p:spPr>
-        <p:txBody>
-          <a:bodyPr wrap="square" rtlCol="0">
-            <a:spAutoFit/>
-          </a:bodyPr>
-          <a:lstStyle/>
-          <a:p>
-            <a:r>
-              <a:rPr lang="de-DE" sz="1200" dirty="0" smtClean="0"/>
-              <a:t>Task Lifecycle Operations </a:t>
-            </a:r>
-          </a:p>
-          <a:p>
-            <a:pPr marL="171450" indent="-171450">
-              <a:buFont typeface="Symbol" pitchFamily="18" charset="2"/>
-              <a:buChar char="-"/>
-            </a:pPr>
-            <a:r>
-              <a:rPr lang="de-DE" sz="1000" dirty="0" smtClean="0"/>
-              <a:t>Create</a:t>
-            </a:r>
-          </a:p>
-          <a:p>
-            <a:pPr marL="171450" indent="-171450">
-              <a:buFont typeface="Symbol" pitchFamily="18" charset="2"/>
-              <a:buChar char="-"/>
-            </a:pPr>
-            <a:r>
-              <a:rPr lang="de-DE" sz="1000" dirty="0" smtClean="0"/>
-              <a:t>Set Candidate</a:t>
-            </a:r>
-          </a:p>
-          <a:p>
-            <a:pPr marL="171450" indent="-171450">
-              <a:buFont typeface="Symbol" pitchFamily="18" charset="2"/>
-              <a:buChar char="-"/>
-            </a:pPr>
-            <a:r>
-              <a:rPr lang="de-DE" sz="1000" dirty="0" smtClean="0"/>
-              <a:t>Claim</a:t>
-            </a:r>
-          </a:p>
-          <a:p>
-            <a:pPr marL="171450" indent="-171450">
-              <a:buFont typeface="Symbol" pitchFamily="18" charset="2"/>
-              <a:buChar char="-"/>
-            </a:pPr>
-            <a:r>
-              <a:rPr lang="de-DE" sz="1000" dirty="0" smtClean="0"/>
-              <a:t>Unclaim</a:t>
-            </a:r>
-          </a:p>
-          <a:p>
-            <a:pPr marL="171450" indent="-171450">
-              <a:buFont typeface="Symbol" pitchFamily="18" charset="2"/>
-              <a:buChar char="-"/>
-            </a:pPr>
-            <a:r>
-              <a:rPr lang="de-DE" sz="1000" dirty="0" smtClean="0"/>
-              <a:t>Assign</a:t>
-            </a:r>
-          </a:p>
-          <a:p>
-            <a:pPr marL="171450" indent="-171450">
-              <a:buFont typeface="Symbol" pitchFamily="18" charset="2"/>
-              <a:buChar char="-"/>
-            </a:pPr>
-            <a:r>
-              <a:rPr lang="de-DE" sz="1000" dirty="0" smtClean="0"/>
-              <a:t>Reassign</a:t>
-            </a:r>
-          </a:p>
-          <a:p>
-            <a:pPr marL="171450" indent="-171450">
-              <a:buFont typeface="Symbol" pitchFamily="18" charset="2"/>
-              <a:buChar char="-"/>
-            </a:pPr>
-            <a:r>
-              <a:rPr lang="de-DE" sz="1000" dirty="0" smtClean="0"/>
-              <a:t>Delegate</a:t>
-            </a:r>
-          </a:p>
-          <a:p>
-            <a:pPr marL="171450" indent="-171450">
-              <a:buFont typeface="Symbol" pitchFamily="18" charset="2"/>
-              <a:buChar char="-"/>
-            </a:pPr>
-            <a:r>
-              <a:rPr lang="de-DE" sz="1000" dirty="0" smtClean="0"/>
-              <a:t>Resolve</a:t>
-            </a:r>
-          </a:p>
-          <a:p>
-            <a:pPr marL="171450" indent="-171450">
-              <a:buFont typeface="Symbol" pitchFamily="18" charset="2"/>
-              <a:buChar char="-"/>
-            </a:pPr>
-            <a:r>
-              <a:rPr lang="de-DE" sz="1000" dirty="0" smtClean="0"/>
-              <a:t>Complete</a:t>
-            </a:r>
-          </a:p>
-          <a:p>
-            <a:pPr marL="171450" indent="-171450">
-              <a:buFont typeface="Symbol" pitchFamily="18" charset="2"/>
-              <a:buChar char="-"/>
-            </a:pPr>
-            <a:r>
-              <a:rPr lang="de-DE" sz="1000" dirty="0" smtClean="0"/>
-              <a:t>Delete</a:t>
-            </a:r>
-          </a:p>
-          <a:p>
-            <a:pPr marL="171450" indent="-171450">
-              <a:buFontTx/>
-              <a:buChar char="-"/>
-            </a:pPr>
-            <a:endParaRPr lang="de-DE" sz="1200" dirty="0"/>
-          </a:p>
-        </p:txBody>
-      </p:sp>
-      <p:sp>
-        <p:nvSpPr>
-          <p:cNvPr id="79" name="Textfeld 78"/>
-          <p:cNvSpPr txBox="1"/>
-          <p:nvPr/>
-        </p:nvSpPr>
-        <p:spPr>
-          <a:xfrm>
-            <a:off x="7092280" y="62305"/>
-            <a:ext cx="1433085" cy="1200329"/>
-          </a:xfrm>
-          <a:prstGeom prst="rect">
-            <a:avLst/>
-          </a:prstGeom>
-          <a:noFill/>
-        </p:spPr>
-        <p:txBody>
-          <a:bodyPr wrap="none" rtlCol="0">
-            <a:spAutoFit/>
-          </a:bodyPr>
-          <a:lstStyle/>
-          <a:p>
-            <a:r>
-              <a:rPr lang="de-DE" sz="1200" dirty="0" smtClean="0"/>
-              <a:t>Task Lifecycle States</a:t>
-            </a:r>
-          </a:p>
-          <a:p>
-            <a:pPr marL="171450" indent="-171450">
-              <a:buFont typeface="Symbol" pitchFamily="18" charset="2"/>
-              <a:buChar char="-"/>
-            </a:pPr>
-            <a:r>
-              <a:rPr lang="de-DE" sz="1000" dirty="0" smtClean="0"/>
-              <a:t>New</a:t>
-            </a:r>
-          </a:p>
-          <a:p>
-            <a:pPr marL="171450" indent="-171450">
-              <a:buFont typeface="Symbol" pitchFamily="18" charset="2"/>
-              <a:buChar char="-"/>
-            </a:pPr>
-            <a:r>
-              <a:rPr lang="de-DE" sz="1000" dirty="0" smtClean="0"/>
-              <a:t>Unclaimed</a:t>
-            </a:r>
-          </a:p>
-          <a:p>
-            <a:pPr marL="171450" indent="-171450">
-              <a:buFont typeface="Symbol" pitchFamily="18" charset="2"/>
-              <a:buChar char="-"/>
-            </a:pPr>
-            <a:r>
-              <a:rPr lang="de-DE" sz="1000" dirty="0" smtClean="0"/>
-              <a:t>Claimed/Assigned</a:t>
-            </a:r>
-          </a:p>
-          <a:p>
-            <a:pPr marL="171450" indent="-171450">
-              <a:buFont typeface="Symbol" pitchFamily="18" charset="2"/>
-              <a:buChar char="-"/>
-            </a:pPr>
-            <a:r>
-              <a:rPr lang="de-DE" sz="1000" dirty="0" smtClean="0"/>
-              <a:t>Delegated</a:t>
-            </a:r>
-          </a:p>
-          <a:p>
-            <a:pPr marL="171450" indent="-171450">
-              <a:buFont typeface="Symbol" pitchFamily="18" charset="2"/>
-              <a:buChar char="-"/>
-            </a:pPr>
-            <a:r>
-              <a:rPr lang="de-DE" sz="1000" dirty="0" smtClean="0"/>
-              <a:t>Completed</a:t>
-            </a:r>
-          </a:p>
-          <a:p>
-            <a:pPr marL="171450" indent="-171450">
-              <a:buFont typeface="Symbol" pitchFamily="18" charset="2"/>
-              <a:buChar char="-"/>
-            </a:pPr>
-            <a:r>
-              <a:rPr lang="de-DE" sz="1000" dirty="0" smtClean="0"/>
-              <a:t>Deleted</a:t>
-            </a:r>
-            <a:endParaRPr lang="de-DE" sz="1000" dirty="0"/>
-          </a:p>
-        </p:txBody>
-      </p:sp>
-      <p:sp>
-        <p:nvSpPr>
-          <p:cNvPr id="88" name="Ellipse 87"/>
-          <p:cNvSpPr/>
-          <p:nvPr/>
-        </p:nvSpPr>
-        <p:spPr>
-          <a:xfrm>
-            <a:off x="5240153" y="214195"/>
-            <a:ext cx="133823" cy="128736"/>
-          </a:xfrm>
-          <a:prstGeom prst="ellipse">
-            <a:avLst/>
-          </a:prstGeom>
-        </p:spPr>
-        <p:style>
-          <a:lnRef idx="2">
-            <a:schemeClr val="dk1">
-              <a:shade val="50000"/>
-            </a:schemeClr>
-          </a:lnRef>
-          <a:fillRef idx="1">
-            <a:schemeClr val="dk1"/>
-          </a:fillRef>
-          <a:effectRef idx="0">
-            <a:schemeClr val="dk1"/>
-          </a:effectRef>
-          <a:fontRef idx="minor">
-            <a:schemeClr val="lt1"/>
-          </a:fontRef>
-        </p:style>
-        <p:txBody>
-          <a:bodyPr rtlCol="0" anchor="ctr"/>
-          <a:lstStyle/>
-          <a:p>
-            <a:pPr algn="ctr"/>
-            <a:endParaRPr lang="de-DE" dirty="0"/>
-          </a:p>
-        </p:txBody>
-      </p:sp>
-      <p:grpSp>
-        <p:nvGrpSpPr>
-          <p:cNvPr id="91" name="Gruppieren 90"/>
-          <p:cNvGrpSpPr/>
-          <p:nvPr/>
-        </p:nvGrpSpPr>
-        <p:grpSpPr>
-          <a:xfrm>
-            <a:off x="3080475" y="3731500"/>
-            <a:ext cx="189910" cy="194913"/>
-            <a:chOff x="3033962" y="3676302"/>
-            <a:chExt cx="189910" cy="194913"/>
-          </a:xfrm>
-        </p:grpSpPr>
-        <p:sp>
-          <p:nvSpPr>
-            <p:cNvPr id="89" name="Ellipse 88"/>
-            <p:cNvSpPr/>
-            <p:nvPr/>
-          </p:nvSpPr>
-          <p:spPr>
-            <a:xfrm>
-              <a:off x="3072267" y="3711794"/>
-              <a:ext cx="113300" cy="123927"/>
-            </a:xfrm>
-            <a:prstGeom prst="ellipse">
-              <a:avLst/>
-            </a:prstGeom>
-          </p:spPr>
-          <p:style>
-            <a:lnRef idx="2">
-              <a:schemeClr val="dk1">
-                <a:shade val="50000"/>
-              </a:schemeClr>
-            </a:lnRef>
-            <a:fillRef idx="1">
-              <a:schemeClr val="dk1"/>
-            </a:fillRef>
-            <a:effectRef idx="0">
-              <a:schemeClr val="dk1"/>
-            </a:effectRef>
-            <a:fontRef idx="minor">
-              <a:schemeClr val="lt1"/>
-            </a:fontRef>
-          </p:style>
-          <p:txBody>
-            <a:bodyPr rtlCol="0" anchor="ctr"/>
-            <a:lstStyle/>
-            <a:p>
-              <a:pPr algn="ctr"/>
-              <a:endParaRPr lang="de-DE" dirty="0"/>
-            </a:p>
-          </p:txBody>
-        </p:sp>
-        <p:sp>
-          <p:nvSpPr>
-            <p:cNvPr id="90" name="Ellipse 89"/>
-            <p:cNvSpPr/>
-            <p:nvPr/>
-          </p:nvSpPr>
-          <p:spPr>
-            <a:xfrm>
-              <a:off x="3033962" y="3676302"/>
-              <a:ext cx="189910" cy="194913"/>
-            </a:xfrm>
-            <a:prstGeom prst="ellipse">
-              <a:avLst/>
-            </a:prstGeom>
-            <a:noFill/>
-          </p:spPr>
-          <p:style>
-            <a:lnRef idx="2">
-              <a:schemeClr val="dk1"/>
-            </a:lnRef>
-            <a:fillRef idx="1">
-              <a:schemeClr val="lt1"/>
-            </a:fillRef>
-            <a:effectRef idx="0">
-              <a:schemeClr val="dk1"/>
-            </a:effectRef>
-            <a:fontRef idx="minor">
-              <a:schemeClr val="dk1"/>
-            </a:fontRef>
-          </p:style>
-          <p:txBody>
-            <a:bodyPr rtlCol="0" anchor="ctr"/>
-            <a:lstStyle/>
-            <a:p>
-              <a:pPr algn="ctr"/>
-              <a:endParaRPr lang="de-DE" dirty="0"/>
-            </a:p>
-          </p:txBody>
-        </p:sp>
-      </p:grpSp>
-      <p:sp>
-        <p:nvSpPr>
-          <p:cNvPr id="92" name="Bogen 91"/>
-          <p:cNvSpPr/>
-          <p:nvPr/>
-        </p:nvSpPr>
-        <p:spPr>
-          <a:xfrm rot="9191905" flipH="1" flipV="1">
-            <a:off x="3204089" y="3635627"/>
-            <a:ext cx="594703" cy="142756"/>
-          </a:xfrm>
-          <a:prstGeom prst="arc">
-            <a:avLst>
-              <a:gd name="adj1" fmla="val 11357577"/>
-              <a:gd name="adj2" fmla="val 20429806"/>
-            </a:avLst>
-          </a:prstGeom>
-          <a:ln w="12700">
-            <a:solidFill>
-              <a:schemeClr val="tx1"/>
-            </a:solidFill>
-            <a:headEnd type="arrow" w="med" len="med"/>
-            <a:tailEnd type="none" w="med" len="med"/>
-          </a:ln>
-        </p:spPr>
-        <p:style>
-          <a:lnRef idx="1">
-            <a:schemeClr val="accent1"/>
-          </a:lnRef>
-          <a:fillRef idx="0">
-            <a:schemeClr val="accent1"/>
-          </a:fillRef>
-          <a:effectRef idx="0">
-            <a:schemeClr val="accent1"/>
-          </a:effectRef>
-          <a:fontRef idx="minor">
-            <a:schemeClr val="tx1"/>
-          </a:fontRef>
-        </p:style>
-        <p:txBody>
-          <a:bodyPr rtlCol="0" anchor="ctr"/>
-          <a:lstStyle/>
-          <a:p>
-            <a:pPr algn="r"/>
-            <a:endParaRPr lang="de-DE" dirty="0"/>
-          </a:p>
-        </p:txBody>
-      </p:sp>
-      <p:sp>
-        <p:nvSpPr>
-          <p:cNvPr id="45" name="Textfeld 70"/>
-          <p:cNvSpPr txBox="1"/>
-          <p:nvPr/>
-        </p:nvSpPr>
-        <p:spPr>
-          <a:xfrm>
-            <a:off x="1043608" y="9694"/>
-            <a:ext cx="1432315" cy="369332"/>
-          </a:xfrm>
-          <a:prstGeom prst="rect">
-            <a:avLst/>
-          </a:prstGeom>
-          <a:noFill/>
-        </p:spPr>
-        <p:txBody>
-          <a:bodyPr wrap="none" rtlCol="0">
-            <a:spAutoFit/>
-          </a:bodyPr>
-          <a:lstStyle/>
-          <a:p>
-            <a:r>
-              <a:rPr lang="de-DE" dirty="0" smtClean="0"/>
-              <a:t>Task Lifecycle</a:t>
-            </a:r>
-            <a:endParaRPr lang="de-DE" dirty="0"/>
-          </a:p>
-        </p:txBody>
-      </p:sp>
-    </p:spTree>
-    <p:extLst>
-      <p:ext uri="{BB962C8B-B14F-4D97-AF65-F5344CB8AC3E}">
-        <p14:creationId xmlns:p14="http://schemas.microsoft.com/office/powerpoint/2010/main" val="3435161637"/>
-      </p:ext>
-    </p:extLst>
-  </p:cSld>
-  <p:clrMapOvr>
-    <a:masterClrMapping/>
-  </p:clrMapOvr>
+  <p:timing>
+    <p:tnLst>
+      <p:par>
+        <p:cTn id="1" dur="indefinite" restart="never" nodeType="tmRoot"/>
+      </p:par>
+    </p:tnLst>
+  </p:timing>
 </p:sld>
 </file>
 
 <file path=ppt/theme/theme1.xml><?xml version="1.0" encoding="utf-8"?>
-<a:theme xmlns:a="http://schemas.openxmlformats.org/drawingml/2006/main" name="Larissa">
+<a:theme xmlns:a="http://schemas.openxmlformats.org/drawingml/2006/main" name="Office Theme">
   <a:themeElements>
-    <a:clrScheme name="Larissa">
+    <a:clrScheme name="Office">
       <a:dk1>
         <a:sysClr val="windowText" lastClr="000000"/>
       </a:dk1>
@@ -6604,39 +4509,39 @@
         <a:sysClr val="window" lastClr="FFFFFF"/>
       </a:lt1>
       <a:dk2>
-        <a:srgbClr val="1F497D"/>
+        <a:srgbClr val="44546A"/>
       </a:dk2>
       <a:lt2>
-        <a:srgbClr val="EEECE1"/>
+        <a:srgbClr val="E7E6E6"/>
       </a:lt2>
       <a:accent1>
-        <a:srgbClr val="4F81BD"/>
+        <a:srgbClr val="5B9BD5"/>
       </a:accent1>
       <a:accent2>
-        <a:srgbClr val="C0504D"/>
+        <a:srgbClr val="ED7D31"/>
       </a:accent2>
       <a:accent3>
-        <a:srgbClr val="9BBB59"/>
+        <a:srgbClr val="A5A5A5"/>
       </a:accent3>
       <a:accent4>
-        <a:srgbClr val="8064A2"/>
+        <a:srgbClr val="FFC000"/>
       </a:accent4>
       <a:accent5>
-        <a:srgbClr val="4BACC6"/>
+        <a:srgbClr val="4472C4"/>
       </a:accent5>
       <a:accent6>
-        <a:srgbClr val="F79646"/>
+        <a:srgbClr val="70AD47"/>
       </a:accent6>
       <a:hlink>
-        <a:srgbClr val="0000FF"/>
+        <a:srgbClr val="0563C1"/>
       </a:hlink>
       <a:folHlink>
-        <a:srgbClr val="800080"/>
+        <a:srgbClr val="954F72"/>
       </a:folHlink>
     </a:clrScheme>
-    <a:fontScheme name="Larissa">
+    <a:fontScheme name="Office">
       <a:majorFont>
-        <a:latin typeface="Calibri"/>
+        <a:latin typeface="Calibri Light" panose="020F0302020204030204"/>
         <a:ea typeface=""/>
         <a:cs typeface=""/>
         <a:font script="Jpan" typeface="ＭＳ Ｐゴシック"/>
@@ -6671,7 +4576,7 @@
         <a:font script="Geor" typeface="Sylfaen"/>
       </a:majorFont>
       <a:minorFont>
-        <a:latin typeface="Calibri"/>
+        <a:latin typeface="Calibri" panose="020F0502020204030204"/>
         <a:ea typeface=""/>
         <a:cs typeface=""/>
         <a:font script="Jpan" typeface="ＭＳ Ｐゴシック"/>
@@ -6706,7 +4611,7 @@
         <a:font script="Geor" typeface="Sylfaen"/>
       </a:minorFont>
     </a:fontScheme>
-    <a:fmtScheme name="Larissa">
+    <a:fmtScheme name="Office">
       <a:fillStyleLst>
         <a:solidFill>
           <a:schemeClr val="phClr"/>
@@ -6715,165 +4620,141 @@
           <a:gsLst>
             <a:gs pos="0">
               <a:schemeClr val="phClr">
-                <a:tint val="50000"/>
-                <a:satMod val="300000"/>
+                <a:lumMod val="110000"/>
+                <a:satMod val="105000"/>
+                <a:tint val="67000"/>
               </a:schemeClr>
             </a:gs>
-            <a:gs pos="35000">
+            <a:gs pos="50000">
               <a:schemeClr val="phClr">
-                <a:tint val="37000"/>
-                <a:satMod val="300000"/>
+                <a:lumMod val="105000"/>
+                <a:satMod val="103000"/>
+                <a:tint val="73000"/>
               </a:schemeClr>
             </a:gs>
             <a:gs pos="100000">
               <a:schemeClr val="phClr">
-                <a:tint val="15000"/>
-                <a:satMod val="350000"/>
+                <a:lumMod val="105000"/>
+                <a:satMod val="109000"/>
+                <a:tint val="81000"/>
               </a:schemeClr>
             </a:gs>
           </a:gsLst>
-          <a:lin ang="16200000" scaled="1"/>
+          <a:lin ang="5400000" scaled="0"/>
         </a:gradFill>
         <a:gradFill rotWithShape="1">
           <a:gsLst>
             <a:gs pos="0">
               <a:schemeClr val="phClr">
-                <a:shade val="51000"/>
-                <a:satMod val="130000"/>
+                <a:satMod val="103000"/>
+                <a:lumMod val="102000"/>
+                <a:tint val="94000"/>
               </a:schemeClr>
             </a:gs>
-            <a:gs pos="80000">
+            <a:gs pos="50000">
               <a:schemeClr val="phClr">
-                <a:shade val="93000"/>
-                <a:satMod val="130000"/>
+                <a:satMod val="110000"/>
+                <a:lumMod val="100000"/>
+                <a:shade val="100000"/>
               </a:schemeClr>
             </a:gs>
             <a:gs pos="100000">
               <a:schemeClr val="phClr">
-                <a:shade val="94000"/>
-                <a:satMod val="135000"/>
+                <a:lumMod val="99000"/>
+                <a:satMod val="120000"/>
+                <a:shade val="78000"/>
               </a:schemeClr>
             </a:gs>
           </a:gsLst>
-          <a:lin ang="16200000" scaled="0"/>
+          <a:lin ang="5400000" scaled="0"/>
         </a:gradFill>
       </a:fillStyleLst>
       <a:lnStyleLst>
-        <a:ln w="9525" cap="flat" cmpd="sng" algn="ctr">
-          <a:solidFill>
-            <a:schemeClr val="phClr">
-              <a:shade val="95000"/>
-              <a:satMod val="105000"/>
-            </a:schemeClr>
-          </a:solidFill>
-          <a:prstDash val="solid"/>
-        </a:ln>
-        <a:ln w="25400" cap="flat" cmpd="sng" algn="ctr">
+        <a:ln w="6350" cap="flat" cmpd="sng" algn="ctr">
           <a:solidFill>
             <a:schemeClr val="phClr"/>
           </a:solidFill>
           <a:prstDash val="solid"/>
+          <a:miter lim="800000"/>
         </a:ln>
-        <a:ln w="38100" cap="flat" cmpd="sng" algn="ctr">
+        <a:ln w="12700" cap="flat" cmpd="sng" algn="ctr">
           <a:solidFill>
             <a:schemeClr val="phClr"/>
           </a:solidFill>
           <a:prstDash val="solid"/>
+          <a:miter lim="800000"/>
+        </a:ln>
+        <a:ln w="19050" cap="flat" cmpd="sng" algn="ctr">
+          <a:solidFill>
+            <a:schemeClr val="phClr"/>
+          </a:solidFill>
+          <a:prstDash val="solid"/>
+          <a:miter lim="800000"/>
         </a:ln>
       </a:lnStyleLst>
       <a:effectStyleLst>
         <a:effectStyle>
+          <a:effectLst/>
+        </a:effectStyle>
+        <a:effectStyle>
+          <a:effectLst/>
+        </a:effectStyle>
+        <a:effectStyle>
           <a:effectLst>
-            <a:outerShdw blurRad="40000" dist="20000" dir="5400000" rotWithShape="0">
+            <a:outerShdw blurRad="57150" dist="19050" dir="5400000" algn="ctr" rotWithShape="0">
               <a:srgbClr val="000000">
-                <a:alpha val="38000"/>
+                <a:alpha val="63000"/>
               </a:srgbClr>
             </a:outerShdw>
           </a:effectLst>
-        </a:effectStyle>
-        <a:effectStyle>
-          <a:effectLst>
-            <a:outerShdw blurRad="40000" dist="23000" dir="5400000" rotWithShape="0">
-              <a:srgbClr val="000000">
-                <a:alpha val="35000"/>
-              </a:srgbClr>
-            </a:outerShdw>
-          </a:effectLst>
-        </a:effectStyle>
-        <a:effectStyle>
-          <a:effectLst>
-            <a:outerShdw blurRad="40000" dist="23000" dir="5400000" rotWithShape="0">
-              <a:srgbClr val="000000">
-                <a:alpha val="35000"/>
-              </a:srgbClr>
-            </a:outerShdw>
-          </a:effectLst>
-          <a:scene3d>
-            <a:camera prst="orthographicFront">
-              <a:rot lat="0" lon="0" rev="0"/>
-            </a:camera>
-            <a:lightRig rig="threePt" dir="t">
-              <a:rot lat="0" lon="0" rev="1200000"/>
-            </a:lightRig>
-          </a:scene3d>
-          <a:sp3d>
-            <a:bevelT w="63500" h="25400"/>
-          </a:sp3d>
         </a:effectStyle>
       </a:effectStyleLst>
       <a:bgFillStyleLst>
         <a:solidFill>
           <a:schemeClr val="phClr"/>
         </a:solidFill>
+        <a:solidFill>
+          <a:schemeClr val="phClr">
+            <a:tint val="95000"/>
+            <a:satMod val="170000"/>
+          </a:schemeClr>
+        </a:solidFill>
         <a:gradFill rotWithShape="1">
           <a:gsLst>
             <a:gs pos="0">
               <a:schemeClr val="phClr">
-                <a:tint val="40000"/>
-                <a:satMod val="350000"/>
+                <a:tint val="93000"/>
+                <a:satMod val="150000"/>
+                <a:shade val="98000"/>
+                <a:lumMod val="102000"/>
               </a:schemeClr>
             </a:gs>
-            <a:gs pos="40000">
+            <a:gs pos="50000">
               <a:schemeClr val="phClr">
-                <a:tint val="45000"/>
-                <a:shade val="99000"/>
-                <a:satMod val="350000"/>
+                <a:tint val="98000"/>
+                <a:satMod val="130000"/>
+                <a:shade val="90000"/>
+                <a:lumMod val="103000"/>
               </a:schemeClr>
             </a:gs>
             <a:gs pos="100000">
               <a:schemeClr val="phClr">
-                <a:shade val="20000"/>
-                <a:satMod val="255000"/>
+                <a:shade val="63000"/>
+                <a:satMod val="120000"/>
               </a:schemeClr>
             </a:gs>
           </a:gsLst>
-          <a:path path="circle">
-            <a:fillToRect l="50000" t="-80000" r="50000" b="180000"/>
-          </a:path>
-        </a:gradFill>
-        <a:gradFill rotWithShape="1">
-          <a:gsLst>
-            <a:gs pos="0">
-              <a:schemeClr val="phClr">
-                <a:tint val="80000"/>
-                <a:satMod val="300000"/>
-              </a:schemeClr>
-            </a:gs>
-            <a:gs pos="100000">
-              <a:schemeClr val="phClr">
-                <a:shade val="30000"/>
-                <a:satMod val="200000"/>
-              </a:schemeClr>
-            </a:gs>
-          </a:gsLst>
-          <a:path path="circle">
-            <a:fillToRect l="50000" t="50000" r="50000" b="50000"/>
-          </a:path>
+          <a:lin ang="5400000" scaled="0"/>
         </a:gradFill>
       </a:bgFillStyleLst>
     </a:fmtScheme>
   </a:themeElements>
   <a:objectDefaults/>
   <a:extraClrSchemeLst/>
+  <a:extLst>
+    <a:ext uri="{05A4C25C-085E-4340-85A3-A5531E510DB2}">
+      <thm15:themeFamily xmlns:thm15="http://schemas.microsoft.com/office/thememl/2012/main" name="Office Theme" id="{62F939B6-93AF-4DB8-9C6B-D6C7DFDC589F}" vid="{4A3C46E8-61CC-4603-A589-7422A47A8E4A}"/>
+    </a:ext>
+  </a:extLst>
 </a:theme>
 </file>
</xml_diff>

<commit_message>
fix(webapps): update task lifecycle image
related to #CAM-1655
</commit_message>
<xml_diff>
--- a/develop/drawings/TaskLifeCycle.pptx
+++ b/develop/drawings/TaskLifeCycle.pptx
@@ -104,6 +104,11 @@
       </a:defRPr>
     </a:lvl9pPr>
   </p:defaultTextStyle>
+  <p:extLst>
+    <p:ext uri="{EFAFB233-063F-42B5-8137-9DF3F51BA10A}">
+      <p15:sldGuideLst xmlns:p15="http://schemas.microsoft.com/office/powerpoint/2012/main"/>
+    </p:ext>
+  </p:extLst>
 </p:presentation>
 </file>
 
@@ -149,10 +154,9 @@
           </a:lstStyle>
           <a:p>
             <a:r>
-              <a:rPr lang="de-DE" smtClean="0"/>
+              <a:rPr lang="de-DE"/>
               <a:t>Titelmasterformat durch Klicken bearbeiten</a:t>
             </a:r>
-            <a:endParaRPr lang="de-DE"/>
           </a:p>
         </p:txBody>
       </p:sp>
@@ -214,10 +218,9 @@
           </a:lstStyle>
           <a:p>
             <a:r>
-              <a:rPr lang="de-DE" smtClean="0"/>
+              <a:rPr lang="de-DE"/>
               <a:t>Formatvorlage des Untertitelmasters durch Klicken bearbeiten</a:t>
             </a:r>
-            <a:endParaRPr lang="de-DE"/>
           </a:p>
         </p:txBody>
       </p:sp>
@@ -238,7 +241,7 @@
           <a:p>
             <a:fld id="{D8DCA20A-278F-45B7-BBF6-0081BC7E6569}" type="datetimeFigureOut">
               <a:rPr lang="de-DE" smtClean="0"/>
-              <a:t>23.10.2015</a:t>
+              <a:t>22.03.2016</a:t>
             </a:fld>
             <a:endParaRPr lang="de-DE"/>
           </a:p>
@@ -332,10 +335,9 @@
           <a:lstStyle/>
           <a:p>
             <a:r>
-              <a:rPr lang="de-DE" smtClean="0"/>
+              <a:rPr lang="de-DE"/>
               <a:t>Titelmasterformat durch Klicken bearbeiten</a:t>
             </a:r>
-            <a:endParaRPr lang="de-DE"/>
           </a:p>
         </p:txBody>
       </p:sp>
@@ -356,38 +358,37 @@
           <a:p>
             <a:pPr lvl="0"/>
             <a:r>
-              <a:rPr lang="de-DE" smtClean="0"/>
+              <a:rPr lang="de-DE"/>
               <a:t>Textmasterformat bearbeiten</a:t>
             </a:r>
           </a:p>
           <a:p>
             <a:pPr lvl="1"/>
             <a:r>
-              <a:rPr lang="de-DE" smtClean="0"/>
+              <a:rPr lang="de-DE"/>
               <a:t>Zweite Ebene</a:t>
             </a:r>
           </a:p>
           <a:p>
             <a:pPr lvl="2"/>
             <a:r>
-              <a:rPr lang="de-DE" smtClean="0"/>
+              <a:rPr lang="de-DE"/>
               <a:t>Dritte Ebene</a:t>
             </a:r>
           </a:p>
           <a:p>
             <a:pPr lvl="3"/>
             <a:r>
-              <a:rPr lang="de-DE" smtClean="0"/>
+              <a:rPr lang="de-DE"/>
               <a:t>Vierte Ebene</a:t>
             </a:r>
           </a:p>
           <a:p>
             <a:pPr lvl="4"/>
             <a:r>
-              <a:rPr lang="de-DE" smtClean="0"/>
+              <a:rPr lang="de-DE"/>
               <a:t>Fünfte Ebene</a:t>
             </a:r>
-            <a:endParaRPr lang="de-DE"/>
           </a:p>
         </p:txBody>
       </p:sp>
@@ -408,7 +409,7 @@
           <a:p>
             <a:fld id="{D8DCA20A-278F-45B7-BBF6-0081BC7E6569}" type="datetimeFigureOut">
               <a:rPr lang="de-DE" smtClean="0"/>
-              <a:t>23.10.2015</a:t>
+              <a:t>22.03.2016</a:t>
             </a:fld>
             <a:endParaRPr lang="de-DE"/>
           </a:p>
@@ -507,10 +508,9 @@
           <a:lstStyle/>
           <a:p>
             <a:r>
-              <a:rPr lang="de-DE" smtClean="0"/>
+              <a:rPr lang="de-DE"/>
               <a:t>Titelmasterformat durch Klicken bearbeiten</a:t>
             </a:r>
-            <a:endParaRPr lang="de-DE"/>
           </a:p>
         </p:txBody>
       </p:sp>
@@ -536,38 +536,37 @@
           <a:p>
             <a:pPr lvl="0"/>
             <a:r>
-              <a:rPr lang="de-DE" smtClean="0"/>
+              <a:rPr lang="de-DE"/>
               <a:t>Textmasterformat bearbeiten</a:t>
             </a:r>
           </a:p>
           <a:p>
             <a:pPr lvl="1"/>
             <a:r>
-              <a:rPr lang="de-DE" smtClean="0"/>
+              <a:rPr lang="de-DE"/>
               <a:t>Zweite Ebene</a:t>
             </a:r>
           </a:p>
           <a:p>
             <a:pPr lvl="2"/>
             <a:r>
-              <a:rPr lang="de-DE" smtClean="0"/>
+              <a:rPr lang="de-DE"/>
               <a:t>Dritte Ebene</a:t>
             </a:r>
           </a:p>
           <a:p>
             <a:pPr lvl="3"/>
             <a:r>
-              <a:rPr lang="de-DE" smtClean="0"/>
+              <a:rPr lang="de-DE"/>
               <a:t>Vierte Ebene</a:t>
             </a:r>
           </a:p>
           <a:p>
             <a:pPr lvl="4"/>
             <a:r>
-              <a:rPr lang="de-DE" smtClean="0"/>
+              <a:rPr lang="de-DE"/>
               <a:t>Fünfte Ebene</a:t>
             </a:r>
-            <a:endParaRPr lang="de-DE"/>
           </a:p>
         </p:txBody>
       </p:sp>
@@ -588,7 +587,7 @@
           <a:p>
             <a:fld id="{D8DCA20A-278F-45B7-BBF6-0081BC7E6569}" type="datetimeFigureOut">
               <a:rPr lang="de-DE" smtClean="0"/>
-              <a:t>23.10.2015</a:t>
+              <a:t>22.03.2016</a:t>
             </a:fld>
             <a:endParaRPr lang="de-DE"/>
           </a:p>
@@ -682,10 +681,9 @@
           <a:lstStyle/>
           <a:p>
             <a:r>
-              <a:rPr lang="de-DE" smtClean="0"/>
+              <a:rPr lang="de-DE"/>
               <a:t>Titelmasterformat durch Klicken bearbeiten</a:t>
             </a:r>
-            <a:endParaRPr lang="de-DE"/>
           </a:p>
         </p:txBody>
       </p:sp>
@@ -706,38 +704,37 @@
           <a:p>
             <a:pPr lvl="0"/>
             <a:r>
-              <a:rPr lang="de-DE" smtClean="0"/>
+              <a:rPr lang="de-DE"/>
               <a:t>Textmasterformat bearbeiten</a:t>
             </a:r>
           </a:p>
           <a:p>
             <a:pPr lvl="1"/>
             <a:r>
-              <a:rPr lang="de-DE" smtClean="0"/>
+              <a:rPr lang="de-DE"/>
               <a:t>Zweite Ebene</a:t>
             </a:r>
           </a:p>
           <a:p>
             <a:pPr lvl="2"/>
             <a:r>
-              <a:rPr lang="de-DE" smtClean="0"/>
+              <a:rPr lang="de-DE"/>
               <a:t>Dritte Ebene</a:t>
             </a:r>
           </a:p>
           <a:p>
             <a:pPr lvl="3"/>
             <a:r>
-              <a:rPr lang="de-DE" smtClean="0"/>
+              <a:rPr lang="de-DE"/>
               <a:t>Vierte Ebene</a:t>
             </a:r>
           </a:p>
           <a:p>
             <a:pPr lvl="4"/>
             <a:r>
-              <a:rPr lang="de-DE" smtClean="0"/>
+              <a:rPr lang="de-DE"/>
               <a:t>Fünfte Ebene</a:t>
             </a:r>
-            <a:endParaRPr lang="de-DE"/>
           </a:p>
         </p:txBody>
       </p:sp>
@@ -758,7 +755,7 @@
           <a:p>
             <a:fld id="{D8DCA20A-278F-45B7-BBF6-0081BC7E6569}" type="datetimeFigureOut">
               <a:rPr lang="de-DE" smtClean="0"/>
-              <a:t>23.10.2015</a:t>
+              <a:t>22.03.2016</a:t>
             </a:fld>
             <a:endParaRPr lang="de-DE"/>
           </a:p>
@@ -861,10 +858,9 @@
           </a:lstStyle>
           <a:p>
             <a:r>
-              <a:rPr lang="de-DE" smtClean="0"/>
+              <a:rPr lang="de-DE"/>
               <a:t>Titelmasterformat durch Klicken bearbeiten</a:t>
             </a:r>
-            <a:endParaRPr lang="de-DE"/>
           </a:p>
         </p:txBody>
       </p:sp>
@@ -981,7 +977,7 @@
           <a:p>
             <a:pPr lvl="0"/>
             <a:r>
-              <a:rPr lang="de-DE" smtClean="0"/>
+              <a:rPr lang="de-DE"/>
               <a:t>Textmasterformat bearbeiten</a:t>
             </a:r>
           </a:p>
@@ -1004,7 +1000,7 @@
           <a:p>
             <a:fld id="{D8DCA20A-278F-45B7-BBF6-0081BC7E6569}" type="datetimeFigureOut">
               <a:rPr lang="de-DE" smtClean="0"/>
-              <a:t>23.10.2015</a:t>
+              <a:t>22.03.2016</a:t>
             </a:fld>
             <a:endParaRPr lang="de-DE"/>
           </a:p>
@@ -1098,10 +1094,9 @@
           <a:lstStyle/>
           <a:p>
             <a:r>
-              <a:rPr lang="de-DE" smtClean="0"/>
+              <a:rPr lang="de-DE"/>
               <a:t>Titelmasterformat durch Klicken bearbeiten</a:t>
             </a:r>
-            <a:endParaRPr lang="de-DE"/>
           </a:p>
         </p:txBody>
       </p:sp>
@@ -1127,38 +1122,37 @@
           <a:p>
             <a:pPr lvl="0"/>
             <a:r>
-              <a:rPr lang="de-DE" smtClean="0"/>
+              <a:rPr lang="de-DE"/>
               <a:t>Textmasterformat bearbeiten</a:t>
             </a:r>
           </a:p>
           <a:p>
             <a:pPr lvl="1"/>
             <a:r>
-              <a:rPr lang="de-DE" smtClean="0"/>
+              <a:rPr lang="de-DE"/>
               <a:t>Zweite Ebene</a:t>
             </a:r>
           </a:p>
           <a:p>
             <a:pPr lvl="2"/>
             <a:r>
-              <a:rPr lang="de-DE" smtClean="0"/>
+              <a:rPr lang="de-DE"/>
               <a:t>Dritte Ebene</a:t>
             </a:r>
           </a:p>
           <a:p>
             <a:pPr lvl="3"/>
             <a:r>
-              <a:rPr lang="de-DE" smtClean="0"/>
+              <a:rPr lang="de-DE"/>
               <a:t>Vierte Ebene</a:t>
             </a:r>
           </a:p>
           <a:p>
             <a:pPr lvl="4"/>
             <a:r>
-              <a:rPr lang="de-DE" smtClean="0"/>
+              <a:rPr lang="de-DE"/>
               <a:t>Fünfte Ebene</a:t>
             </a:r>
-            <a:endParaRPr lang="de-DE"/>
           </a:p>
         </p:txBody>
       </p:sp>
@@ -1184,38 +1178,37 @@
           <a:p>
             <a:pPr lvl="0"/>
             <a:r>
-              <a:rPr lang="de-DE" smtClean="0"/>
+              <a:rPr lang="de-DE"/>
               <a:t>Textmasterformat bearbeiten</a:t>
             </a:r>
           </a:p>
           <a:p>
             <a:pPr lvl="1"/>
             <a:r>
-              <a:rPr lang="de-DE" smtClean="0"/>
+              <a:rPr lang="de-DE"/>
               <a:t>Zweite Ebene</a:t>
             </a:r>
           </a:p>
           <a:p>
             <a:pPr lvl="2"/>
             <a:r>
-              <a:rPr lang="de-DE" smtClean="0"/>
+              <a:rPr lang="de-DE"/>
               <a:t>Dritte Ebene</a:t>
             </a:r>
           </a:p>
           <a:p>
             <a:pPr lvl="3"/>
             <a:r>
-              <a:rPr lang="de-DE" smtClean="0"/>
+              <a:rPr lang="de-DE"/>
               <a:t>Vierte Ebene</a:t>
             </a:r>
           </a:p>
           <a:p>
             <a:pPr lvl="4"/>
             <a:r>
-              <a:rPr lang="de-DE" smtClean="0"/>
+              <a:rPr lang="de-DE"/>
               <a:t>Fünfte Ebene</a:t>
             </a:r>
-            <a:endParaRPr lang="de-DE"/>
           </a:p>
         </p:txBody>
       </p:sp>
@@ -1236,7 +1229,7 @@
           <a:p>
             <a:fld id="{D8DCA20A-278F-45B7-BBF6-0081BC7E6569}" type="datetimeFigureOut">
               <a:rPr lang="de-DE" smtClean="0"/>
-              <a:t>23.10.2015</a:t>
+              <a:t>22.03.2016</a:t>
             </a:fld>
             <a:endParaRPr lang="de-DE"/>
           </a:p>
@@ -1335,10 +1328,9 @@
           <a:lstStyle/>
           <a:p>
             <a:r>
-              <a:rPr lang="de-DE" smtClean="0"/>
+              <a:rPr lang="de-DE"/>
               <a:t>Titelmasterformat durch Klicken bearbeiten</a:t>
             </a:r>
-            <a:endParaRPr lang="de-DE"/>
           </a:p>
         </p:txBody>
       </p:sp>
@@ -1401,7 +1393,7 @@
           <a:p>
             <a:pPr lvl="0"/>
             <a:r>
-              <a:rPr lang="de-DE" smtClean="0"/>
+              <a:rPr lang="de-DE"/>
               <a:t>Textmasterformat bearbeiten</a:t>
             </a:r>
           </a:p>
@@ -1429,38 +1421,37 @@
           <a:p>
             <a:pPr lvl="0"/>
             <a:r>
-              <a:rPr lang="de-DE" smtClean="0"/>
+              <a:rPr lang="de-DE"/>
               <a:t>Textmasterformat bearbeiten</a:t>
             </a:r>
           </a:p>
           <a:p>
             <a:pPr lvl="1"/>
             <a:r>
-              <a:rPr lang="de-DE" smtClean="0"/>
+              <a:rPr lang="de-DE"/>
               <a:t>Zweite Ebene</a:t>
             </a:r>
           </a:p>
           <a:p>
             <a:pPr lvl="2"/>
             <a:r>
-              <a:rPr lang="de-DE" smtClean="0"/>
+              <a:rPr lang="de-DE"/>
               <a:t>Dritte Ebene</a:t>
             </a:r>
           </a:p>
           <a:p>
             <a:pPr lvl="3"/>
             <a:r>
-              <a:rPr lang="de-DE" smtClean="0"/>
+              <a:rPr lang="de-DE"/>
               <a:t>Vierte Ebene</a:t>
             </a:r>
           </a:p>
           <a:p>
             <a:pPr lvl="4"/>
             <a:r>
-              <a:rPr lang="de-DE" smtClean="0"/>
+              <a:rPr lang="de-DE"/>
               <a:t>Fünfte Ebene</a:t>
             </a:r>
-            <a:endParaRPr lang="de-DE"/>
           </a:p>
         </p:txBody>
       </p:sp>
@@ -1523,7 +1514,7 @@
           <a:p>
             <a:pPr lvl="0"/>
             <a:r>
-              <a:rPr lang="de-DE" smtClean="0"/>
+              <a:rPr lang="de-DE"/>
               <a:t>Textmasterformat bearbeiten</a:t>
             </a:r>
           </a:p>
@@ -1551,38 +1542,37 @@
           <a:p>
             <a:pPr lvl="0"/>
             <a:r>
-              <a:rPr lang="de-DE" smtClean="0"/>
+              <a:rPr lang="de-DE"/>
               <a:t>Textmasterformat bearbeiten</a:t>
             </a:r>
           </a:p>
           <a:p>
             <a:pPr lvl="1"/>
             <a:r>
-              <a:rPr lang="de-DE" smtClean="0"/>
+              <a:rPr lang="de-DE"/>
               <a:t>Zweite Ebene</a:t>
             </a:r>
           </a:p>
           <a:p>
             <a:pPr lvl="2"/>
             <a:r>
-              <a:rPr lang="de-DE" smtClean="0"/>
+              <a:rPr lang="de-DE"/>
               <a:t>Dritte Ebene</a:t>
             </a:r>
           </a:p>
           <a:p>
             <a:pPr lvl="3"/>
             <a:r>
-              <a:rPr lang="de-DE" smtClean="0"/>
+              <a:rPr lang="de-DE"/>
               <a:t>Vierte Ebene</a:t>
             </a:r>
           </a:p>
           <a:p>
             <a:pPr lvl="4"/>
             <a:r>
-              <a:rPr lang="de-DE" smtClean="0"/>
+              <a:rPr lang="de-DE"/>
               <a:t>Fünfte Ebene</a:t>
             </a:r>
-            <a:endParaRPr lang="de-DE"/>
           </a:p>
         </p:txBody>
       </p:sp>
@@ -1603,7 +1593,7 @@
           <a:p>
             <a:fld id="{D8DCA20A-278F-45B7-BBF6-0081BC7E6569}" type="datetimeFigureOut">
               <a:rPr lang="de-DE" smtClean="0"/>
-              <a:t>23.10.2015</a:t>
+              <a:t>22.03.2016</a:t>
             </a:fld>
             <a:endParaRPr lang="de-DE"/>
           </a:p>
@@ -1697,10 +1687,9 @@
           <a:lstStyle/>
           <a:p>
             <a:r>
-              <a:rPr lang="de-DE" smtClean="0"/>
+              <a:rPr lang="de-DE"/>
               <a:t>Titelmasterformat durch Klicken bearbeiten</a:t>
             </a:r>
-            <a:endParaRPr lang="de-DE"/>
           </a:p>
         </p:txBody>
       </p:sp>
@@ -1721,7 +1710,7 @@
           <a:p>
             <a:fld id="{D8DCA20A-278F-45B7-BBF6-0081BC7E6569}" type="datetimeFigureOut">
               <a:rPr lang="de-DE" smtClean="0"/>
-              <a:t>23.10.2015</a:t>
+              <a:t>22.03.2016</a:t>
             </a:fld>
             <a:endParaRPr lang="de-DE"/>
           </a:p>
@@ -1816,7 +1805,7 @@
           <a:p>
             <a:fld id="{D8DCA20A-278F-45B7-BBF6-0081BC7E6569}" type="datetimeFigureOut">
               <a:rPr lang="de-DE" smtClean="0"/>
-              <a:t>23.10.2015</a:t>
+              <a:t>22.03.2016</a:t>
             </a:fld>
             <a:endParaRPr lang="de-DE"/>
           </a:p>
@@ -1919,10 +1908,9 @@
           </a:lstStyle>
           <a:p>
             <a:r>
-              <a:rPr lang="de-DE" smtClean="0"/>
+              <a:rPr lang="de-DE"/>
               <a:t>Titelmasterformat durch Klicken bearbeiten</a:t>
             </a:r>
-            <a:endParaRPr lang="de-DE"/>
           </a:p>
         </p:txBody>
       </p:sp>
@@ -1976,38 +1964,37 @@
           <a:p>
             <a:pPr lvl="0"/>
             <a:r>
-              <a:rPr lang="de-DE" smtClean="0"/>
+              <a:rPr lang="de-DE"/>
               <a:t>Textmasterformat bearbeiten</a:t>
             </a:r>
           </a:p>
           <a:p>
             <a:pPr lvl="1"/>
             <a:r>
-              <a:rPr lang="de-DE" smtClean="0"/>
+              <a:rPr lang="de-DE"/>
               <a:t>Zweite Ebene</a:t>
             </a:r>
           </a:p>
           <a:p>
             <a:pPr lvl="2"/>
             <a:r>
-              <a:rPr lang="de-DE" smtClean="0"/>
+              <a:rPr lang="de-DE"/>
               <a:t>Dritte Ebene</a:t>
             </a:r>
           </a:p>
           <a:p>
             <a:pPr lvl="3"/>
             <a:r>
-              <a:rPr lang="de-DE" smtClean="0"/>
+              <a:rPr lang="de-DE"/>
               <a:t>Vierte Ebene</a:t>
             </a:r>
           </a:p>
           <a:p>
             <a:pPr lvl="4"/>
             <a:r>
-              <a:rPr lang="de-DE" smtClean="0"/>
+              <a:rPr lang="de-DE"/>
               <a:t>Fünfte Ebene</a:t>
             </a:r>
-            <a:endParaRPr lang="de-DE"/>
           </a:p>
         </p:txBody>
       </p:sp>
@@ -2070,7 +2057,7 @@
           <a:p>
             <a:pPr lvl="0"/>
             <a:r>
-              <a:rPr lang="de-DE" smtClean="0"/>
+              <a:rPr lang="de-DE"/>
               <a:t>Textmasterformat bearbeiten</a:t>
             </a:r>
           </a:p>
@@ -2093,7 +2080,7 @@
           <a:p>
             <a:fld id="{D8DCA20A-278F-45B7-BBF6-0081BC7E6569}" type="datetimeFigureOut">
               <a:rPr lang="de-DE" smtClean="0"/>
-              <a:t>23.10.2015</a:t>
+              <a:t>22.03.2016</a:t>
             </a:fld>
             <a:endParaRPr lang="de-DE"/>
           </a:p>
@@ -2196,10 +2183,9 @@
           </a:lstStyle>
           <a:p>
             <a:r>
-              <a:rPr lang="de-DE" smtClean="0"/>
+              <a:rPr lang="de-DE"/>
               <a:t>Titelmasterformat durch Klicken bearbeiten</a:t>
             </a:r>
-            <a:endParaRPr lang="de-DE"/>
           </a:p>
         </p:txBody>
       </p:sp>
@@ -2323,7 +2309,7 @@
           <a:p>
             <a:pPr lvl="0"/>
             <a:r>
-              <a:rPr lang="de-DE" smtClean="0"/>
+              <a:rPr lang="de-DE"/>
               <a:t>Textmasterformat bearbeiten</a:t>
             </a:r>
           </a:p>
@@ -2346,7 +2332,7 @@
           <a:p>
             <a:fld id="{D8DCA20A-278F-45B7-BBF6-0081BC7E6569}" type="datetimeFigureOut">
               <a:rPr lang="de-DE" smtClean="0"/>
-              <a:t>23.10.2015</a:t>
+              <a:t>22.03.2016</a:t>
             </a:fld>
             <a:endParaRPr lang="de-DE"/>
           </a:p>
@@ -2455,10 +2441,9 @@
           <a:lstStyle/>
           <a:p>
             <a:r>
-              <a:rPr lang="de-DE" smtClean="0"/>
+              <a:rPr lang="de-DE"/>
               <a:t>Titelmasterformat durch Klicken bearbeiten</a:t>
             </a:r>
-            <a:endParaRPr lang="de-DE"/>
           </a:p>
         </p:txBody>
       </p:sp>
@@ -2489,38 +2474,37 @@
           <a:p>
             <a:pPr lvl="0"/>
             <a:r>
-              <a:rPr lang="de-DE" smtClean="0"/>
+              <a:rPr lang="de-DE"/>
               <a:t>Textmasterformat bearbeiten</a:t>
             </a:r>
           </a:p>
           <a:p>
             <a:pPr lvl="1"/>
             <a:r>
-              <a:rPr lang="de-DE" smtClean="0"/>
+              <a:rPr lang="de-DE"/>
               <a:t>Zweite Ebene</a:t>
             </a:r>
           </a:p>
           <a:p>
             <a:pPr lvl="2"/>
             <a:r>
-              <a:rPr lang="de-DE" smtClean="0"/>
+              <a:rPr lang="de-DE"/>
               <a:t>Dritte Ebene</a:t>
             </a:r>
           </a:p>
           <a:p>
             <a:pPr lvl="3"/>
             <a:r>
-              <a:rPr lang="de-DE" smtClean="0"/>
+              <a:rPr lang="de-DE"/>
               <a:t>Vierte Ebene</a:t>
             </a:r>
           </a:p>
           <a:p>
             <a:pPr lvl="4"/>
             <a:r>
-              <a:rPr lang="de-DE" smtClean="0"/>
+              <a:rPr lang="de-DE"/>
               <a:t>Fünfte Ebene</a:t>
             </a:r>
-            <a:endParaRPr lang="de-DE"/>
           </a:p>
         </p:txBody>
       </p:sp>
@@ -2559,7 +2543,7 @@
           <a:p>
             <a:fld id="{D8DCA20A-278F-45B7-BBF6-0081BC7E6569}" type="datetimeFigureOut">
               <a:rPr lang="de-DE" smtClean="0"/>
-              <a:t>23.10.2015</a:t>
+              <a:t>22.03.2016</a:t>
             </a:fld>
             <a:endParaRPr lang="de-DE"/>
           </a:p>
@@ -3059,18 +3043,13 @@
           <a:p>
             <a:pPr algn="ctr"/>
             <a:r>
-              <a:rPr lang="de-DE" sz="1000" b="1" dirty="0" smtClean="0">
+              <a:rPr lang="de-DE" sz="1000" b="1" dirty="0">
                 <a:solidFill>
                   <a:schemeClr val="tx1"/>
                 </a:solidFill>
               </a:rPr>
               <a:t>ASSIGNED</a:t>
             </a:r>
-            <a:endParaRPr lang="de-DE" sz="1000" b="1" dirty="0">
-              <a:solidFill>
-                <a:schemeClr val="tx1"/>
-              </a:solidFill>
-            </a:endParaRPr>
           </a:p>
         </p:txBody>
       </p:sp>
@@ -3121,11 +3100,6 @@
               </a:rPr>
               <a:t>COMPLETED</a:t>
             </a:r>
-            <a:endParaRPr lang="de-DE" sz="1000" b="1">
-              <a:solidFill>
-                <a:schemeClr val="tx1"/>
-              </a:solidFill>
-            </a:endParaRPr>
           </a:p>
         </p:txBody>
       </p:sp>
@@ -3176,11 +3150,6 @@
               </a:rPr>
               <a:t>DELEGATED</a:t>
             </a:r>
-            <a:endParaRPr lang="de-DE" sz="1000" b="1">
-              <a:solidFill>
-                <a:schemeClr val="tx1"/>
-              </a:solidFill>
-            </a:endParaRPr>
           </a:p>
         </p:txBody>
       </p:sp>
@@ -3229,18 +3198,13 @@
           <a:p>
             <a:pPr algn="ctr"/>
             <a:r>
-              <a:rPr lang="de-DE" sz="1000" b="1" dirty="0" smtClean="0">
+              <a:rPr lang="de-DE" sz="1000" b="1" dirty="0">
                 <a:solidFill>
                   <a:schemeClr val="tx1"/>
                 </a:solidFill>
               </a:rPr>
               <a:t>UNASSIGNED</a:t>
             </a:r>
-            <a:endParaRPr lang="de-DE" sz="1000" b="1" dirty="0">
-              <a:solidFill>
-                <a:schemeClr val="tx1"/>
-              </a:solidFill>
-            </a:endParaRPr>
           </a:p>
         </p:txBody>
       </p:sp>
@@ -3654,7 +3618,6 @@
               <a:rPr lang="de-DE" sz="1000" b="1"/>
               <a:t>complete</a:t>
             </a:r>
-            <a:endParaRPr lang="de-DE" sz="1000" b="1"/>
           </a:p>
         </p:txBody>
       </p:sp>
@@ -3684,7 +3647,6 @@
               <a:rPr lang="de-DE" sz="1000" b="1"/>
               <a:t>delegate</a:t>
             </a:r>
-            <a:endParaRPr lang="de-DE" sz="1000" b="1"/>
           </a:p>
         </p:txBody>
       </p:sp>
@@ -3714,7 +3676,6 @@
               <a:rPr lang="de-DE" sz="1000" b="1"/>
               <a:t>claim</a:t>
             </a:r>
-            <a:endParaRPr lang="de-DE" sz="1000" b="1"/>
           </a:p>
         </p:txBody>
       </p:sp>
@@ -3744,7 +3705,6 @@
               <a:rPr lang="de-DE" sz="1000" b="1"/>
               <a:t>resolve</a:t>
             </a:r>
-            <a:endParaRPr lang="de-DE" sz="1000" b="1"/>
           </a:p>
         </p:txBody>
       </p:sp>
@@ -3774,7 +3734,6 @@
               <a:rPr lang="de-DE" sz="1000" b="1"/>
               <a:t>unclaim</a:t>
             </a:r>
-            <a:endParaRPr lang="de-DE" sz="1000" b="1"/>
           </a:p>
         </p:txBody>
       </p:sp>
@@ -3804,7 +3763,6 @@
               <a:rPr lang="de-DE" sz="1000" b="1"/>
               <a:t>assign</a:t>
             </a:r>
-            <a:endParaRPr lang="de-DE" sz="1000" b="1"/>
           </a:p>
         </p:txBody>
       </p:sp>
@@ -3834,7 +3792,6 @@
               <a:rPr lang="de-DE" sz="1000" b="1"/>
               <a:t>reassign</a:t>
             </a:r>
-            <a:endParaRPr lang="de-DE" sz="1000" b="1"/>
           </a:p>
         </p:txBody>
       </p:sp>
@@ -3872,7 +3829,6 @@
               <a:rPr lang="de-DE" sz="1000" b="1"/>
               <a:t>Candidate</a:t>
             </a:r>
-            <a:endParaRPr lang="de-DE" sz="1000" b="1"/>
           </a:p>
         </p:txBody>
       </p:sp>
@@ -3958,7 +3914,6 @@
               <a:rPr lang="de-DE" sz="1000" b="1"/>
               <a:t>Candidate</a:t>
             </a:r>
-            <a:endParaRPr lang="de-DE" sz="1000" b="1"/>
           </a:p>
         </p:txBody>
       </p:sp>
@@ -3988,7 +3943,6 @@
               <a:rPr lang="de-DE"/>
               <a:t>Task Lifecycle</a:t>
             </a:r>
-            <a:endParaRPr lang="de-DE"/>
           </a:p>
         </p:txBody>
       </p:sp>
@@ -4066,7 +4020,6 @@
               <a:rPr lang="de-DE" sz="1000" b="1"/>
               <a:t>create</a:t>
             </a:r>
-            <a:endParaRPr lang="de-DE" sz="1000" b="1"/>
           </a:p>
         </p:txBody>
       </p:sp>
@@ -4079,7 +4032,7 @@
         <p:spPr>
           <a:xfrm>
             <a:off x="8616280" y="1383887"/>
-            <a:ext cx="1836712" cy="2000548"/>
+            <a:ext cx="1836712" cy="2154436"/>
           </a:xfrm>
           <a:prstGeom prst="rect">
             <a:avLst/>
@@ -4093,8 +4046,24 @@
           <a:lstStyle/>
           <a:p>
             <a:r>
-              <a:rPr lang="de-DE" sz="1200"/>
-              <a:t>Task Lifecycle Operations </a:t>
+              <a:rPr lang="de-DE" sz="1200" dirty="0"/>
+              <a:t>Task </a:t>
+            </a:r>
+            <a:r>
+              <a:rPr lang="de-DE" sz="1200" dirty="0" err="1"/>
+              <a:t>Lifecycle</a:t>
+            </a:r>
+            <a:r>
+              <a:rPr lang="de-DE" sz="1200" dirty="0"/>
+              <a:t> </a:t>
+            </a:r>
+            <a:r>
+              <a:rPr lang="de-DE" sz="1200" dirty="0" err="1"/>
+              <a:t>Operations</a:t>
+            </a:r>
+            <a:r>
+              <a:rPr lang="de-DE" sz="1200" dirty="0"/>
+              <a:t> </a:t>
             </a:r>
           </a:p>
           <a:p>
@@ -4103,7 +4072,7 @@
               <a:buChar char="-"/>
             </a:pPr>
             <a:r>
-              <a:rPr lang="de-DE" sz="1000"/>
+              <a:rPr lang="de-DE" sz="1000" dirty="0"/>
               <a:t>Create</a:t>
             </a:r>
           </a:p>
@@ -4113,9 +4082,14 @@
               <a:buChar char="-"/>
             </a:pPr>
             <a:r>
-              <a:rPr lang="de-DE" sz="1000"/>
-              <a:t>Set Candidate</a:t>
-            </a:r>
+              <a:rPr lang="de-DE" sz="1000" dirty="0"/>
+              <a:t>Set </a:t>
+            </a:r>
+            <a:r>
+              <a:rPr lang="de-DE" sz="1000" dirty="0" err="1"/>
+              <a:t>Candidate</a:t>
+            </a:r>
+            <a:endParaRPr lang="de-DE" sz="1000" dirty="0"/>
           </a:p>
           <a:p>
             <a:pPr marL="171450" indent="-171450">
@@ -4123,7 +4097,7 @@
               <a:buChar char="-"/>
             </a:pPr>
             <a:r>
-              <a:rPr lang="de-DE" sz="1000"/>
+              <a:rPr lang="de-DE" sz="1000" dirty="0"/>
               <a:t>Claim</a:t>
             </a:r>
           </a:p>
@@ -4133,9 +4107,10 @@
               <a:buChar char="-"/>
             </a:pPr>
             <a:r>
-              <a:rPr lang="de-DE" sz="1000"/>
+              <a:rPr lang="de-DE" sz="1000" dirty="0" err="1"/>
               <a:t>Unclaim</a:t>
             </a:r>
+            <a:endParaRPr lang="de-DE" sz="1000" dirty="0"/>
           </a:p>
           <a:p>
             <a:pPr marL="171450" indent="-171450">
@@ -4143,9 +4118,10 @@
               <a:buChar char="-"/>
             </a:pPr>
             <a:r>
-              <a:rPr lang="de-DE" sz="1000"/>
+              <a:rPr lang="de-DE" sz="1000" dirty="0" err="1"/>
               <a:t>Assign</a:t>
             </a:r>
+            <a:endParaRPr lang="de-DE" sz="1000" dirty="0"/>
           </a:p>
           <a:p>
             <a:pPr marL="171450" indent="-171450">
@@ -4153,9 +4129,10 @@
               <a:buChar char="-"/>
             </a:pPr>
             <a:r>
-              <a:rPr lang="de-DE" sz="1000"/>
+              <a:rPr lang="de-DE" sz="1000" dirty="0" err="1"/>
               <a:t>Reassign</a:t>
             </a:r>
+            <a:endParaRPr lang="de-DE" sz="1000" dirty="0"/>
           </a:p>
           <a:p>
             <a:pPr marL="171450" indent="-171450">
@@ -4163,9 +4140,10 @@
               <a:buChar char="-"/>
             </a:pPr>
             <a:r>
-              <a:rPr lang="de-DE" sz="1000"/>
+              <a:rPr lang="de-DE" sz="1000" dirty="0" err="1"/>
               <a:t>Delegate</a:t>
             </a:r>
+            <a:endParaRPr lang="de-DE" sz="1000" dirty="0"/>
           </a:p>
           <a:p>
             <a:pPr marL="171450" indent="-171450">
@@ -4173,9 +4151,10 @@
               <a:buChar char="-"/>
             </a:pPr>
             <a:r>
-              <a:rPr lang="de-DE" sz="1000"/>
+              <a:rPr lang="de-DE" sz="1000" dirty="0" err="1"/>
               <a:t>Resolve</a:t>
             </a:r>
+            <a:endParaRPr lang="de-DE" sz="1000" dirty="0"/>
           </a:p>
           <a:p>
             <a:pPr marL="171450" indent="-171450">
@@ -4183,9 +4162,10 @@
               <a:buChar char="-"/>
             </a:pPr>
             <a:r>
-              <a:rPr lang="de-DE" sz="1000"/>
+              <a:rPr lang="de-DE" sz="1000" dirty="0" err="1"/>
               <a:t>Complete</a:t>
             </a:r>
+            <a:endParaRPr lang="de-DE" sz="1000" dirty="0"/>
           </a:p>
           <a:p>
             <a:pPr marL="171450" indent="-171450">
@@ -4193,16 +4173,27 @@
               <a:buChar char="-"/>
             </a:pPr>
             <a:r>
-              <a:rPr lang="de-DE" sz="1000"/>
+              <a:rPr lang="de-DE" sz="1000" dirty="0"/>
               <a:t>Delete</a:t>
             </a:r>
+          </a:p>
+          <a:p>
+            <a:pPr marL="171450" indent="-171450">
+              <a:buFont typeface="Symbol" pitchFamily="18" charset="2"/>
+              <a:buChar char="-"/>
+            </a:pPr>
+            <a:r>
+              <a:rPr lang="en-US" sz="1000" dirty="0"/>
+              <a:t>Suspend</a:t>
+            </a:r>
+            <a:endParaRPr lang="de-DE" sz="1000" dirty="0"/>
           </a:p>
           <a:p>
             <a:pPr marL="171450" indent="-171450">
               <a:buFontTx/>
               <a:buChar char="-"/>
             </a:pPr>
-            <a:endParaRPr lang="de-DE" sz="1200"/>
+            <a:endParaRPr lang="de-DE" sz="1200" dirty="0"/>
           </a:p>
         </p:txBody>
       </p:sp>
@@ -4292,7 +4283,6 @@
               <a:rPr lang="de-DE" sz="1000"/>
               <a:t>Deleted</a:t>
             </a:r>
-            <a:endParaRPr lang="de-DE" sz="1000"/>
           </a:p>
         </p:txBody>
       </p:sp>
@@ -4488,13 +4478,6 @@
   <p:clrMapOvr>
     <a:masterClrMapping/>
   </p:clrMapOvr>
-  <p:timing>
-    <p:tnLst>
-      <p:par>
-        <p:cTn id="1" dur="indefinite" restart="never" nodeType="tmRoot"/>
-      </p:par>
-    </p:tnLst>
-  </p:timing>
 </p:sld>
 </file>
 

</xml_diff>